<commit_message>
Passed version of terasolunaorg-guideline-110045068
</commit_message>
<xml_diff>
--- a/source/Security/images_CSRF/materialCSRF.pptx
+++ b/source/Security/images_CSRF/materialCSRF.pptx
@@ -5,11 +5,10 @@
     <p:sldMasterId id="2147483648" r:id="rId1"/>
   </p:sldMasterIdLst>
   <p:notesMasterIdLst>
-    <p:notesMasterId r:id="rId4"/>
+    <p:notesMasterId r:id="rId3"/>
   </p:notesMasterIdLst>
   <p:sldIdLst>
-    <p:sldId id="264" r:id="rId2"/>
-    <p:sldId id="265" r:id="rId3"/>
+    <p:sldId id="256" r:id="rId2"/>
   </p:sldIdLst>
   <p:sldSz cx="9144000" cy="6858000" type="screen4x3"/>
   <p:notesSz cx="6858000" cy="9144000"/>
@@ -108,6 +107,22 @@
       </a:defRPr>
     </a:lvl9pPr>
   </p:defaultTextStyle>
+  <p:extLst>
+    <p:ext uri="{EFAFB233-063F-42B5-8137-9DF3F51BA10A}">
+      <p15:sldGuideLst xmlns:p15="http://schemas.microsoft.com/office/powerpoint/2012/main">
+        <p15:guide id="1" orient="horz" pos="2160">
+          <p15:clr>
+            <a:srgbClr val="A4A3A4"/>
+          </p15:clr>
+        </p15:guide>
+        <p15:guide id="2" pos="2880">
+          <p15:clr>
+            <a:srgbClr val="A4A3A4"/>
+          </p15:clr>
+        </p15:guide>
+      </p15:sldGuideLst>
+    </p:ext>
+  </p:extLst>
 </p:presentation>
 </file>
 
@@ -194,7 +209,7 @@
             <a:fld id="{3BB47352-BF5A-4CD2-B029-996118CD8E01}" type="datetimeFigureOut">
               <a:rPr kumimoji="1" lang="ja-JP" altLang="en-US" smtClean="0"/>
               <a:pPr/>
-              <a:t>2014/10/16</a:t>
+              <a:t>2016/1/28</a:t>
             </a:fld>
             <a:endParaRPr kumimoji="1" lang="ja-JP" altLang="en-US"/>
           </a:p>
@@ -495,88 +510,6 @@
 </p:notesMaster>
 </file>
 
-<file path=ppt/notesSlides/notesSlide1.xml><?xml version="1.0" encoding="utf-8"?>
-<p:notes xmlns:a="http://schemas.openxmlformats.org/drawingml/2006/main" xmlns:r="http://schemas.openxmlformats.org/officeDocument/2006/relationships" xmlns:p="http://schemas.openxmlformats.org/presentationml/2006/main">
-  <p:cSld>
-    <p:spTree>
-      <p:nvGrpSpPr>
-        <p:cNvPr id="1" name=""/>
-        <p:cNvGrpSpPr/>
-        <p:nvPr/>
-      </p:nvGrpSpPr>
-      <p:grpSpPr>
-        <a:xfrm>
-          <a:off x="0" y="0"/>
-          <a:ext cx="0" cy="0"/>
-          <a:chOff x="0" y="0"/>
-          <a:chExt cx="0" cy="0"/>
-        </a:xfrm>
-      </p:grpSpPr>
-      <p:sp>
-        <p:nvSpPr>
-          <p:cNvPr id="2" name="スライド イメージ プレースホルダ 1"/>
-          <p:cNvSpPr>
-            <a:spLocks noGrp="1" noRot="1" noChangeAspect="1"/>
-          </p:cNvSpPr>
-          <p:nvPr>
-            <p:ph type="sldImg"/>
-          </p:nvPr>
-        </p:nvSpPr>
-        <p:spPr/>
-      </p:sp>
-      <p:sp>
-        <p:nvSpPr>
-          <p:cNvPr id="3" name="ノート プレースホルダ 2"/>
-          <p:cNvSpPr>
-            <a:spLocks noGrp="1"/>
-          </p:cNvSpPr>
-          <p:nvPr>
-            <p:ph type="body" idx="1"/>
-          </p:nvPr>
-        </p:nvSpPr>
-        <p:spPr/>
-        <p:txBody>
-          <a:bodyPr>
-            <a:normAutofit/>
-          </a:bodyPr>
-          <a:lstStyle/>
-          <a:p>
-            <a:endParaRPr kumimoji="1" lang="ja-JP" altLang="en-US" dirty="0"/>
-          </a:p>
-        </p:txBody>
-      </p:sp>
-      <p:sp>
-        <p:nvSpPr>
-          <p:cNvPr id="4" name="スライド番号プレースホルダ 3"/>
-          <p:cNvSpPr>
-            <a:spLocks noGrp="1"/>
-          </p:cNvSpPr>
-          <p:nvPr>
-            <p:ph type="sldNum" sz="quarter" idx="10"/>
-          </p:nvPr>
-        </p:nvSpPr>
-        <p:spPr/>
-        <p:txBody>
-          <a:bodyPr/>
-          <a:lstStyle/>
-          <a:p>
-            <a:fld id="{003CFFA3-9D07-4088-826B-DF328166082C}" type="slidenum">
-              <a:rPr kumimoji="1" lang="ja-JP" altLang="en-US" smtClean="0"/>
-              <a:pPr/>
-              <a:t>1</a:t>
-            </a:fld>
-            <a:endParaRPr kumimoji="1" lang="ja-JP" altLang="en-US"/>
-          </a:p>
-        </p:txBody>
-      </p:sp>
-    </p:spTree>
-  </p:cSld>
-  <p:clrMapOvr>
-    <a:masterClrMapping/>
-  </p:clrMapOvr>
-</p:notes>
-</file>
-
 <file path=ppt/slideLayouts/slideLayout1.xml><?xml version="1.0" encoding="utf-8"?>
 <p:sldLayout xmlns:a="http://schemas.openxmlformats.org/drawingml/2006/main" xmlns:r="http://schemas.openxmlformats.org/officeDocument/2006/relationships" xmlns:p="http://schemas.openxmlformats.org/presentationml/2006/main" type="title" preserve="1">
   <p:cSld name="タイトル スライド">
@@ -759,7 +692,7 @@
             <a:fld id="{7B9B12EC-6AA0-374B-A2D3-850081A07A26}" type="datetimeFigureOut">
               <a:rPr kumimoji="1" lang="ja-JP" altLang="en-US" smtClean="0"/>
               <a:pPr/>
-              <a:t>2014/10/16</a:t>
+              <a:t>2016/1/28</a:t>
             </a:fld>
             <a:endParaRPr kumimoji="1" lang="ja-JP" altLang="en-US"/>
           </a:p>
@@ -963,7 +896,7 @@
             <a:fld id="{7B9B12EC-6AA0-374B-A2D3-850081A07A26}" type="datetimeFigureOut">
               <a:rPr kumimoji="1" lang="ja-JP" altLang="en-US" smtClean="0"/>
               <a:pPr/>
-              <a:t>2014/10/16</a:t>
+              <a:t>2016/1/28</a:t>
             </a:fld>
             <a:endParaRPr kumimoji="1" lang="ja-JP" altLang="en-US"/>
           </a:p>
@@ -1177,7 +1110,7 @@
             <a:fld id="{7B9B12EC-6AA0-374B-A2D3-850081A07A26}" type="datetimeFigureOut">
               <a:rPr kumimoji="1" lang="ja-JP" altLang="en-US" smtClean="0"/>
               <a:pPr/>
-              <a:t>2014/10/16</a:t>
+              <a:t>2016/1/28</a:t>
             </a:fld>
             <a:endParaRPr kumimoji="1" lang="ja-JP" altLang="en-US"/>
           </a:p>
@@ -1381,7 +1314,7 @@
             <a:fld id="{7B9B12EC-6AA0-374B-A2D3-850081A07A26}" type="datetimeFigureOut">
               <a:rPr kumimoji="1" lang="ja-JP" altLang="en-US" smtClean="0"/>
               <a:pPr/>
-              <a:t>2014/10/16</a:t>
+              <a:t>2016/1/28</a:t>
             </a:fld>
             <a:endParaRPr kumimoji="1" lang="ja-JP" altLang="en-US"/>
           </a:p>
@@ -1629,7 +1562,7 @@
             <a:fld id="{7B9B12EC-6AA0-374B-A2D3-850081A07A26}" type="datetimeFigureOut">
               <a:rPr kumimoji="1" lang="ja-JP" altLang="en-US" smtClean="0"/>
               <a:pPr/>
-              <a:t>2014/10/16</a:t>
+              <a:t>2016/1/28</a:t>
             </a:fld>
             <a:endParaRPr kumimoji="1" lang="ja-JP" altLang="en-US"/>
           </a:p>
@@ -1983,7 +1916,7 @@
             <a:fld id="{7B9B12EC-6AA0-374B-A2D3-850081A07A26}" type="datetimeFigureOut">
               <a:rPr kumimoji="1" lang="ja-JP" altLang="en-US" smtClean="0"/>
               <a:pPr/>
-              <a:t>2014/10/16</a:t>
+              <a:t>2016/1/28</a:t>
             </a:fld>
             <a:endParaRPr kumimoji="1" lang="ja-JP" altLang="en-US"/>
           </a:p>
@@ -2471,7 +2404,7 @@
             <a:fld id="{7B9B12EC-6AA0-374B-A2D3-850081A07A26}" type="datetimeFigureOut">
               <a:rPr kumimoji="1" lang="ja-JP" altLang="en-US" smtClean="0"/>
               <a:pPr/>
-              <a:t>2014/10/16</a:t>
+              <a:t>2016/1/28</a:t>
             </a:fld>
             <a:endParaRPr kumimoji="1" lang="ja-JP" altLang="en-US"/>
           </a:p>
@@ -2591,7 +2524,7 @@
             <a:fld id="{7B9B12EC-6AA0-374B-A2D3-850081A07A26}" type="datetimeFigureOut">
               <a:rPr kumimoji="1" lang="ja-JP" altLang="en-US" smtClean="0"/>
               <a:pPr/>
-              <a:t>2014/10/16</a:t>
+              <a:t>2016/1/28</a:t>
             </a:fld>
             <a:endParaRPr kumimoji="1" lang="ja-JP" altLang="en-US"/>
           </a:p>
@@ -2688,7 +2621,7 @@
             <a:fld id="{7B9B12EC-6AA0-374B-A2D3-850081A07A26}" type="datetimeFigureOut">
               <a:rPr kumimoji="1" lang="ja-JP" altLang="en-US" smtClean="0"/>
               <a:pPr/>
-              <a:t>2014/10/16</a:t>
+              <a:t>2016/1/28</a:t>
             </a:fld>
             <a:endParaRPr kumimoji="1" lang="ja-JP" altLang="en-US"/>
           </a:p>
@@ -2999,7 +2932,7 @@
             <a:fld id="{7B9B12EC-6AA0-374B-A2D3-850081A07A26}" type="datetimeFigureOut">
               <a:rPr kumimoji="1" lang="ja-JP" altLang="en-US" smtClean="0"/>
               <a:pPr/>
-              <a:t>2014/10/16</a:t>
+              <a:t>2016/1/28</a:t>
             </a:fld>
             <a:endParaRPr kumimoji="1" lang="ja-JP" altLang="en-US"/>
           </a:p>
@@ -3254,7 +3187,7 @@
             <a:fld id="{7B9B12EC-6AA0-374B-A2D3-850081A07A26}" type="datetimeFigureOut">
               <a:rPr kumimoji="1" lang="ja-JP" altLang="en-US" smtClean="0"/>
               <a:pPr/>
-              <a:t>2014/10/16</a:t>
+              <a:t>2016/1/28</a:t>
             </a:fld>
             <a:endParaRPr kumimoji="1" lang="ja-JP" altLang="en-US"/>
           </a:p>
@@ -3501,7 +3434,7 @@
             <a:fld id="{7B9B12EC-6AA0-374B-A2D3-850081A07A26}" type="datetimeFigureOut">
               <a:rPr kumimoji="1" lang="ja-JP" altLang="en-US" smtClean="0"/>
               <a:pPr/>
-              <a:t>2014/10/16</a:t>
+              <a:t>2016/1/28</a:t>
             </a:fld>
             <a:endParaRPr kumimoji="1" lang="ja-JP" altLang="en-US"/>
           </a:p>
@@ -3877,2319 +3810,2397 @@
           <a:chExt cx="0" cy="0"/>
         </a:xfrm>
       </p:grpSpPr>
-      <p:grpSp>
-        <p:nvGrpSpPr>
-          <p:cNvPr id="32" name="グループ化 31"/>
-          <p:cNvGrpSpPr/>
+      <p:sp>
+        <p:nvSpPr>
+          <p:cNvPr id="33" name="laptop"/>
+          <p:cNvSpPr>
+            <a:spLocks noEditPoints="1" noChangeArrowheads="1"/>
+          </p:cNvSpPr>
           <p:nvPr/>
-        </p:nvGrpSpPr>
-        <p:grpSpPr>
+        </p:nvSpPr>
+        <p:spPr bwMode="auto">
           <a:xfrm>
-            <a:off x="330200" y="534275"/>
-            <a:ext cx="8645848" cy="5481311"/>
-            <a:chOff x="330200" y="534275"/>
-            <a:chExt cx="8645848" cy="5481311"/>
+            <a:off x="1538190" y="1005556"/>
+            <a:ext cx="1071417" cy="806382"/>
           </a:xfrm>
-        </p:grpSpPr>
-        <p:pic>
-          <p:nvPicPr>
-            <p:cNvPr id="40" name="Picture 6" descr="http://designleaves.y-com.info/images/material/f_icon/prettyxbrowser_p24_bl_nl_l.png"/>
-            <p:cNvPicPr>
-              <a:picLocks noChangeAspect="1" noChangeArrowheads="1"/>
-            </p:cNvPicPr>
-            <p:nvPr/>
-          </p:nvPicPr>
-          <p:blipFill>
-            <a:blip r:embed="rId3"/>
-            <a:srcRect/>
-            <a:stretch>
-              <a:fillRect/>
-            </a:stretch>
-          </p:blipFill>
-          <p:spPr bwMode="auto">
-            <a:xfrm>
-              <a:off x="384170" y="3353387"/>
-              <a:ext cx="2320930" cy="2662199"/>
-            </a:xfrm>
-            <a:prstGeom prst="rect">
+          <a:custGeom>
+            <a:avLst/>
+            <a:gdLst>
+              <a:gd name="T0" fmla="*/ 3362 w 21600"/>
+              <a:gd name="T1" fmla="*/ 0 h 21600"/>
+              <a:gd name="T2" fmla="*/ 3362 w 21600"/>
+              <a:gd name="T3" fmla="*/ 7173 h 21600"/>
+              <a:gd name="T4" fmla="*/ 18327 w 21600"/>
+              <a:gd name="T5" fmla="*/ 0 h 21600"/>
+              <a:gd name="T6" fmla="*/ 18327 w 21600"/>
+              <a:gd name="T7" fmla="*/ 7173 h 21600"/>
+              <a:gd name="T8" fmla="*/ 10800 w 21600"/>
+              <a:gd name="T9" fmla="*/ 0 h 21600"/>
+              <a:gd name="T10" fmla="*/ 10800 w 21600"/>
+              <a:gd name="T11" fmla="*/ 21600 h 21600"/>
+              <a:gd name="T12" fmla="*/ 0 w 21600"/>
+              <a:gd name="T13" fmla="*/ 21600 h 21600"/>
+              <a:gd name="T14" fmla="*/ 21600 w 21600"/>
+              <a:gd name="T15" fmla="*/ 21600 h 21600"/>
+              <a:gd name="T16" fmla="*/ 4445 w 21600"/>
+              <a:gd name="T17" fmla="*/ 1858 h 21600"/>
+              <a:gd name="T18" fmla="*/ 17311 w 21600"/>
+              <a:gd name="T19" fmla="*/ 12323 h 21600"/>
+            </a:gdLst>
+            <a:ahLst/>
+            <a:cxnLst>
+              <a:cxn ang="0">
+                <a:pos x="T0" y="T1"/>
+              </a:cxn>
+              <a:cxn ang="0">
+                <a:pos x="T2" y="T3"/>
+              </a:cxn>
+              <a:cxn ang="0">
+                <a:pos x="T4" y="T5"/>
+              </a:cxn>
+              <a:cxn ang="0">
+                <a:pos x="T6" y="T7"/>
+              </a:cxn>
+              <a:cxn ang="0">
+                <a:pos x="T8" y="T9"/>
+              </a:cxn>
+              <a:cxn ang="0">
+                <a:pos x="T10" y="T11"/>
+              </a:cxn>
+              <a:cxn ang="0">
+                <a:pos x="T12" y="T13"/>
+              </a:cxn>
+              <a:cxn ang="0">
+                <a:pos x="T14" y="T15"/>
+              </a:cxn>
+            </a:cxnLst>
+            <a:rect l="T16" t="T17" r="T18" b="T19"/>
+            <a:pathLst>
+              <a:path w="21600" h="21600" extrusionOk="0">
+                <a:moveTo>
+                  <a:pt x="3362" y="0"/>
+                </a:moveTo>
+                <a:lnTo>
+                  <a:pt x="18327" y="0"/>
+                </a:lnTo>
+                <a:lnTo>
+                  <a:pt x="18327" y="14347"/>
+                </a:lnTo>
+                <a:lnTo>
+                  <a:pt x="3362" y="14347"/>
+                </a:lnTo>
+                <a:lnTo>
+                  <a:pt x="3362" y="0"/>
+                </a:lnTo>
+                <a:close/>
+              </a:path>
+              <a:path w="21600" h="21600" extrusionOk="0">
+                <a:moveTo>
+                  <a:pt x="3340" y="15068"/>
+                </a:moveTo>
+                <a:lnTo>
+                  <a:pt x="0" y="19877"/>
+                </a:lnTo>
+                <a:lnTo>
+                  <a:pt x="21600" y="19877"/>
+                </a:lnTo>
+                <a:lnTo>
+                  <a:pt x="18327" y="15068"/>
+                </a:lnTo>
+                <a:lnTo>
+                  <a:pt x="3340" y="15068"/>
+                </a:lnTo>
+                <a:close/>
+              </a:path>
+              <a:path w="21600" h="21600" extrusionOk="0">
+                <a:moveTo>
+                  <a:pt x="0" y="19877"/>
+                </a:moveTo>
+                <a:lnTo>
+                  <a:pt x="0" y="21600"/>
+                </a:lnTo>
+                <a:lnTo>
+                  <a:pt x="21600" y="21600"/>
+                </a:lnTo>
+                <a:lnTo>
+                  <a:pt x="21600" y="19877"/>
+                </a:lnTo>
+                <a:lnTo>
+                  <a:pt x="0" y="19877"/>
+                </a:lnTo>
+                <a:close/>
+              </a:path>
+              <a:path w="21600" h="21600" extrusionOk="0">
+                <a:moveTo>
+                  <a:pt x="4186" y="1523"/>
+                </a:moveTo>
+                <a:lnTo>
+                  <a:pt x="17547" y="1523"/>
+                </a:lnTo>
+                <a:lnTo>
+                  <a:pt x="17547" y="12744"/>
+                </a:lnTo>
+                <a:lnTo>
+                  <a:pt x="4186" y="12744"/>
+                </a:lnTo>
+                <a:lnTo>
+                  <a:pt x="4186" y="1523"/>
+                </a:lnTo>
+                <a:close/>
+              </a:path>
+              <a:path w="21600" h="21600" extrusionOk="0">
+                <a:moveTo>
+                  <a:pt x="3318" y="15549"/>
+                </a:moveTo>
+                <a:lnTo>
+                  <a:pt x="2917" y="16110"/>
+                </a:lnTo>
+                <a:lnTo>
+                  <a:pt x="18727" y="16110"/>
+                </a:lnTo>
+                <a:lnTo>
+                  <a:pt x="18327" y="15549"/>
+                </a:lnTo>
+                <a:lnTo>
+                  <a:pt x="3318" y="15549"/>
+                </a:lnTo>
+                <a:close/>
+              </a:path>
+              <a:path w="21600" h="21600" extrusionOk="0">
+                <a:moveTo>
+                  <a:pt x="6213" y="18314"/>
+                </a:moveTo>
+                <a:lnTo>
+                  <a:pt x="5946" y="18875"/>
+                </a:lnTo>
+                <a:lnTo>
+                  <a:pt x="15766" y="18875"/>
+                </a:lnTo>
+                <a:lnTo>
+                  <a:pt x="15499" y="18314"/>
+                </a:lnTo>
+                <a:lnTo>
+                  <a:pt x="6213" y="18314"/>
+                </a:lnTo>
+                <a:close/>
+              </a:path>
+              <a:path w="21600" h="21600" extrusionOk="0">
+                <a:moveTo>
+                  <a:pt x="2828" y="16471"/>
+                </a:moveTo>
+                <a:lnTo>
+                  <a:pt x="2405" y="17072"/>
+                </a:lnTo>
+                <a:lnTo>
+                  <a:pt x="19284" y="17072"/>
+                </a:lnTo>
+                <a:lnTo>
+                  <a:pt x="18839" y="16471"/>
+                </a:lnTo>
+                <a:lnTo>
+                  <a:pt x="2828" y="16471"/>
+                </a:lnTo>
+                <a:close/>
+              </a:path>
+              <a:path w="21600" h="21600" extrusionOk="0">
+                <a:moveTo>
+                  <a:pt x="2316" y="17352"/>
+                </a:moveTo>
+                <a:lnTo>
+                  <a:pt x="1871" y="17953"/>
+                </a:lnTo>
+                <a:lnTo>
+                  <a:pt x="19863" y="17953"/>
+                </a:lnTo>
+                <a:lnTo>
+                  <a:pt x="19395" y="17352"/>
+                </a:lnTo>
+                <a:lnTo>
+                  <a:pt x="2316" y="17352"/>
+                </a:lnTo>
+                <a:close/>
+              </a:path>
+            </a:pathLst>
+          </a:custGeom>
+          <a:solidFill>
+            <a:schemeClr val="bg1">
+              <a:lumMod val="95000"/>
+            </a:schemeClr>
+          </a:solidFill>
+          <a:ln w="0">
+            <a:headEnd/>
+            <a:tailEnd/>
+          </a:ln>
+        </p:spPr>
+        <p:style>
+          <a:lnRef idx="2">
+            <a:schemeClr val="dk1"/>
+          </a:lnRef>
+          <a:fillRef idx="1">
+            <a:schemeClr val="lt1"/>
+          </a:fillRef>
+          <a:effectRef idx="0">
+            <a:schemeClr val="dk1"/>
+          </a:effectRef>
+          <a:fontRef idx="minor">
+            <a:schemeClr val="dk1"/>
+          </a:fontRef>
+        </p:style>
+        <p:txBody>
+          <a:bodyPr vert="horz" wrap="square" lIns="91440" tIns="45720" rIns="91440" bIns="45720" numCol="1" anchor="t" anchorCtr="0" compatLnSpc="1">
+            <a:prstTxWarp prst="textNoShape">
               <a:avLst/>
-            </a:prstGeom>
-            <a:noFill/>
-          </p:spPr>
-        </p:pic>
-        <p:sp>
-          <p:nvSpPr>
-            <p:cNvPr id="14" name="正方形/長方形 13"/>
-            <p:cNvSpPr/>
-            <p:nvPr/>
-          </p:nvSpPr>
-          <p:spPr>
-            <a:xfrm>
-              <a:off x="4624249" y="998820"/>
-              <a:ext cx="4351799" cy="4482790"/>
-            </a:xfrm>
-            <a:prstGeom prst="rect">
-              <a:avLst/>
-            </a:prstGeom>
-          </p:spPr>
-          <p:style>
-            <a:lnRef idx="1">
-              <a:schemeClr val="accent4"/>
-            </a:lnRef>
-            <a:fillRef idx="2">
-              <a:schemeClr val="accent4"/>
-            </a:fillRef>
-            <a:effectRef idx="1">
-              <a:schemeClr val="accent4"/>
-            </a:effectRef>
-            <a:fontRef idx="minor">
-              <a:schemeClr val="dk1"/>
-            </a:fontRef>
-          </p:style>
-          <p:txBody>
-            <a:bodyPr rtlCol="0" anchor="t"/>
-            <a:lstStyle/>
-            <a:p>
-              <a:pPr algn="ctr"/>
-              <a:r>
-                <a:rPr kumimoji="1" lang="en-US" altLang="ja-JP" dirty="0" smtClean="0"/>
-                <a:t>Web Site</a:t>
-              </a:r>
-              <a:endParaRPr kumimoji="1" lang="ja-JP" altLang="en-US" dirty="0"/>
-            </a:p>
-          </p:txBody>
-        </p:sp>
-        <p:sp>
-          <p:nvSpPr>
-            <p:cNvPr id="23" name="正方形/長方形 22"/>
-            <p:cNvSpPr/>
-            <p:nvPr/>
-          </p:nvSpPr>
-          <p:spPr>
-            <a:xfrm>
-              <a:off x="948899" y="2656068"/>
-              <a:ext cx="1633538" cy="357190"/>
-            </a:xfrm>
-            <a:prstGeom prst="rect">
-              <a:avLst/>
-            </a:prstGeom>
-            <a:noFill/>
-            <a:ln>
-              <a:noFill/>
-            </a:ln>
-          </p:spPr>
-          <p:style>
-            <a:lnRef idx="2">
-              <a:schemeClr val="accent1">
-                <a:shade val="50000"/>
-              </a:schemeClr>
-            </a:lnRef>
-            <a:fillRef idx="1">
-              <a:schemeClr val="accent1"/>
-            </a:fillRef>
-            <a:effectRef idx="0">
-              <a:schemeClr val="accent1"/>
-            </a:effectRef>
-            <a:fontRef idx="minor">
-              <a:schemeClr val="lt1"/>
-            </a:fontRef>
-          </p:style>
-          <p:txBody>
-            <a:bodyPr rtlCol="0" anchor="ctr"/>
-            <a:lstStyle/>
-            <a:p>
-              <a:r>
-                <a:rPr lang="en-US" altLang="ja-JP" sz="1400" dirty="0" smtClean="0">
-                  <a:solidFill>
-                    <a:schemeClr val="tx1"/>
-                  </a:solidFill>
-                </a:rPr>
-                <a:t>Illegal User</a:t>
-              </a:r>
-              <a:endParaRPr kumimoji="1" lang="ja-JP" altLang="en-US" sz="1400" dirty="0">
-                <a:solidFill>
-                  <a:schemeClr val="tx1"/>
-                </a:solidFill>
-              </a:endParaRPr>
-            </a:p>
-          </p:txBody>
-        </p:sp>
-        <p:sp>
-          <p:nvSpPr>
-            <p:cNvPr id="34" name="正方形/長方形 33"/>
-            <p:cNvSpPr/>
-            <p:nvPr/>
-          </p:nvSpPr>
-          <p:spPr>
-            <a:xfrm>
-              <a:off x="948899" y="5424534"/>
-              <a:ext cx="1633538" cy="357190"/>
-            </a:xfrm>
-            <a:prstGeom prst="rect">
-              <a:avLst/>
-            </a:prstGeom>
-            <a:noFill/>
-            <a:ln>
-              <a:noFill/>
-            </a:ln>
-          </p:spPr>
-          <p:style>
-            <a:lnRef idx="2">
-              <a:schemeClr val="accent1">
-                <a:shade val="50000"/>
-              </a:schemeClr>
-            </a:lnRef>
-            <a:fillRef idx="1">
-              <a:schemeClr val="accent1"/>
-            </a:fillRef>
-            <a:effectRef idx="0">
-              <a:schemeClr val="accent1"/>
-            </a:effectRef>
-            <a:fontRef idx="minor">
-              <a:schemeClr val="lt1"/>
-            </a:fontRef>
-          </p:style>
-          <p:txBody>
-            <a:bodyPr rtlCol="0" anchor="ctr"/>
-            <a:lstStyle/>
-            <a:p>
-              <a:r>
-                <a:rPr lang="en-US" altLang="ja-JP" sz="1400" dirty="0" smtClean="0">
-                  <a:solidFill>
-                    <a:schemeClr val="tx1"/>
-                  </a:solidFill>
-                </a:rPr>
-                <a:t>Genuine User</a:t>
-              </a:r>
-              <a:endParaRPr kumimoji="1" lang="ja-JP" altLang="en-US" sz="1400" dirty="0">
-                <a:solidFill>
-                  <a:schemeClr val="tx1"/>
-                </a:solidFill>
-              </a:endParaRPr>
-            </a:p>
-          </p:txBody>
-        </p:sp>
-        <p:sp>
-          <p:nvSpPr>
-            <p:cNvPr id="21" name="右矢印 20"/>
-            <p:cNvSpPr/>
-            <p:nvPr/>
-          </p:nvSpPr>
-          <p:spPr>
-            <a:xfrm>
-              <a:off x="2781300" y="1865376"/>
-              <a:ext cx="2199916" cy="384048"/>
-            </a:xfrm>
-            <a:prstGeom prst="rightArrow">
-              <a:avLst/>
-            </a:prstGeom>
-          </p:spPr>
-          <p:style>
-            <a:lnRef idx="1">
-              <a:schemeClr val="accent1"/>
-            </a:lnRef>
-            <a:fillRef idx="3">
-              <a:schemeClr val="accent1"/>
-            </a:fillRef>
-            <a:effectRef idx="2">
-              <a:schemeClr val="accent1"/>
-            </a:effectRef>
-            <a:fontRef idx="minor">
-              <a:schemeClr val="lt1"/>
-            </a:fontRef>
-          </p:style>
-          <p:txBody>
-            <a:bodyPr rtlCol="0" anchor="ctr"/>
-            <a:lstStyle/>
-            <a:p>
-              <a:pPr algn="ctr"/>
-              <a:endParaRPr kumimoji="1" lang="ja-JP" altLang="en-US"/>
-            </a:p>
-          </p:txBody>
-        </p:sp>
-        <p:sp>
-          <p:nvSpPr>
-            <p:cNvPr id="22" name="右矢印 21"/>
-            <p:cNvSpPr/>
-            <p:nvPr/>
-          </p:nvSpPr>
-          <p:spPr>
-            <a:xfrm>
-              <a:off x="2781300" y="4427439"/>
-              <a:ext cx="4888462" cy="384048"/>
-            </a:xfrm>
-            <a:prstGeom prst="rightArrow">
-              <a:avLst/>
-            </a:prstGeom>
-          </p:spPr>
-          <p:style>
-            <a:lnRef idx="1">
-              <a:schemeClr val="accent1"/>
-            </a:lnRef>
-            <a:fillRef idx="3">
-              <a:schemeClr val="accent1"/>
-            </a:fillRef>
-            <a:effectRef idx="2">
-              <a:schemeClr val="accent1"/>
-            </a:effectRef>
-            <a:fontRef idx="minor">
-              <a:schemeClr val="lt1"/>
-            </a:fontRef>
-          </p:style>
-          <p:txBody>
-            <a:bodyPr rtlCol="0" anchor="ctr"/>
-            <a:lstStyle/>
-            <a:p>
-              <a:pPr algn="ctr"/>
-              <a:endParaRPr kumimoji="1" lang="ja-JP" altLang="en-US"/>
-            </a:p>
-          </p:txBody>
-        </p:sp>
-        <p:pic>
-          <p:nvPicPr>
-            <p:cNvPr id="37" name="Picture 6" descr="http://designleaves.y-com.info/images/material/f_icon/prettyxbrowser_p24_bl_nl_l.png"/>
-            <p:cNvPicPr>
-              <a:picLocks noChangeAspect="1" noChangeArrowheads="1"/>
-            </p:cNvPicPr>
-            <p:nvPr/>
-          </p:nvPicPr>
-          <p:blipFill>
-            <a:blip r:embed="rId3"/>
-            <a:srcRect/>
-            <a:stretch>
-              <a:fillRect/>
-            </a:stretch>
-          </p:blipFill>
-          <p:spPr bwMode="auto">
-            <a:xfrm>
-              <a:off x="330200" y="534276"/>
-              <a:ext cx="2320930" cy="2662199"/>
-            </a:xfrm>
-            <a:prstGeom prst="rect">
-              <a:avLst/>
-            </a:prstGeom>
-            <a:noFill/>
-          </p:spPr>
-        </p:pic>
-        <p:sp>
-          <p:nvSpPr>
-            <p:cNvPr id="38" name="正方形/長方形 37"/>
-            <p:cNvSpPr/>
-            <p:nvPr/>
-          </p:nvSpPr>
-          <p:spPr>
-            <a:xfrm>
-              <a:off x="539619" y="4525348"/>
-              <a:ext cx="2041784" cy="694368"/>
-            </a:xfrm>
-            <a:prstGeom prst="rect">
-              <a:avLst/>
-            </a:prstGeom>
-            <a:noFill/>
-            <a:ln>
-              <a:noFill/>
-            </a:ln>
-          </p:spPr>
-          <p:style>
-            <a:lnRef idx="2">
-              <a:schemeClr val="accent1">
-                <a:shade val="50000"/>
-              </a:schemeClr>
-            </a:lnRef>
-            <a:fillRef idx="1">
-              <a:schemeClr val="accent1"/>
-            </a:fillRef>
-            <a:effectRef idx="0">
-              <a:schemeClr val="accent1"/>
-            </a:effectRef>
-            <a:fontRef idx="minor">
-              <a:schemeClr val="lt1"/>
-            </a:fontRef>
-          </p:style>
-          <p:txBody>
-            <a:bodyPr rtlCol="0" anchor="t"/>
-            <a:lstStyle>
-              <a:defPPr>
-                <a:defRPr lang="ja-JP"/>
-              </a:defPPr>
-              <a:lvl1pPr marL="0" algn="l" defTabSz="457200" rtl="0" eaLnBrk="1" latinLnBrk="0" hangingPunct="1">
-                <a:defRPr kumimoji="1" sz="1800" kern="1200">
-                  <a:solidFill>
-                    <a:schemeClr val="lt1"/>
-                  </a:solidFill>
-                  <a:latin typeface="+mn-lt"/>
-                  <a:ea typeface="+mn-ea"/>
-                  <a:cs typeface="+mn-cs"/>
-                </a:defRPr>
-              </a:lvl1pPr>
-              <a:lvl2pPr marL="457200" algn="l" defTabSz="457200" rtl="0" eaLnBrk="1" latinLnBrk="0" hangingPunct="1">
-                <a:defRPr kumimoji="1" sz="1800" kern="1200">
-                  <a:solidFill>
-                    <a:schemeClr val="lt1"/>
-                  </a:solidFill>
-                  <a:latin typeface="+mn-lt"/>
-                  <a:ea typeface="+mn-ea"/>
-                  <a:cs typeface="+mn-cs"/>
-                </a:defRPr>
-              </a:lvl2pPr>
-              <a:lvl3pPr marL="914400" algn="l" defTabSz="457200" rtl="0" eaLnBrk="1" latinLnBrk="0" hangingPunct="1">
-                <a:defRPr kumimoji="1" sz="1800" kern="1200">
-                  <a:solidFill>
-                    <a:schemeClr val="lt1"/>
-                  </a:solidFill>
-                  <a:latin typeface="+mn-lt"/>
-                  <a:ea typeface="+mn-ea"/>
-                  <a:cs typeface="+mn-cs"/>
-                </a:defRPr>
-              </a:lvl3pPr>
-              <a:lvl4pPr marL="1371600" algn="l" defTabSz="457200" rtl="0" eaLnBrk="1" latinLnBrk="0" hangingPunct="1">
-                <a:defRPr kumimoji="1" sz="1800" kern="1200">
-                  <a:solidFill>
-                    <a:schemeClr val="lt1"/>
-                  </a:solidFill>
-                  <a:latin typeface="+mn-lt"/>
-                  <a:ea typeface="+mn-ea"/>
-                  <a:cs typeface="+mn-cs"/>
-                </a:defRPr>
-              </a:lvl4pPr>
-              <a:lvl5pPr marL="1828800" algn="l" defTabSz="457200" rtl="0" eaLnBrk="1" latinLnBrk="0" hangingPunct="1">
-                <a:defRPr kumimoji="1" sz="1800" kern="1200">
-                  <a:solidFill>
-                    <a:schemeClr val="lt1"/>
-                  </a:solidFill>
-                  <a:latin typeface="+mn-lt"/>
-                  <a:ea typeface="+mn-ea"/>
-                  <a:cs typeface="+mn-cs"/>
-                </a:defRPr>
-              </a:lvl5pPr>
-              <a:lvl6pPr marL="2286000" algn="l" defTabSz="457200" rtl="0" eaLnBrk="1" latinLnBrk="0" hangingPunct="1">
-                <a:defRPr kumimoji="1" sz="1800" kern="1200">
-                  <a:solidFill>
-                    <a:schemeClr val="lt1"/>
-                  </a:solidFill>
-                  <a:latin typeface="+mn-lt"/>
-                  <a:ea typeface="+mn-ea"/>
-                  <a:cs typeface="+mn-cs"/>
-                </a:defRPr>
-              </a:lvl6pPr>
-              <a:lvl7pPr marL="2743200" algn="l" defTabSz="457200" rtl="0" eaLnBrk="1" latinLnBrk="0" hangingPunct="1">
-                <a:defRPr kumimoji="1" sz="1800" kern="1200">
-                  <a:solidFill>
-                    <a:schemeClr val="lt1"/>
-                  </a:solidFill>
-                  <a:latin typeface="+mn-lt"/>
-                  <a:ea typeface="+mn-ea"/>
-                  <a:cs typeface="+mn-cs"/>
-                </a:defRPr>
-              </a:lvl7pPr>
-              <a:lvl8pPr marL="3200400" algn="l" defTabSz="457200" rtl="0" eaLnBrk="1" latinLnBrk="0" hangingPunct="1">
-                <a:defRPr kumimoji="1" sz="1800" kern="1200">
-                  <a:solidFill>
-                    <a:schemeClr val="lt1"/>
-                  </a:solidFill>
-                  <a:latin typeface="+mn-lt"/>
-                  <a:ea typeface="+mn-ea"/>
-                  <a:cs typeface="+mn-cs"/>
-                </a:defRPr>
-              </a:lvl8pPr>
-              <a:lvl9pPr marL="3657600" algn="l" defTabSz="457200" rtl="0" eaLnBrk="1" latinLnBrk="0" hangingPunct="1">
-                <a:defRPr kumimoji="1" sz="1800" kern="1200">
-                  <a:solidFill>
-                    <a:schemeClr val="lt1"/>
-                  </a:solidFill>
-                  <a:latin typeface="+mn-lt"/>
-                  <a:ea typeface="+mn-ea"/>
-                  <a:cs typeface="+mn-cs"/>
-                </a:defRPr>
-              </a:lvl9pPr>
-            </a:lstStyle>
-            <a:p>
-              <a:pPr algn="ctr"/>
-              <a:r>
-                <a:rPr lang="en-US" altLang="ja-JP" sz="1400" dirty="0" smtClean="0">
-                  <a:solidFill>
-                    <a:schemeClr val="tx1"/>
-                  </a:solidFill>
-                </a:rPr>
-                <a:t>Hidden</a:t>
-              </a:r>
-            </a:p>
-            <a:p>
-              <a:pPr algn="ctr"/>
-              <a:r>
-                <a:rPr lang="en-US" altLang="ja-JP" sz="1400" dirty="0" smtClean="0">
-                  <a:solidFill>
-                    <a:schemeClr val="tx1"/>
-                  </a:solidFill>
-                </a:rPr>
-                <a:t>" </a:t>
-              </a:r>
-              <a:r>
-                <a:rPr lang="en-US" altLang="ja-JP" sz="1400" b="1" dirty="0" err="1" smtClean="0">
-                  <a:solidFill>
-                    <a:srgbClr val="33CC33"/>
-                  </a:solidFill>
-                </a:rPr>
-                <a:t>xxxxxxxxxx</a:t>
-              </a:r>
-              <a:r>
-                <a:rPr lang="en-US" altLang="ja-JP" sz="1400" dirty="0" smtClean="0">
-                  <a:solidFill>
-                    <a:schemeClr val="tx1"/>
-                  </a:solidFill>
-                </a:rPr>
-                <a:t>"</a:t>
-              </a:r>
-            </a:p>
-          </p:txBody>
-        </p:sp>
-        <p:sp>
-          <p:nvSpPr>
-            <p:cNvPr id="42" name="正方形/長方形 41"/>
-            <p:cNvSpPr/>
-            <p:nvPr/>
-          </p:nvSpPr>
-          <p:spPr>
-            <a:xfrm>
-              <a:off x="4981216" y="1604108"/>
-              <a:ext cx="1970065" cy="3493841"/>
-            </a:xfrm>
-            <a:prstGeom prst="rect">
-              <a:avLst/>
-            </a:prstGeom>
-            <a:noFill/>
-            <a:ln w="25400">
+            </a:prstTxWarp>
+          </a:bodyPr>
+          <a:lstStyle/>
+          <a:p>
+            <a:endParaRPr lang="ja-JP" altLang="en-US"/>
+          </a:p>
+        </p:txBody>
+      </p:sp>
+      <p:sp>
+        <p:nvSpPr>
+          <p:cNvPr id="35" name="テキスト ボックス 34"/>
+          <p:cNvSpPr txBox="1"/>
+          <p:nvPr/>
+        </p:nvSpPr>
+        <p:spPr>
+          <a:xfrm>
+            <a:off x="1322576" y="255838"/>
+            <a:ext cx="1521693" cy="646331"/>
+          </a:xfrm>
+          <a:prstGeom prst="rect">
+            <a:avLst/>
+          </a:prstGeom>
+          <a:noFill/>
+        </p:spPr>
+        <p:txBody>
+          <a:bodyPr wrap="square" rtlCol="0">
+            <a:spAutoFit/>
+          </a:bodyPr>
+          <a:lstStyle/>
+          <a:p>
+            <a:pPr algn="ctr"/>
+            <a:r>
+              <a:rPr kumimoji="1" lang="en-US" altLang="ja-JP" b="1" dirty="0" smtClean="0">
+                <a:solidFill>
+                  <a:schemeClr val="tx1">
+                    <a:lumMod val="75000"/>
+                    <a:lumOff val="25000"/>
+                  </a:schemeClr>
+                </a:solidFill>
+                <a:latin typeface="HGP創英角ｺﾞｼｯｸUB" panose="020B0900000000000000" pitchFamily="50" charset="-128"/>
+                <a:ea typeface="HGP創英角ｺﾞｼｯｸUB" panose="020B0900000000000000" pitchFamily="50" charset="-128"/>
+              </a:rPr>
+              <a:t>Client</a:t>
+            </a:r>
+          </a:p>
+          <a:p>
+            <a:pPr algn="ctr"/>
+            <a:r>
+              <a:rPr lang="en-US" altLang="ja-JP" b="1" dirty="0" smtClean="0">
+                <a:solidFill>
+                  <a:schemeClr val="tx1">
+                    <a:lumMod val="75000"/>
+                    <a:lumOff val="25000"/>
+                  </a:schemeClr>
+                </a:solidFill>
+                <a:latin typeface="HGP創英角ｺﾞｼｯｸUB" panose="020B0900000000000000" pitchFamily="50" charset="-128"/>
+                <a:ea typeface="HGP創英角ｺﾞｼｯｸUB" panose="020B0900000000000000" pitchFamily="50" charset="-128"/>
+              </a:rPr>
+              <a:t>(Browser)</a:t>
+            </a:r>
+            <a:endParaRPr kumimoji="1" lang="ja-JP" altLang="en-US" b="1" dirty="0">
               <a:solidFill>
-                <a:schemeClr val="accent4">
+                <a:schemeClr val="tx1">
                   <a:lumMod val="75000"/>
+                  <a:lumOff val="25000"/>
                 </a:schemeClr>
               </a:solidFill>
-            </a:ln>
-          </p:spPr>
-          <p:style>
-            <a:lnRef idx="1">
-              <a:schemeClr val="accent1"/>
-            </a:lnRef>
-            <a:fillRef idx="3">
-              <a:schemeClr val="accent1"/>
-            </a:fillRef>
-            <a:effectRef idx="2">
-              <a:schemeClr val="accent1"/>
-            </a:effectRef>
-            <a:fontRef idx="minor">
-              <a:schemeClr val="lt1"/>
-            </a:fontRef>
-          </p:style>
-          <p:txBody>
-            <a:bodyPr rtlCol="0" anchor="ctr"/>
-            <a:lstStyle/>
-            <a:p>
-              <a:pPr algn="ctr"/>
-              <a:endParaRPr kumimoji="1" lang="ja-JP" altLang="en-US"/>
-            </a:p>
-          </p:txBody>
-        </p:sp>
-        <p:sp>
-          <p:nvSpPr>
-            <p:cNvPr id="43" name="正方形/長方形 42"/>
-            <p:cNvSpPr/>
-            <p:nvPr/>
-          </p:nvSpPr>
-          <p:spPr>
-            <a:xfrm>
-              <a:off x="4981217" y="1604108"/>
-              <a:ext cx="997892" cy="369776"/>
-            </a:xfrm>
-            <a:prstGeom prst="rect">
-              <a:avLst/>
-            </a:prstGeom>
-            <a:noFill/>
-            <a:ln>
-              <a:noFill/>
-            </a:ln>
-          </p:spPr>
-          <p:style>
-            <a:lnRef idx="2">
-              <a:schemeClr val="accent1">
-                <a:shade val="50000"/>
+              <a:latin typeface="HGP創英角ｺﾞｼｯｸUB" panose="020B0900000000000000" pitchFamily="50" charset="-128"/>
+              <a:ea typeface="HGP創英角ｺﾞｼｯｸUB" panose="020B0900000000000000" pitchFamily="50" charset="-128"/>
+            </a:endParaRPr>
+          </a:p>
+        </p:txBody>
+      </p:sp>
+      <p:cxnSp>
+        <p:nvCxnSpPr>
+          <p:cNvPr id="37" name="直線矢印コネクタ 126"/>
+          <p:cNvCxnSpPr/>
+          <p:nvPr/>
+        </p:nvCxnSpPr>
+        <p:spPr bwMode="invGray">
+          <a:xfrm>
+            <a:off x="2073898" y="1943148"/>
+            <a:ext cx="0" cy="4358580"/>
+          </a:xfrm>
+          <a:prstGeom prst="straightConnector1">
+            <a:avLst/>
+          </a:prstGeom>
+          <a:ln w="50800">
+            <a:solidFill>
+              <a:schemeClr val="tx1">
+                <a:lumMod val="50000"/>
+                <a:lumOff val="50000"/>
               </a:schemeClr>
-            </a:lnRef>
-            <a:fillRef idx="1">
-              <a:schemeClr val="accent1"/>
-            </a:fillRef>
-            <a:effectRef idx="0">
-              <a:schemeClr val="accent1"/>
-            </a:effectRef>
-            <a:fontRef idx="minor">
-              <a:schemeClr val="lt1"/>
-            </a:fontRef>
-          </p:style>
-          <p:txBody>
-            <a:bodyPr rtlCol="0" anchor="t"/>
-            <a:lstStyle>
-              <a:defPPr>
-                <a:defRPr lang="ja-JP"/>
-              </a:defPPr>
-              <a:lvl1pPr marL="0" algn="l" defTabSz="457200" rtl="0" eaLnBrk="1" latinLnBrk="0" hangingPunct="1">
-                <a:defRPr kumimoji="1" sz="1800" kern="1200">
-                  <a:solidFill>
-                    <a:schemeClr val="lt1"/>
-                  </a:solidFill>
-                  <a:latin typeface="+mn-lt"/>
-                  <a:ea typeface="+mn-ea"/>
-                  <a:cs typeface="+mn-cs"/>
-                </a:defRPr>
-              </a:lvl1pPr>
-              <a:lvl2pPr marL="457200" algn="l" defTabSz="457200" rtl="0" eaLnBrk="1" latinLnBrk="0" hangingPunct="1">
-                <a:defRPr kumimoji="1" sz="1800" kern="1200">
-                  <a:solidFill>
-                    <a:schemeClr val="lt1"/>
-                  </a:solidFill>
-                  <a:latin typeface="+mn-lt"/>
-                  <a:ea typeface="+mn-ea"/>
-                  <a:cs typeface="+mn-cs"/>
-                </a:defRPr>
-              </a:lvl2pPr>
-              <a:lvl3pPr marL="914400" algn="l" defTabSz="457200" rtl="0" eaLnBrk="1" latinLnBrk="0" hangingPunct="1">
-                <a:defRPr kumimoji="1" sz="1800" kern="1200">
-                  <a:solidFill>
-                    <a:schemeClr val="lt1"/>
-                  </a:solidFill>
-                  <a:latin typeface="+mn-lt"/>
-                  <a:ea typeface="+mn-ea"/>
-                  <a:cs typeface="+mn-cs"/>
-                </a:defRPr>
-              </a:lvl3pPr>
-              <a:lvl4pPr marL="1371600" algn="l" defTabSz="457200" rtl="0" eaLnBrk="1" latinLnBrk="0" hangingPunct="1">
-                <a:defRPr kumimoji="1" sz="1800" kern="1200">
-                  <a:solidFill>
-                    <a:schemeClr val="lt1"/>
-                  </a:solidFill>
-                  <a:latin typeface="+mn-lt"/>
-                  <a:ea typeface="+mn-ea"/>
-                  <a:cs typeface="+mn-cs"/>
-                </a:defRPr>
-              </a:lvl4pPr>
-              <a:lvl5pPr marL="1828800" algn="l" defTabSz="457200" rtl="0" eaLnBrk="1" latinLnBrk="0" hangingPunct="1">
-                <a:defRPr kumimoji="1" sz="1800" kern="1200">
-                  <a:solidFill>
-                    <a:schemeClr val="lt1"/>
-                  </a:solidFill>
-                  <a:latin typeface="+mn-lt"/>
-                  <a:ea typeface="+mn-ea"/>
-                  <a:cs typeface="+mn-cs"/>
-                </a:defRPr>
-              </a:lvl5pPr>
-              <a:lvl6pPr marL="2286000" algn="l" defTabSz="457200" rtl="0" eaLnBrk="1" latinLnBrk="0" hangingPunct="1">
-                <a:defRPr kumimoji="1" sz="1800" kern="1200">
-                  <a:solidFill>
-                    <a:schemeClr val="lt1"/>
-                  </a:solidFill>
-                  <a:latin typeface="+mn-lt"/>
-                  <a:ea typeface="+mn-ea"/>
-                  <a:cs typeface="+mn-cs"/>
-                </a:defRPr>
-              </a:lvl6pPr>
-              <a:lvl7pPr marL="2743200" algn="l" defTabSz="457200" rtl="0" eaLnBrk="1" latinLnBrk="0" hangingPunct="1">
-                <a:defRPr kumimoji="1" sz="1800" kern="1200">
-                  <a:solidFill>
-                    <a:schemeClr val="lt1"/>
-                  </a:solidFill>
-                  <a:latin typeface="+mn-lt"/>
-                  <a:ea typeface="+mn-ea"/>
-                  <a:cs typeface="+mn-cs"/>
-                </a:defRPr>
-              </a:lvl7pPr>
-              <a:lvl8pPr marL="3200400" algn="l" defTabSz="457200" rtl="0" eaLnBrk="1" latinLnBrk="0" hangingPunct="1">
-                <a:defRPr kumimoji="1" sz="1800" kern="1200">
-                  <a:solidFill>
-                    <a:schemeClr val="lt1"/>
-                  </a:solidFill>
-                  <a:latin typeface="+mn-lt"/>
-                  <a:ea typeface="+mn-ea"/>
-                  <a:cs typeface="+mn-cs"/>
-                </a:defRPr>
-              </a:lvl8pPr>
-              <a:lvl9pPr marL="3657600" algn="l" defTabSz="457200" rtl="0" eaLnBrk="1" latinLnBrk="0" hangingPunct="1">
-                <a:defRPr kumimoji="1" sz="1800" kern="1200">
-                  <a:solidFill>
-                    <a:schemeClr val="lt1"/>
-                  </a:solidFill>
-                  <a:latin typeface="+mn-lt"/>
-                  <a:ea typeface="+mn-ea"/>
-                  <a:cs typeface="+mn-cs"/>
-                </a:defRPr>
-              </a:lvl9pPr>
-            </a:lstStyle>
-            <a:p>
-              <a:r>
-                <a:rPr kumimoji="1" lang="en-US" altLang="ja-JP" sz="1400" dirty="0" smtClean="0">
-                  <a:solidFill>
-                    <a:schemeClr val="tx1"/>
-                  </a:solidFill>
-                </a:rPr>
-                <a:t>session</a:t>
-              </a:r>
-              <a:endParaRPr kumimoji="1" lang="ja-JP" altLang="en-US" sz="1400" dirty="0">
-                <a:solidFill>
-                  <a:schemeClr val="tx1"/>
-                </a:solidFill>
-              </a:endParaRPr>
-            </a:p>
-          </p:txBody>
-        </p:sp>
-        <p:sp>
-          <p:nvSpPr>
-            <p:cNvPr id="44" name="フローチャート : 内部記憶 43"/>
-            <p:cNvSpPr/>
-            <p:nvPr/>
-          </p:nvSpPr>
-          <p:spPr>
-            <a:xfrm>
-              <a:off x="5169484" y="3639338"/>
-              <a:ext cx="1619249" cy="285750"/>
-            </a:xfrm>
-            <a:prstGeom prst="flowChartInternalStorage">
-              <a:avLst/>
-            </a:prstGeom>
-          </p:spPr>
-          <p:style>
-            <a:lnRef idx="1">
-              <a:schemeClr val="accent5"/>
-            </a:lnRef>
-            <a:fillRef idx="2">
-              <a:schemeClr val="accent5"/>
-            </a:fillRef>
-            <a:effectRef idx="1">
-              <a:schemeClr val="accent5"/>
-            </a:effectRef>
-            <a:fontRef idx="minor">
-              <a:schemeClr val="dk1"/>
-            </a:fontRef>
-          </p:style>
-          <p:txBody>
-            <a:bodyPr rtlCol="0" anchor="ctr"/>
-            <a:lstStyle>
-              <a:defPPr>
-                <a:defRPr lang="ja-JP"/>
-              </a:defPPr>
-              <a:lvl1pPr marL="0" algn="l" defTabSz="457200" rtl="0" eaLnBrk="1" latinLnBrk="0" hangingPunct="1">
-                <a:defRPr kumimoji="1" sz="1800" kern="1200">
-                  <a:solidFill>
-                    <a:schemeClr val="dk1"/>
-                  </a:solidFill>
-                  <a:latin typeface="+mn-lt"/>
-                  <a:ea typeface="+mn-ea"/>
-                  <a:cs typeface="+mn-cs"/>
-                </a:defRPr>
-              </a:lvl1pPr>
-              <a:lvl2pPr marL="457200" algn="l" defTabSz="457200" rtl="0" eaLnBrk="1" latinLnBrk="0" hangingPunct="1">
-                <a:defRPr kumimoji="1" sz="1800" kern="1200">
-                  <a:solidFill>
-                    <a:schemeClr val="dk1"/>
-                  </a:solidFill>
-                  <a:latin typeface="+mn-lt"/>
-                  <a:ea typeface="+mn-ea"/>
-                  <a:cs typeface="+mn-cs"/>
-                </a:defRPr>
-              </a:lvl2pPr>
-              <a:lvl3pPr marL="914400" algn="l" defTabSz="457200" rtl="0" eaLnBrk="1" latinLnBrk="0" hangingPunct="1">
-                <a:defRPr kumimoji="1" sz="1800" kern="1200">
-                  <a:solidFill>
-                    <a:schemeClr val="dk1"/>
-                  </a:solidFill>
-                  <a:latin typeface="+mn-lt"/>
-                  <a:ea typeface="+mn-ea"/>
-                  <a:cs typeface="+mn-cs"/>
-                </a:defRPr>
-              </a:lvl3pPr>
-              <a:lvl4pPr marL="1371600" algn="l" defTabSz="457200" rtl="0" eaLnBrk="1" latinLnBrk="0" hangingPunct="1">
-                <a:defRPr kumimoji="1" sz="1800" kern="1200">
-                  <a:solidFill>
-                    <a:schemeClr val="dk1"/>
-                  </a:solidFill>
-                  <a:latin typeface="+mn-lt"/>
-                  <a:ea typeface="+mn-ea"/>
-                  <a:cs typeface="+mn-cs"/>
-                </a:defRPr>
-              </a:lvl4pPr>
-              <a:lvl5pPr marL="1828800" algn="l" defTabSz="457200" rtl="0" eaLnBrk="1" latinLnBrk="0" hangingPunct="1">
-                <a:defRPr kumimoji="1" sz="1800" kern="1200">
-                  <a:solidFill>
-                    <a:schemeClr val="dk1"/>
-                  </a:solidFill>
-                  <a:latin typeface="+mn-lt"/>
-                  <a:ea typeface="+mn-ea"/>
-                  <a:cs typeface="+mn-cs"/>
-                </a:defRPr>
-              </a:lvl5pPr>
-              <a:lvl6pPr marL="2286000" algn="l" defTabSz="457200" rtl="0" eaLnBrk="1" latinLnBrk="0" hangingPunct="1">
-                <a:defRPr kumimoji="1" sz="1800" kern="1200">
-                  <a:solidFill>
-                    <a:schemeClr val="dk1"/>
-                  </a:solidFill>
-                  <a:latin typeface="+mn-lt"/>
-                  <a:ea typeface="+mn-ea"/>
-                  <a:cs typeface="+mn-cs"/>
-                </a:defRPr>
-              </a:lvl6pPr>
-              <a:lvl7pPr marL="2743200" algn="l" defTabSz="457200" rtl="0" eaLnBrk="1" latinLnBrk="0" hangingPunct="1">
-                <a:defRPr kumimoji="1" sz="1800" kern="1200">
-                  <a:solidFill>
-                    <a:schemeClr val="dk1"/>
-                  </a:solidFill>
-                  <a:latin typeface="+mn-lt"/>
-                  <a:ea typeface="+mn-ea"/>
-                  <a:cs typeface="+mn-cs"/>
-                </a:defRPr>
-              </a:lvl7pPr>
-              <a:lvl8pPr marL="3200400" algn="l" defTabSz="457200" rtl="0" eaLnBrk="1" latinLnBrk="0" hangingPunct="1">
-                <a:defRPr kumimoji="1" sz="1800" kern="1200">
-                  <a:solidFill>
-                    <a:schemeClr val="dk1"/>
-                  </a:solidFill>
-                  <a:latin typeface="+mn-lt"/>
-                  <a:ea typeface="+mn-ea"/>
-                  <a:cs typeface="+mn-cs"/>
-                </a:defRPr>
-              </a:lvl8pPr>
-              <a:lvl9pPr marL="3657600" algn="l" defTabSz="457200" rtl="0" eaLnBrk="1" latinLnBrk="0" hangingPunct="1">
-                <a:defRPr kumimoji="1" sz="1800" kern="1200">
-                  <a:solidFill>
-                    <a:schemeClr val="dk1"/>
-                  </a:solidFill>
-                  <a:latin typeface="+mn-lt"/>
-                  <a:ea typeface="+mn-ea"/>
-                  <a:cs typeface="+mn-cs"/>
-                </a:defRPr>
-              </a:lvl9pPr>
-            </a:lstStyle>
-            <a:p>
-              <a:pPr algn="ctr"/>
-              <a:r>
-                <a:rPr kumimoji="1" lang="en-US" altLang="ja-JP" sz="1600" b="1" dirty="0" err="1" smtClean="0">
-                  <a:solidFill>
-                    <a:srgbClr val="00B050"/>
-                  </a:solidFill>
-                </a:rPr>
-                <a:t>xxxxxxxxx</a:t>
-              </a:r>
-              <a:endParaRPr kumimoji="1" lang="ja-JP" altLang="en-US" sz="1600" b="1" dirty="0">
-                <a:solidFill>
-                  <a:srgbClr val="00B050"/>
-                </a:solidFill>
-              </a:endParaRPr>
-            </a:p>
-          </p:txBody>
-        </p:sp>
-        <p:sp>
-          <p:nvSpPr>
-            <p:cNvPr id="48" name="禁止 47"/>
-            <p:cNvSpPr/>
-            <p:nvPr/>
-          </p:nvSpPr>
-          <p:spPr>
-            <a:xfrm>
-              <a:off x="3346935" y="1637936"/>
-              <a:ext cx="787146" cy="793102"/>
-            </a:xfrm>
-            <a:prstGeom prst="noSmoking">
-              <a:avLst/>
-            </a:prstGeom>
-          </p:spPr>
-          <p:style>
-            <a:lnRef idx="0">
-              <a:schemeClr val="accent2"/>
-            </a:lnRef>
-            <a:fillRef idx="3">
-              <a:schemeClr val="accent2"/>
-            </a:fillRef>
-            <a:effectRef idx="3">
-              <a:schemeClr val="accent2"/>
-            </a:effectRef>
-            <a:fontRef idx="minor">
-              <a:schemeClr val="lt1"/>
-            </a:fontRef>
-          </p:style>
-          <p:txBody>
-            <a:bodyPr rtlCol="0" anchor="ctr"/>
-            <a:lstStyle/>
-            <a:p>
-              <a:pPr algn="ctr"/>
-              <a:endParaRPr kumimoji="1" lang="ja-JP" altLang="en-US">
-                <a:solidFill>
-                  <a:schemeClr val="tx1"/>
-                </a:solidFill>
-              </a:endParaRPr>
-            </a:p>
-          </p:txBody>
-        </p:sp>
-        <p:sp>
-          <p:nvSpPr>
-            <p:cNvPr id="50" name="角丸四角形 49"/>
-            <p:cNvSpPr/>
-            <p:nvPr/>
-          </p:nvSpPr>
-          <p:spPr>
-            <a:xfrm>
-              <a:off x="7669763" y="2295339"/>
-              <a:ext cx="1091682" cy="2801088"/>
-            </a:xfrm>
-            <a:prstGeom prst="roundRect">
-              <a:avLst/>
-            </a:prstGeom>
-          </p:spPr>
-          <p:style>
-            <a:lnRef idx="1">
-              <a:schemeClr val="accent6"/>
-            </a:lnRef>
-            <a:fillRef idx="2">
-              <a:schemeClr val="accent6"/>
-            </a:fillRef>
-            <a:effectRef idx="1">
-              <a:schemeClr val="accent6"/>
-            </a:effectRef>
-            <a:fontRef idx="minor">
-              <a:schemeClr val="dk1"/>
-            </a:fontRef>
-          </p:style>
-          <p:txBody>
-            <a:bodyPr rtlCol="0" anchor="ctr"/>
-            <a:lstStyle/>
-            <a:p>
-              <a:pPr algn="ctr"/>
-              <a:r>
-                <a:rPr lang="en-US" altLang="ja-JP" dirty="0" smtClean="0"/>
-                <a:t>Logic</a:t>
-              </a:r>
-              <a:endParaRPr kumimoji="1" lang="ja-JP" altLang="en-US" dirty="0"/>
-            </a:p>
-          </p:txBody>
-        </p:sp>
-        <p:sp>
-          <p:nvSpPr>
-            <p:cNvPr id="51" name="正方形/長方形 50"/>
-            <p:cNvSpPr/>
-            <p:nvPr/>
-          </p:nvSpPr>
-          <p:spPr>
-            <a:xfrm>
-              <a:off x="5776358" y="3925088"/>
-              <a:ext cx="1912777" cy="357190"/>
-            </a:xfrm>
-            <a:prstGeom prst="rect">
-              <a:avLst/>
-            </a:prstGeom>
-            <a:noFill/>
-            <a:ln>
-              <a:noFill/>
-            </a:ln>
-          </p:spPr>
-          <p:style>
-            <a:lnRef idx="2">
-              <a:schemeClr val="accent1">
-                <a:shade val="50000"/>
-              </a:schemeClr>
-            </a:lnRef>
-            <a:fillRef idx="1">
-              <a:schemeClr val="accent1"/>
-            </a:fillRef>
-            <a:effectRef idx="0">
-              <a:schemeClr val="accent1"/>
-            </a:effectRef>
-            <a:fontRef idx="minor">
-              <a:schemeClr val="lt1"/>
-            </a:fontRef>
-          </p:style>
-          <p:txBody>
-            <a:bodyPr rtlCol="0" anchor="ctr"/>
-            <a:lstStyle/>
-            <a:p>
-              <a:r>
-                <a:rPr lang="en-US" altLang="ja-JP" b="1" dirty="0" smtClean="0">
-                  <a:solidFill>
-                    <a:srgbClr val="7030A0"/>
-                  </a:solidFill>
-                </a:rPr>
-                <a:t>CSRF token check</a:t>
-              </a:r>
-              <a:endParaRPr kumimoji="1" lang="ja-JP" altLang="en-US" b="1" dirty="0">
-                <a:solidFill>
-                  <a:srgbClr val="7030A0"/>
-                </a:solidFill>
-              </a:endParaRPr>
-            </a:p>
-          </p:txBody>
-        </p:sp>
-        <p:sp>
-          <p:nvSpPr>
-            <p:cNvPr id="19" name="正方形/長方形 18"/>
-            <p:cNvSpPr/>
-            <p:nvPr/>
-          </p:nvSpPr>
-          <p:spPr>
-            <a:xfrm>
-              <a:off x="419100" y="534275"/>
-              <a:ext cx="2163337" cy="2557843"/>
-            </a:xfrm>
-            <a:prstGeom prst="rect">
-              <a:avLst/>
-            </a:prstGeom>
-            <a:noFill/>
-            <a:ln w="25400">
+            </a:solidFill>
+            <a:tailEnd type="none" w="lg" len="lg"/>
+          </a:ln>
+        </p:spPr>
+        <p:style>
+          <a:lnRef idx="1">
+            <a:schemeClr val="accent1"/>
+          </a:lnRef>
+          <a:fillRef idx="0">
+            <a:schemeClr val="accent1"/>
+          </a:fillRef>
+          <a:effectRef idx="0">
+            <a:schemeClr val="accent1"/>
+          </a:effectRef>
+          <a:fontRef idx="minor">
+            <a:schemeClr val="tx1"/>
+          </a:fontRef>
+        </p:style>
+      </p:cxnSp>
+      <p:pic>
+        <p:nvPicPr>
+          <p:cNvPr id="1033" name="Picture 9" descr="デスクトップパソコン"/>
+          <p:cNvPicPr>
+            <a:picLocks noChangeAspect="1" noChangeArrowheads="1"/>
+          </p:cNvPicPr>
+          <p:nvPr/>
+        </p:nvPicPr>
+        <p:blipFill>
+          <a:blip r:embed="rId2">
+            <a:extLst>
+              <a:ext uri="{28A0092B-C50C-407E-A947-70E740481C1C}">
+                <a14:useLocalDpi xmlns:a14="http://schemas.microsoft.com/office/drawing/2010/main" val="0"/>
+              </a:ext>
+            </a:extLst>
+          </a:blip>
+          <a:srcRect/>
+          <a:stretch>
+            <a:fillRect/>
+          </a:stretch>
+        </p:blipFill>
+        <p:spPr bwMode="auto">
+          <a:xfrm>
+            <a:off x="5431466" y="922460"/>
+            <a:ext cx="751414" cy="939268"/>
+          </a:xfrm>
+          <a:prstGeom prst="rect">
+            <a:avLst/>
+          </a:prstGeom>
+          <a:noFill/>
+          <a:extLst>
+            <a:ext uri="{909E8E84-426E-40DD-AFC4-6F175D3DCCD1}">
+              <a14:hiddenFill xmlns:a14="http://schemas.microsoft.com/office/drawing/2010/main">
+                <a:solidFill>
+                  <a:srgbClr val="FFFFFF"/>
+                </a:solidFill>
+              </a14:hiddenFill>
+            </a:ext>
+          </a:extLst>
+        </p:spPr>
+      </p:pic>
+      <p:sp>
+        <p:nvSpPr>
+          <p:cNvPr id="51" name="テキスト ボックス 50"/>
+          <p:cNvSpPr txBox="1"/>
+          <p:nvPr/>
+        </p:nvSpPr>
+        <p:spPr>
+          <a:xfrm>
+            <a:off x="4499992" y="267914"/>
+            <a:ext cx="2592288" cy="646331"/>
+          </a:xfrm>
+          <a:prstGeom prst="rect">
+            <a:avLst/>
+          </a:prstGeom>
+          <a:noFill/>
+        </p:spPr>
+        <p:txBody>
+          <a:bodyPr wrap="square" rtlCol="0">
+            <a:spAutoFit/>
+          </a:bodyPr>
+          <a:lstStyle/>
+          <a:p>
+            <a:pPr algn="ctr"/>
+            <a:r>
+              <a:rPr kumimoji="1" lang="en-US" altLang="ja-JP" b="1" dirty="0" smtClean="0">
+                <a:solidFill>
+                  <a:schemeClr val="tx1">
+                    <a:lumMod val="75000"/>
+                    <a:lumOff val="25000"/>
+                  </a:schemeClr>
+                </a:solidFill>
+                <a:latin typeface="HGP創英角ｺﾞｼｯｸUB" panose="020B0900000000000000" pitchFamily="50" charset="-128"/>
+                <a:ea typeface="HGP創英角ｺﾞｼｯｸUB" panose="020B0900000000000000" pitchFamily="50" charset="-128"/>
+              </a:rPr>
+              <a:t>Application Server</a:t>
+            </a:r>
+          </a:p>
+          <a:p>
+            <a:pPr algn="ctr"/>
+            <a:r>
+              <a:rPr lang="en-US" altLang="ja-JP" b="1" dirty="0" smtClean="0">
+                <a:solidFill>
+                  <a:schemeClr val="tx1">
+                    <a:lumMod val="75000"/>
+                    <a:lumOff val="25000"/>
+                  </a:schemeClr>
+                </a:solidFill>
+                <a:latin typeface="HGP創英角ｺﾞｼｯｸUB" panose="020B0900000000000000" pitchFamily="50" charset="-128"/>
+                <a:ea typeface="HGP創英角ｺﾞｼｯｸUB" panose="020B0900000000000000" pitchFamily="50" charset="-128"/>
+              </a:rPr>
+              <a:t>(Spring Security)</a:t>
+            </a:r>
+            <a:endParaRPr kumimoji="1" lang="ja-JP" altLang="en-US" b="1" dirty="0">
               <a:solidFill>
-                <a:srgbClr val="FFC000"/>
-              </a:solidFill>
-            </a:ln>
-          </p:spPr>
-          <p:style>
-            <a:lnRef idx="1">
-              <a:schemeClr val="accent1"/>
-            </a:lnRef>
-            <a:fillRef idx="3">
-              <a:schemeClr val="accent1"/>
-            </a:fillRef>
-            <a:effectRef idx="2">
-              <a:schemeClr val="accent1"/>
-            </a:effectRef>
-            <a:fontRef idx="minor">
-              <a:schemeClr val="lt1"/>
-            </a:fontRef>
-          </p:style>
-          <p:txBody>
-            <a:bodyPr rtlCol="0" anchor="ctr"/>
-            <a:lstStyle/>
-            <a:p>
-              <a:pPr algn="ctr"/>
-              <a:endParaRPr kumimoji="1" lang="ja-JP" altLang="en-US"/>
-            </a:p>
-          </p:txBody>
-        </p:sp>
-        <p:sp>
-          <p:nvSpPr>
-            <p:cNvPr id="20" name="正方形/長方形 19"/>
-            <p:cNvSpPr/>
-            <p:nvPr/>
-          </p:nvSpPr>
-          <p:spPr>
-            <a:xfrm>
-              <a:off x="419100" y="534276"/>
-              <a:ext cx="1633538" cy="357190"/>
-            </a:xfrm>
-            <a:prstGeom prst="rect">
-              <a:avLst/>
-            </a:prstGeom>
-            <a:noFill/>
-            <a:ln>
-              <a:noFill/>
-            </a:ln>
-          </p:spPr>
-          <p:style>
-            <a:lnRef idx="2">
-              <a:schemeClr val="accent1">
-                <a:shade val="50000"/>
-              </a:schemeClr>
-            </a:lnRef>
-            <a:fillRef idx="1">
-              <a:schemeClr val="accent1"/>
-            </a:fillRef>
-            <a:effectRef idx="0">
-              <a:schemeClr val="accent1"/>
-            </a:effectRef>
-            <a:fontRef idx="minor">
-              <a:schemeClr val="lt1"/>
-            </a:fontRef>
-          </p:style>
-          <p:txBody>
-            <a:bodyPr rtlCol="0" anchor="ctr"/>
-            <a:lstStyle/>
-            <a:p>
-              <a:r>
-                <a:rPr kumimoji="1" lang="en-US" altLang="ja-JP" sz="1400" dirty="0" smtClean="0">
-                  <a:solidFill>
-                    <a:schemeClr val="tx1"/>
-                  </a:solidFill>
-                </a:rPr>
-                <a:t>Other site</a:t>
-              </a:r>
-              <a:endParaRPr kumimoji="1" lang="ja-JP" altLang="en-US" sz="1400" dirty="0">
-                <a:solidFill>
-                  <a:schemeClr val="tx1"/>
-                </a:solidFill>
-              </a:endParaRPr>
-            </a:p>
-          </p:txBody>
-        </p:sp>
-        <p:sp>
-          <p:nvSpPr>
-            <p:cNvPr id="24" name="正方形/長方形 23"/>
-            <p:cNvSpPr/>
-            <p:nvPr/>
-          </p:nvSpPr>
-          <p:spPr>
-            <a:xfrm>
-              <a:off x="419100" y="3457743"/>
-              <a:ext cx="8556948" cy="2323981"/>
-            </a:xfrm>
-            <a:prstGeom prst="rect">
-              <a:avLst/>
-            </a:prstGeom>
-            <a:noFill/>
-            <a:ln w="25400">
-              <a:solidFill>
-                <a:srgbClr val="00B050"/>
-              </a:solidFill>
-            </a:ln>
-          </p:spPr>
-          <p:style>
-            <a:lnRef idx="1">
-              <a:schemeClr val="accent1"/>
-            </a:lnRef>
-            <a:fillRef idx="3">
-              <a:schemeClr val="accent1"/>
-            </a:fillRef>
-            <a:effectRef idx="2">
-              <a:schemeClr val="accent1"/>
-            </a:effectRef>
-            <a:fontRef idx="minor">
-              <a:schemeClr val="lt1"/>
-            </a:fontRef>
-          </p:style>
-          <p:txBody>
-            <a:bodyPr rtlCol="0" anchor="ctr"/>
-            <a:lstStyle/>
-            <a:p>
-              <a:pPr algn="ctr"/>
-              <a:endParaRPr kumimoji="1" lang="ja-JP" altLang="en-US"/>
-            </a:p>
-          </p:txBody>
-        </p:sp>
-        <p:sp>
-          <p:nvSpPr>
-            <p:cNvPr id="25" name="正方形/長方形 24"/>
-            <p:cNvSpPr/>
-            <p:nvPr/>
-          </p:nvSpPr>
-          <p:spPr>
-            <a:xfrm>
-              <a:off x="419100" y="3457743"/>
-              <a:ext cx="1633538" cy="357190"/>
-            </a:xfrm>
-            <a:prstGeom prst="rect">
-              <a:avLst/>
-            </a:prstGeom>
-            <a:noFill/>
-            <a:ln>
-              <a:noFill/>
-            </a:ln>
-          </p:spPr>
-          <p:style>
-            <a:lnRef idx="2">
-              <a:schemeClr val="accent1">
-                <a:shade val="50000"/>
-              </a:schemeClr>
-            </a:lnRef>
-            <a:fillRef idx="1">
-              <a:schemeClr val="accent1"/>
-            </a:fillRef>
-            <a:effectRef idx="0">
-              <a:schemeClr val="accent1"/>
-            </a:effectRef>
-            <a:fontRef idx="minor">
-              <a:schemeClr val="lt1"/>
-            </a:fontRef>
-          </p:style>
-          <p:txBody>
-            <a:bodyPr rtlCol="0" anchor="ctr"/>
-            <a:lstStyle/>
-            <a:p>
-              <a:r>
-                <a:rPr kumimoji="1" lang="en-US" altLang="ja-JP" sz="1400" dirty="0" smtClean="0">
-                  <a:solidFill>
-                    <a:schemeClr val="tx1"/>
-                  </a:solidFill>
-                </a:rPr>
-                <a:t>this site</a:t>
-              </a:r>
-              <a:endParaRPr kumimoji="1" lang="ja-JP" altLang="en-US" sz="1400" dirty="0">
-                <a:solidFill>
-                  <a:schemeClr val="tx1"/>
-                </a:solidFill>
-              </a:endParaRPr>
-            </a:p>
-          </p:txBody>
-        </p:sp>
-        <p:sp>
-          <p:nvSpPr>
-            <p:cNvPr id="31" name="屈折矢印 30"/>
-            <p:cNvSpPr/>
-            <p:nvPr/>
-          </p:nvSpPr>
-          <p:spPr>
-            <a:xfrm rot="1909742">
-              <a:off x="3504915" y="4146554"/>
-              <a:ext cx="567899" cy="688794"/>
-            </a:xfrm>
-            <a:prstGeom prst="bentUpArrow">
-              <a:avLst>
-                <a:gd name="adj1" fmla="val 25000"/>
-                <a:gd name="adj2" fmla="val 23792"/>
-                <a:gd name="adj3" fmla="val 0"/>
-              </a:avLst>
-            </a:prstGeom>
-            <a:ln/>
-          </p:spPr>
-          <p:style>
-            <a:lnRef idx="0">
-              <a:schemeClr val="accent3"/>
-            </a:lnRef>
-            <a:fillRef idx="3">
-              <a:schemeClr val="accent3"/>
-            </a:fillRef>
-            <a:effectRef idx="3">
-              <a:schemeClr val="accent3"/>
-            </a:effectRef>
-            <a:fontRef idx="minor">
-              <a:schemeClr val="lt1"/>
-            </a:fontRef>
-          </p:style>
-          <p:txBody>
-            <a:bodyPr rtlCol="0" anchor="ctr"/>
-            <a:lstStyle/>
-            <a:p>
-              <a:pPr algn="ctr"/>
-              <a:endParaRPr kumimoji="1" lang="ja-JP" altLang="en-US"/>
-            </a:p>
-          </p:txBody>
-        </p:sp>
-      </p:grpSp>
-    </p:spTree>
-  </p:cSld>
-  <p:clrMapOvr>
-    <a:masterClrMapping/>
-  </p:clrMapOvr>
-  <p:timing>
-    <p:tnLst>
-      <p:par>
-        <p:cTn id="1" dur="indefinite" restart="never" nodeType="tmRoot"/>
-      </p:par>
-    </p:tnLst>
-  </p:timing>
-</p:sld>
-</file>
-
-<file path=ppt/slides/slide2.xml><?xml version="1.0" encoding="utf-8"?>
-<p:sld xmlns:a="http://schemas.openxmlformats.org/drawingml/2006/main" xmlns:r="http://schemas.openxmlformats.org/officeDocument/2006/relationships" xmlns:p="http://schemas.openxmlformats.org/presentationml/2006/main">
-  <p:cSld>
-    <p:spTree>
-      <p:nvGrpSpPr>
-        <p:cNvPr id="1" name=""/>
-        <p:cNvGrpSpPr/>
-        <p:nvPr/>
-      </p:nvGrpSpPr>
-      <p:grpSpPr>
-        <a:xfrm>
-          <a:off x="0" y="0"/>
-          <a:ext cx="0" cy="0"/>
-          <a:chOff x="0" y="0"/>
-          <a:chExt cx="0" cy="0"/>
-        </a:xfrm>
-      </p:grpSpPr>
-      <p:grpSp>
-        <p:nvGrpSpPr>
-          <p:cNvPr id="37" name="グループ化 36"/>
-          <p:cNvGrpSpPr/>
-          <p:nvPr/>
-        </p:nvGrpSpPr>
-        <p:grpSpPr>
-          <a:xfrm>
-            <a:off x="1570285" y="233266"/>
-            <a:ext cx="6004222" cy="4720871"/>
-            <a:chOff x="1570285" y="233266"/>
-            <a:chExt cx="6004222" cy="4720871"/>
-          </a:xfrm>
-        </p:grpSpPr>
-        <p:sp>
-          <p:nvSpPr>
-            <p:cNvPr id="28" name="角丸四角形 27"/>
-            <p:cNvSpPr/>
-            <p:nvPr/>
-          </p:nvSpPr>
-          <p:spPr>
-            <a:xfrm>
-              <a:off x="4581330" y="233266"/>
-              <a:ext cx="2993177" cy="4720871"/>
-            </a:xfrm>
-            <a:prstGeom prst="roundRect">
-              <a:avLst/>
-            </a:prstGeom>
-          </p:spPr>
-          <p:style>
-            <a:lnRef idx="1">
-              <a:schemeClr val="accent3"/>
-            </a:lnRef>
-            <a:fillRef idx="2">
-              <a:schemeClr val="accent3"/>
-            </a:fillRef>
-            <a:effectRef idx="1">
-              <a:schemeClr val="accent3"/>
-            </a:effectRef>
-            <a:fontRef idx="minor">
-              <a:schemeClr val="dk1"/>
-            </a:fontRef>
-          </p:style>
-          <p:txBody>
-            <a:bodyPr rtlCol="0" anchor="t"/>
-            <a:lstStyle/>
-            <a:p>
-              <a:pPr algn="ctr"/>
-              <a:r>
-                <a:rPr kumimoji="1" lang="en-US" altLang="ja-JP" dirty="0" smtClean="0">
-                  <a:solidFill>
-                    <a:schemeClr val="tx1">
-                      <a:lumMod val="95000"/>
-                      <a:lumOff val="5000"/>
-                    </a:schemeClr>
-                  </a:solidFill>
-                </a:rPr>
-                <a:t>Server</a:t>
-              </a:r>
-              <a:endParaRPr kumimoji="1" lang="ja-JP" altLang="en-US" dirty="0">
-                <a:solidFill>
-                  <a:schemeClr val="tx1">
-                    <a:lumMod val="95000"/>
-                    <a:lumOff val="5000"/>
-                  </a:schemeClr>
-                </a:solidFill>
-              </a:endParaRPr>
-            </a:p>
-          </p:txBody>
-        </p:sp>
-        <p:sp>
-          <p:nvSpPr>
-            <p:cNvPr id="42" name="正方形/長方形 41"/>
-            <p:cNvSpPr/>
-            <p:nvPr/>
-          </p:nvSpPr>
-          <p:spPr>
-            <a:xfrm>
-              <a:off x="5076752" y="1055852"/>
-              <a:ext cx="1970065" cy="3529797"/>
-            </a:xfrm>
-            <a:prstGeom prst="rect">
-              <a:avLst/>
-            </a:prstGeom>
-            <a:noFill/>
-            <a:ln w="25400">
-              <a:solidFill>
-                <a:schemeClr val="accent4">
+                <a:schemeClr val="tx1">
                   <a:lumMod val="75000"/>
+                  <a:lumOff val="25000"/>
                 </a:schemeClr>
               </a:solidFill>
-            </a:ln>
-          </p:spPr>
-          <p:style>
-            <a:lnRef idx="1">
-              <a:schemeClr val="accent1"/>
-            </a:lnRef>
-            <a:fillRef idx="3">
-              <a:schemeClr val="accent1"/>
-            </a:fillRef>
-            <a:effectRef idx="2">
-              <a:schemeClr val="accent1"/>
-            </a:effectRef>
-            <a:fontRef idx="minor">
-              <a:schemeClr val="lt1"/>
-            </a:fontRef>
-          </p:style>
-          <p:txBody>
-            <a:bodyPr rtlCol="0" anchor="ctr"/>
-            <a:lstStyle/>
-            <a:p>
-              <a:pPr algn="ctr"/>
-              <a:endParaRPr kumimoji="1" lang="ja-JP" altLang="en-US"/>
-            </a:p>
-          </p:txBody>
-        </p:sp>
-        <p:sp>
-          <p:nvSpPr>
-            <p:cNvPr id="43" name="正方形/長方形 42"/>
-            <p:cNvSpPr/>
-            <p:nvPr/>
-          </p:nvSpPr>
-          <p:spPr>
-            <a:xfrm>
-              <a:off x="5076753" y="1110444"/>
-              <a:ext cx="997892" cy="369776"/>
-            </a:xfrm>
-            <a:prstGeom prst="rect">
-              <a:avLst/>
-            </a:prstGeom>
-            <a:noFill/>
-            <a:ln>
-              <a:noFill/>
-            </a:ln>
-          </p:spPr>
-          <p:style>
-            <a:lnRef idx="2">
-              <a:schemeClr val="accent1">
-                <a:shade val="50000"/>
+              <a:latin typeface="HGP創英角ｺﾞｼｯｸUB" panose="020B0900000000000000" pitchFamily="50" charset="-128"/>
+              <a:ea typeface="HGP創英角ｺﾞｼｯｸUB" panose="020B0900000000000000" pitchFamily="50" charset="-128"/>
+            </a:endParaRPr>
+          </a:p>
+        </p:txBody>
+      </p:sp>
+      <p:cxnSp>
+        <p:nvCxnSpPr>
+          <p:cNvPr id="52" name="直線矢印コネクタ 126"/>
+          <p:cNvCxnSpPr/>
+          <p:nvPr/>
+        </p:nvCxnSpPr>
+        <p:spPr bwMode="invGray">
+          <a:xfrm>
+            <a:off x="5796136" y="1909240"/>
+            <a:ext cx="0" cy="4464496"/>
+          </a:xfrm>
+          <a:prstGeom prst="straightConnector1">
+            <a:avLst/>
+          </a:prstGeom>
+          <a:ln w="50800">
+            <a:solidFill>
+              <a:schemeClr val="tx1">
+                <a:lumMod val="50000"/>
+                <a:lumOff val="50000"/>
               </a:schemeClr>
-            </a:lnRef>
-            <a:fillRef idx="1">
-              <a:schemeClr val="accent1"/>
-            </a:fillRef>
-            <a:effectRef idx="0">
-              <a:schemeClr val="accent1"/>
-            </a:effectRef>
-            <a:fontRef idx="minor">
-              <a:schemeClr val="lt1"/>
-            </a:fontRef>
-          </p:style>
-          <p:txBody>
-            <a:bodyPr rtlCol="0" anchor="t"/>
-            <a:lstStyle>
-              <a:defPPr>
-                <a:defRPr lang="ja-JP"/>
-              </a:defPPr>
-              <a:lvl1pPr marL="0" algn="l" defTabSz="457200" rtl="0" eaLnBrk="1" latinLnBrk="0" hangingPunct="1">
-                <a:defRPr kumimoji="1" sz="1800" kern="1200">
-                  <a:solidFill>
-                    <a:schemeClr val="lt1"/>
-                  </a:solidFill>
-                  <a:latin typeface="+mn-lt"/>
-                  <a:ea typeface="+mn-ea"/>
-                  <a:cs typeface="+mn-cs"/>
-                </a:defRPr>
-              </a:lvl1pPr>
-              <a:lvl2pPr marL="457200" algn="l" defTabSz="457200" rtl="0" eaLnBrk="1" latinLnBrk="0" hangingPunct="1">
-                <a:defRPr kumimoji="1" sz="1800" kern="1200">
-                  <a:solidFill>
-                    <a:schemeClr val="lt1"/>
-                  </a:solidFill>
-                  <a:latin typeface="+mn-lt"/>
-                  <a:ea typeface="+mn-ea"/>
-                  <a:cs typeface="+mn-cs"/>
-                </a:defRPr>
-              </a:lvl2pPr>
-              <a:lvl3pPr marL="914400" algn="l" defTabSz="457200" rtl="0" eaLnBrk="1" latinLnBrk="0" hangingPunct="1">
-                <a:defRPr kumimoji="1" sz="1800" kern="1200">
-                  <a:solidFill>
-                    <a:schemeClr val="lt1"/>
-                  </a:solidFill>
-                  <a:latin typeface="+mn-lt"/>
-                  <a:ea typeface="+mn-ea"/>
-                  <a:cs typeface="+mn-cs"/>
-                </a:defRPr>
-              </a:lvl3pPr>
-              <a:lvl4pPr marL="1371600" algn="l" defTabSz="457200" rtl="0" eaLnBrk="1" latinLnBrk="0" hangingPunct="1">
-                <a:defRPr kumimoji="1" sz="1800" kern="1200">
-                  <a:solidFill>
-                    <a:schemeClr val="lt1"/>
-                  </a:solidFill>
-                  <a:latin typeface="+mn-lt"/>
-                  <a:ea typeface="+mn-ea"/>
-                  <a:cs typeface="+mn-cs"/>
-                </a:defRPr>
-              </a:lvl4pPr>
-              <a:lvl5pPr marL="1828800" algn="l" defTabSz="457200" rtl="0" eaLnBrk="1" latinLnBrk="0" hangingPunct="1">
-                <a:defRPr kumimoji="1" sz="1800" kern="1200">
-                  <a:solidFill>
-                    <a:schemeClr val="lt1"/>
-                  </a:solidFill>
-                  <a:latin typeface="+mn-lt"/>
-                  <a:ea typeface="+mn-ea"/>
-                  <a:cs typeface="+mn-cs"/>
-                </a:defRPr>
-              </a:lvl5pPr>
-              <a:lvl6pPr marL="2286000" algn="l" defTabSz="457200" rtl="0" eaLnBrk="1" latinLnBrk="0" hangingPunct="1">
-                <a:defRPr kumimoji="1" sz="1800" kern="1200">
-                  <a:solidFill>
-                    <a:schemeClr val="lt1"/>
-                  </a:solidFill>
-                  <a:latin typeface="+mn-lt"/>
-                  <a:ea typeface="+mn-ea"/>
-                  <a:cs typeface="+mn-cs"/>
-                </a:defRPr>
-              </a:lvl6pPr>
-              <a:lvl7pPr marL="2743200" algn="l" defTabSz="457200" rtl="0" eaLnBrk="1" latinLnBrk="0" hangingPunct="1">
-                <a:defRPr kumimoji="1" sz="1800" kern="1200">
-                  <a:solidFill>
-                    <a:schemeClr val="lt1"/>
-                  </a:solidFill>
-                  <a:latin typeface="+mn-lt"/>
-                  <a:ea typeface="+mn-ea"/>
-                  <a:cs typeface="+mn-cs"/>
-                </a:defRPr>
-              </a:lvl7pPr>
-              <a:lvl8pPr marL="3200400" algn="l" defTabSz="457200" rtl="0" eaLnBrk="1" latinLnBrk="0" hangingPunct="1">
-                <a:defRPr kumimoji="1" sz="1800" kern="1200">
-                  <a:solidFill>
-                    <a:schemeClr val="lt1"/>
-                  </a:solidFill>
-                  <a:latin typeface="+mn-lt"/>
-                  <a:ea typeface="+mn-ea"/>
-                  <a:cs typeface="+mn-cs"/>
-                </a:defRPr>
-              </a:lvl8pPr>
-              <a:lvl9pPr marL="3657600" algn="l" defTabSz="457200" rtl="0" eaLnBrk="1" latinLnBrk="0" hangingPunct="1">
-                <a:defRPr kumimoji="1" sz="1800" kern="1200">
-                  <a:solidFill>
-                    <a:schemeClr val="lt1"/>
-                  </a:solidFill>
-                  <a:latin typeface="+mn-lt"/>
-                  <a:ea typeface="+mn-ea"/>
-                  <a:cs typeface="+mn-cs"/>
-                </a:defRPr>
-              </a:lvl9pPr>
-            </a:lstStyle>
-            <a:p>
-              <a:r>
-                <a:rPr kumimoji="1" lang="en-US" altLang="ja-JP" sz="1400" dirty="0" smtClean="0">
-                  <a:solidFill>
-                    <a:schemeClr val="tx1"/>
-                  </a:solidFill>
-                </a:rPr>
-                <a:t>session</a:t>
-              </a:r>
-              <a:endParaRPr kumimoji="1" lang="ja-JP" altLang="en-US" sz="1400" dirty="0">
-                <a:solidFill>
-                  <a:schemeClr val="tx1"/>
-                </a:solidFill>
-              </a:endParaRPr>
-            </a:p>
-          </p:txBody>
-        </p:sp>
-        <p:sp>
-          <p:nvSpPr>
-            <p:cNvPr id="44" name="フローチャート : 内部記憶 43"/>
-            <p:cNvSpPr/>
-            <p:nvPr/>
-          </p:nvSpPr>
-          <p:spPr>
-            <a:xfrm>
-              <a:off x="5265020" y="1374669"/>
-              <a:ext cx="1619249" cy="285750"/>
-            </a:xfrm>
-            <a:prstGeom prst="flowChartInternalStorage">
-              <a:avLst/>
-            </a:prstGeom>
-          </p:spPr>
-          <p:style>
-            <a:lnRef idx="1">
-              <a:schemeClr val="accent5"/>
-            </a:lnRef>
-            <a:fillRef idx="2">
-              <a:schemeClr val="accent5"/>
-            </a:fillRef>
-            <a:effectRef idx="1">
-              <a:schemeClr val="accent5"/>
-            </a:effectRef>
-            <a:fontRef idx="minor">
-              <a:schemeClr val="dk1"/>
-            </a:fontRef>
-          </p:style>
-          <p:txBody>
-            <a:bodyPr rtlCol="0" anchor="ctr"/>
-            <a:lstStyle>
-              <a:defPPr>
-                <a:defRPr lang="ja-JP"/>
-              </a:defPPr>
-              <a:lvl1pPr marL="0" algn="l" defTabSz="457200" rtl="0" eaLnBrk="1" latinLnBrk="0" hangingPunct="1">
-                <a:defRPr kumimoji="1" sz="1800" kern="1200">
-                  <a:solidFill>
-                    <a:schemeClr val="dk1"/>
-                  </a:solidFill>
-                  <a:latin typeface="+mn-lt"/>
-                  <a:ea typeface="+mn-ea"/>
-                  <a:cs typeface="+mn-cs"/>
-                </a:defRPr>
-              </a:lvl1pPr>
-              <a:lvl2pPr marL="457200" algn="l" defTabSz="457200" rtl="0" eaLnBrk="1" latinLnBrk="0" hangingPunct="1">
-                <a:defRPr kumimoji="1" sz="1800" kern="1200">
-                  <a:solidFill>
-                    <a:schemeClr val="dk1"/>
-                  </a:solidFill>
-                  <a:latin typeface="+mn-lt"/>
-                  <a:ea typeface="+mn-ea"/>
-                  <a:cs typeface="+mn-cs"/>
-                </a:defRPr>
-              </a:lvl2pPr>
-              <a:lvl3pPr marL="914400" algn="l" defTabSz="457200" rtl="0" eaLnBrk="1" latinLnBrk="0" hangingPunct="1">
-                <a:defRPr kumimoji="1" sz="1800" kern="1200">
-                  <a:solidFill>
-                    <a:schemeClr val="dk1"/>
-                  </a:solidFill>
-                  <a:latin typeface="+mn-lt"/>
-                  <a:ea typeface="+mn-ea"/>
-                  <a:cs typeface="+mn-cs"/>
-                </a:defRPr>
-              </a:lvl3pPr>
-              <a:lvl4pPr marL="1371600" algn="l" defTabSz="457200" rtl="0" eaLnBrk="1" latinLnBrk="0" hangingPunct="1">
-                <a:defRPr kumimoji="1" sz="1800" kern="1200">
-                  <a:solidFill>
-                    <a:schemeClr val="dk1"/>
-                  </a:solidFill>
-                  <a:latin typeface="+mn-lt"/>
-                  <a:ea typeface="+mn-ea"/>
-                  <a:cs typeface="+mn-cs"/>
-                </a:defRPr>
-              </a:lvl4pPr>
-              <a:lvl5pPr marL="1828800" algn="l" defTabSz="457200" rtl="0" eaLnBrk="1" latinLnBrk="0" hangingPunct="1">
-                <a:defRPr kumimoji="1" sz="1800" kern="1200">
-                  <a:solidFill>
-                    <a:schemeClr val="dk1"/>
-                  </a:solidFill>
-                  <a:latin typeface="+mn-lt"/>
-                  <a:ea typeface="+mn-ea"/>
-                  <a:cs typeface="+mn-cs"/>
-                </a:defRPr>
-              </a:lvl5pPr>
-              <a:lvl6pPr marL="2286000" algn="l" defTabSz="457200" rtl="0" eaLnBrk="1" latinLnBrk="0" hangingPunct="1">
-                <a:defRPr kumimoji="1" sz="1800" kern="1200">
-                  <a:solidFill>
-                    <a:schemeClr val="dk1"/>
-                  </a:solidFill>
-                  <a:latin typeface="+mn-lt"/>
-                  <a:ea typeface="+mn-ea"/>
-                  <a:cs typeface="+mn-cs"/>
-                </a:defRPr>
-              </a:lvl6pPr>
-              <a:lvl7pPr marL="2743200" algn="l" defTabSz="457200" rtl="0" eaLnBrk="1" latinLnBrk="0" hangingPunct="1">
-                <a:defRPr kumimoji="1" sz="1800" kern="1200">
-                  <a:solidFill>
-                    <a:schemeClr val="dk1"/>
-                  </a:solidFill>
-                  <a:latin typeface="+mn-lt"/>
-                  <a:ea typeface="+mn-ea"/>
-                  <a:cs typeface="+mn-cs"/>
-                </a:defRPr>
-              </a:lvl7pPr>
-              <a:lvl8pPr marL="3200400" algn="l" defTabSz="457200" rtl="0" eaLnBrk="1" latinLnBrk="0" hangingPunct="1">
-                <a:defRPr kumimoji="1" sz="1800" kern="1200">
-                  <a:solidFill>
-                    <a:schemeClr val="dk1"/>
-                  </a:solidFill>
-                  <a:latin typeface="+mn-lt"/>
-                  <a:ea typeface="+mn-ea"/>
-                  <a:cs typeface="+mn-cs"/>
-                </a:defRPr>
-              </a:lvl8pPr>
-              <a:lvl9pPr marL="3657600" algn="l" defTabSz="457200" rtl="0" eaLnBrk="1" latinLnBrk="0" hangingPunct="1">
-                <a:defRPr kumimoji="1" sz="1800" kern="1200">
-                  <a:solidFill>
-                    <a:schemeClr val="dk1"/>
-                  </a:solidFill>
-                  <a:latin typeface="+mn-lt"/>
-                  <a:ea typeface="+mn-ea"/>
-                  <a:cs typeface="+mn-cs"/>
-                </a:defRPr>
-              </a:lvl9pPr>
-            </a:lstStyle>
-            <a:p>
-              <a:pPr algn="ctr"/>
-              <a:r>
-                <a:rPr lang="en-US" altLang="ja-JP" sz="1600" b="1" dirty="0" err="1" smtClean="0">
-                  <a:solidFill>
-                    <a:srgbClr val="33CC33"/>
-                  </a:solidFill>
-                </a:rPr>
-                <a:t>xxxxxxxx</a:t>
-              </a:r>
-              <a:endParaRPr kumimoji="1" lang="ja-JP" altLang="en-US" sz="1600" dirty="0"/>
-            </a:p>
-          </p:txBody>
-        </p:sp>
-        <p:sp>
-          <p:nvSpPr>
-            <p:cNvPr id="51" name="正方形/長方形 50"/>
-            <p:cNvSpPr/>
-            <p:nvPr/>
-          </p:nvSpPr>
-          <p:spPr>
-            <a:xfrm>
-              <a:off x="5076753" y="698662"/>
-              <a:ext cx="1912777" cy="357190"/>
-            </a:xfrm>
-            <a:prstGeom prst="rect">
-              <a:avLst/>
-            </a:prstGeom>
-            <a:noFill/>
-            <a:ln>
-              <a:noFill/>
-            </a:ln>
-          </p:spPr>
-          <p:style>
-            <a:lnRef idx="2">
-              <a:schemeClr val="accent1">
-                <a:shade val="50000"/>
+            </a:solidFill>
+            <a:tailEnd type="none" w="lg" len="lg"/>
+          </a:ln>
+        </p:spPr>
+        <p:style>
+          <a:lnRef idx="1">
+            <a:schemeClr val="accent1"/>
+          </a:lnRef>
+          <a:fillRef idx="0">
+            <a:schemeClr val="accent1"/>
+          </a:fillRef>
+          <a:effectRef idx="0">
+            <a:schemeClr val="accent1"/>
+          </a:effectRef>
+          <a:fontRef idx="minor">
+            <a:schemeClr val="tx1"/>
+          </a:fontRef>
+        </p:style>
+      </p:cxnSp>
+      <p:cxnSp>
+        <p:nvCxnSpPr>
+          <p:cNvPr id="53" name="直線矢印コネクタ 126"/>
+          <p:cNvCxnSpPr/>
+          <p:nvPr/>
+        </p:nvCxnSpPr>
+        <p:spPr bwMode="invGray">
+          <a:xfrm>
+            <a:off x="2105584" y="2269812"/>
+            <a:ext cx="3690552" cy="0"/>
+          </a:xfrm>
+          <a:prstGeom prst="straightConnector1">
+            <a:avLst/>
+          </a:prstGeom>
+          <a:ln w="25400">
+            <a:solidFill>
+              <a:schemeClr val="tx2">
+                <a:lumMod val="40000"/>
+                <a:lumOff val="60000"/>
               </a:schemeClr>
-            </a:lnRef>
-            <a:fillRef idx="1">
-              <a:schemeClr val="accent1"/>
-            </a:fillRef>
-            <a:effectRef idx="0">
-              <a:schemeClr val="accent1"/>
-            </a:effectRef>
-            <a:fontRef idx="minor">
-              <a:schemeClr val="lt1"/>
-            </a:fontRef>
-          </p:style>
-          <p:txBody>
-            <a:bodyPr rtlCol="0" anchor="ctr"/>
-            <a:lstStyle/>
-            <a:p>
-              <a:r>
-                <a:rPr lang="en-US" altLang="ja-JP" b="1" dirty="0" smtClean="0">
-                  <a:solidFill>
-                    <a:srgbClr val="7030A0"/>
-                  </a:solidFill>
-                </a:rPr>
-                <a:t>CSRF token check</a:t>
-              </a:r>
-              <a:endParaRPr kumimoji="1" lang="ja-JP" altLang="en-US" b="1" dirty="0">
-                <a:solidFill>
-                  <a:srgbClr val="7030A0"/>
-                </a:solidFill>
-              </a:endParaRPr>
-            </a:p>
-          </p:txBody>
-        </p:sp>
-        <p:sp>
-          <p:nvSpPr>
-            <p:cNvPr id="27" name="角丸四角形 26"/>
-            <p:cNvSpPr/>
-            <p:nvPr/>
-          </p:nvSpPr>
-          <p:spPr>
-            <a:xfrm>
-              <a:off x="1570285" y="233266"/>
-              <a:ext cx="2007198" cy="4720871"/>
-            </a:xfrm>
-            <a:prstGeom prst="roundRect">
-              <a:avLst/>
-            </a:prstGeom>
-          </p:spPr>
-          <p:style>
-            <a:lnRef idx="1">
-              <a:schemeClr val="accent1"/>
-            </a:lnRef>
-            <a:fillRef idx="2">
-              <a:schemeClr val="accent1"/>
-            </a:fillRef>
-            <a:effectRef idx="1">
-              <a:schemeClr val="accent1"/>
-            </a:effectRef>
-            <a:fontRef idx="minor">
-              <a:schemeClr val="dk1"/>
-            </a:fontRef>
-          </p:style>
-          <p:txBody>
-            <a:bodyPr rtlCol="0" anchor="t"/>
-            <a:lstStyle/>
-            <a:p>
-              <a:pPr algn="ctr"/>
-              <a:r>
-                <a:rPr kumimoji="1" lang="en-US" altLang="ja-JP" dirty="0" smtClean="0">
-                  <a:solidFill>
-                    <a:schemeClr val="tx1">
-                      <a:lumMod val="95000"/>
-                      <a:lumOff val="5000"/>
-                    </a:schemeClr>
-                  </a:solidFill>
-                </a:rPr>
-                <a:t>Client</a:t>
-              </a:r>
-              <a:endParaRPr kumimoji="1" lang="ja-JP" altLang="en-US" dirty="0">
-                <a:solidFill>
-                  <a:schemeClr val="tx1">
-                    <a:lumMod val="95000"/>
-                    <a:lumOff val="5000"/>
-                  </a:schemeClr>
-                </a:solidFill>
-              </a:endParaRPr>
-            </a:p>
-          </p:txBody>
-        </p:sp>
-        <p:cxnSp>
-          <p:nvCxnSpPr>
-            <p:cNvPr id="30" name="直線矢印コネクタ 29"/>
-            <p:cNvCxnSpPr/>
-            <p:nvPr/>
-          </p:nvCxnSpPr>
-          <p:spPr>
-            <a:xfrm>
-              <a:off x="3557569" y="2542032"/>
-              <a:ext cx="3702631" cy="1588"/>
-            </a:xfrm>
-            <a:prstGeom prst="straightConnector1">
-              <a:avLst/>
-            </a:prstGeom>
-            <a:ln>
-              <a:prstDash val="sysDash"/>
-              <a:tailEnd type="arrow"/>
-            </a:ln>
-          </p:spPr>
-          <p:style>
-            <a:lnRef idx="2">
-              <a:schemeClr val="accent1"/>
-            </a:lnRef>
-            <a:fillRef idx="0">
-              <a:schemeClr val="accent1"/>
-            </a:fillRef>
-            <a:effectRef idx="1">
-              <a:schemeClr val="accent1"/>
-            </a:effectRef>
-            <a:fontRef idx="minor">
-              <a:schemeClr val="tx1"/>
-            </a:fontRef>
-          </p:style>
-        </p:cxnSp>
-        <p:sp>
-          <p:nvSpPr>
-            <p:cNvPr id="32" name="正方形/長方形 31"/>
-            <p:cNvSpPr/>
-            <p:nvPr/>
-          </p:nvSpPr>
-          <p:spPr>
-            <a:xfrm>
-              <a:off x="3665724" y="2184842"/>
-              <a:ext cx="1912777" cy="357190"/>
-            </a:xfrm>
-            <a:prstGeom prst="rect">
-              <a:avLst/>
-            </a:prstGeom>
-            <a:noFill/>
-            <a:ln>
-              <a:noFill/>
-            </a:ln>
-          </p:spPr>
-          <p:style>
-            <a:lnRef idx="2">
-              <a:schemeClr val="accent1">
-                <a:shade val="50000"/>
+            </a:solidFill>
+            <a:tailEnd type="triangle" w="lg" len="lg"/>
+          </a:ln>
+        </p:spPr>
+        <p:style>
+          <a:lnRef idx="1">
+            <a:schemeClr val="accent1"/>
+          </a:lnRef>
+          <a:fillRef idx="0">
+            <a:schemeClr val="accent1"/>
+          </a:fillRef>
+          <a:effectRef idx="0">
+            <a:schemeClr val="accent1"/>
+          </a:effectRef>
+          <a:fontRef idx="minor">
+            <a:schemeClr val="tx1"/>
+          </a:fontRef>
+        </p:style>
+      </p:cxnSp>
+      <p:cxnSp>
+        <p:nvCxnSpPr>
+          <p:cNvPr id="54" name="直線矢印コネクタ 126"/>
+          <p:cNvCxnSpPr/>
+          <p:nvPr/>
+        </p:nvCxnSpPr>
+        <p:spPr bwMode="invGray">
+          <a:xfrm>
+            <a:off x="2081092" y="2768895"/>
+            <a:ext cx="3705519" cy="12033"/>
+          </a:xfrm>
+          <a:prstGeom prst="straightConnector1">
+            <a:avLst/>
+          </a:prstGeom>
+          <a:ln w="25400">
+            <a:solidFill>
+              <a:schemeClr val="tx2">
+                <a:lumMod val="40000"/>
+                <a:lumOff val="60000"/>
               </a:schemeClr>
-            </a:lnRef>
-            <a:fillRef idx="1">
-              <a:schemeClr val="accent1"/>
-            </a:fillRef>
-            <a:effectRef idx="0">
-              <a:schemeClr val="accent1"/>
-            </a:effectRef>
-            <a:fontRef idx="minor">
-              <a:schemeClr val="lt1"/>
-            </a:fontRef>
-          </p:style>
-          <p:txBody>
-            <a:bodyPr rtlCol="0" anchor="ctr"/>
-            <a:lstStyle/>
-            <a:p>
-              <a:r>
-                <a:rPr lang="en-US" altLang="ja-JP" b="1" dirty="0" smtClean="0">
-                  <a:solidFill>
-                    <a:schemeClr val="tx1"/>
-                  </a:solidFill>
-                </a:rPr>
-                <a:t>GET</a:t>
-              </a:r>
-              <a:endParaRPr kumimoji="1" lang="ja-JP" altLang="en-US" b="1" dirty="0">
-                <a:solidFill>
-                  <a:schemeClr val="tx1"/>
-                </a:solidFill>
-              </a:endParaRPr>
-            </a:p>
-          </p:txBody>
-        </p:sp>
-        <p:cxnSp>
-          <p:nvCxnSpPr>
-            <p:cNvPr id="33" name="直線矢印コネクタ 32"/>
-            <p:cNvCxnSpPr/>
-            <p:nvPr/>
-          </p:nvCxnSpPr>
-          <p:spPr>
-            <a:xfrm>
-              <a:off x="3571217" y="3118019"/>
-              <a:ext cx="3702631" cy="0"/>
-            </a:xfrm>
-            <a:prstGeom prst="straightConnector1">
-              <a:avLst/>
-            </a:prstGeom>
-            <a:ln>
-              <a:tailEnd type="arrow"/>
-            </a:ln>
-          </p:spPr>
-          <p:style>
-            <a:lnRef idx="2">
-              <a:schemeClr val="accent1"/>
-            </a:lnRef>
-            <a:fillRef idx="0">
-              <a:schemeClr val="accent1"/>
-            </a:fillRef>
-            <a:effectRef idx="1">
-              <a:schemeClr val="accent1"/>
-            </a:effectRef>
-            <a:fontRef idx="minor">
-              <a:schemeClr val="tx1"/>
-            </a:fontRef>
-          </p:style>
-        </p:cxnSp>
-        <p:cxnSp>
-          <p:nvCxnSpPr>
-            <p:cNvPr id="35" name="直線矢印コネクタ 34"/>
-            <p:cNvCxnSpPr/>
-            <p:nvPr/>
-          </p:nvCxnSpPr>
-          <p:spPr>
-            <a:xfrm>
-              <a:off x="3571217" y="3657600"/>
-              <a:ext cx="3702631" cy="0"/>
-            </a:xfrm>
-            <a:prstGeom prst="straightConnector1">
-              <a:avLst/>
-            </a:prstGeom>
-            <a:ln>
-              <a:tailEnd type="arrow"/>
-            </a:ln>
-          </p:spPr>
-          <p:style>
-            <a:lnRef idx="2">
-              <a:schemeClr val="accent1"/>
-            </a:lnRef>
-            <a:fillRef idx="0">
-              <a:schemeClr val="accent1"/>
-            </a:fillRef>
-            <a:effectRef idx="1">
-              <a:schemeClr val="accent1"/>
-            </a:effectRef>
-            <a:fontRef idx="minor">
-              <a:schemeClr val="tx1"/>
-            </a:fontRef>
-          </p:style>
-        </p:cxnSp>
-        <p:cxnSp>
-          <p:nvCxnSpPr>
-            <p:cNvPr id="36" name="直線矢印コネクタ 35"/>
-            <p:cNvCxnSpPr/>
-            <p:nvPr/>
-          </p:nvCxnSpPr>
-          <p:spPr>
-            <a:xfrm>
-              <a:off x="3571217" y="4208106"/>
-              <a:ext cx="3702631" cy="0"/>
-            </a:xfrm>
-            <a:prstGeom prst="straightConnector1">
-              <a:avLst/>
-            </a:prstGeom>
-            <a:ln>
-              <a:tailEnd type="arrow"/>
-            </a:ln>
-          </p:spPr>
-          <p:style>
-            <a:lnRef idx="2">
-              <a:schemeClr val="accent1"/>
-            </a:lnRef>
-            <a:fillRef idx="0">
-              <a:schemeClr val="accent1"/>
-            </a:fillRef>
-            <a:effectRef idx="1">
-              <a:schemeClr val="accent1"/>
-            </a:effectRef>
-            <a:fontRef idx="minor">
-              <a:schemeClr val="tx1"/>
-            </a:fontRef>
-          </p:style>
-        </p:cxnSp>
-        <p:sp>
-          <p:nvSpPr>
-            <p:cNvPr id="39" name="正方形/長方形 38"/>
-            <p:cNvSpPr/>
-            <p:nvPr/>
-          </p:nvSpPr>
-          <p:spPr>
-            <a:xfrm>
-              <a:off x="5464068" y="2184842"/>
-              <a:ext cx="1276616" cy="357190"/>
-            </a:xfrm>
-            <a:prstGeom prst="rect">
-              <a:avLst/>
-            </a:prstGeom>
-            <a:noFill/>
-            <a:ln>
-              <a:noFill/>
-            </a:ln>
-          </p:spPr>
-          <p:style>
-            <a:lnRef idx="2">
-              <a:schemeClr val="accent1">
-                <a:shade val="50000"/>
+            </a:solidFill>
+            <a:prstDash val="sysDash"/>
+            <a:headEnd type="triangle" w="lg" len="lg"/>
+            <a:tailEnd type="none" w="lg" len="med"/>
+          </a:ln>
+        </p:spPr>
+        <p:style>
+          <a:lnRef idx="1">
+            <a:schemeClr val="accent1"/>
+          </a:lnRef>
+          <a:fillRef idx="0">
+            <a:schemeClr val="accent1"/>
+          </a:fillRef>
+          <a:effectRef idx="0">
+            <a:schemeClr val="accent1"/>
+          </a:effectRef>
+          <a:fontRef idx="minor">
+            <a:schemeClr val="tx1"/>
+          </a:fontRef>
+        </p:style>
+      </p:cxnSp>
+      <p:sp>
+        <p:nvSpPr>
+          <p:cNvPr id="57" name="テキスト ボックス 56"/>
+          <p:cNvSpPr txBox="1"/>
+          <p:nvPr/>
+        </p:nvSpPr>
+        <p:spPr>
+          <a:xfrm>
+            <a:off x="1932289" y="2401559"/>
+            <a:ext cx="3648174" cy="369332"/>
+          </a:xfrm>
+          <a:prstGeom prst="rect">
+            <a:avLst/>
+          </a:prstGeom>
+          <a:noFill/>
+        </p:spPr>
+        <p:txBody>
+          <a:bodyPr wrap="square" rtlCol="0">
+            <a:spAutoFit/>
+          </a:bodyPr>
+          <a:lstStyle/>
+          <a:p>
+            <a:pPr algn="ctr"/>
+            <a:r>
+              <a:rPr kumimoji="1" lang="en-US" altLang="ja-JP" b="1" dirty="0" smtClean="0">
+                <a:solidFill>
+                  <a:schemeClr val="tx1">
+                    <a:lumMod val="75000"/>
+                    <a:lumOff val="25000"/>
+                  </a:schemeClr>
+                </a:solidFill>
+                <a:latin typeface="HGP創英角ｺﾞｼｯｸUB" panose="020B0900000000000000" pitchFamily="50" charset="-128"/>
+                <a:ea typeface="HGP創英角ｺﾞｼｯｸUB" panose="020B0900000000000000" pitchFamily="50" charset="-128"/>
+              </a:rPr>
+              <a:t>CSRF token</a:t>
+            </a:r>
+            <a:r>
+              <a:rPr lang="en-US" altLang="ja-JP" b="1" dirty="0" smtClean="0">
+                <a:solidFill>
+                  <a:schemeClr val="tx1">
+                    <a:lumMod val="75000"/>
+                    <a:lumOff val="25000"/>
+                  </a:schemeClr>
+                </a:solidFill>
+                <a:latin typeface="HGP創英角ｺﾞｼｯｸUB" panose="020B0900000000000000" pitchFamily="50" charset="-128"/>
+                <a:ea typeface="HGP創英角ｺﾞｼｯｸUB" panose="020B0900000000000000" pitchFamily="50" charset="-128"/>
+              </a:rPr>
+              <a:t>=</a:t>
+            </a:r>
+            <a:r>
+              <a:rPr lang="en-US" altLang="ja-JP" b="1" dirty="0" err="1" smtClean="0">
+                <a:solidFill>
+                  <a:schemeClr val="tx1">
+                    <a:lumMod val="75000"/>
+                    <a:lumOff val="25000"/>
+                  </a:schemeClr>
+                </a:solidFill>
+                <a:latin typeface="HGP創英角ｺﾞｼｯｸUB" panose="020B0900000000000000" pitchFamily="50" charset="-128"/>
+                <a:ea typeface="HGP創英角ｺﾞｼｯｸUB" panose="020B0900000000000000" pitchFamily="50" charset="-128"/>
+              </a:rPr>
+              <a:t>yyy</a:t>
+            </a:r>
+            <a:r>
+              <a:rPr kumimoji="1" lang="en-US" altLang="ja-JP" b="1" dirty="0" smtClean="0">
+                <a:solidFill>
+                  <a:schemeClr val="tx1">
+                    <a:lumMod val="75000"/>
+                    <a:lumOff val="25000"/>
+                  </a:schemeClr>
+                </a:solidFill>
+                <a:latin typeface="HGP創英角ｺﾞｼｯｸUB" panose="020B0900000000000000" pitchFamily="50" charset="-128"/>
+                <a:ea typeface="HGP創英角ｺﾞｼｯｸUB" panose="020B0900000000000000" pitchFamily="50" charset="-128"/>
+              </a:rPr>
+              <a:t>(hidden)</a:t>
+            </a:r>
+            <a:endParaRPr kumimoji="1" lang="ja-JP" altLang="en-US" b="1" dirty="0">
+              <a:solidFill>
+                <a:schemeClr val="tx1">
+                  <a:lumMod val="75000"/>
+                  <a:lumOff val="25000"/>
+                </a:schemeClr>
+              </a:solidFill>
+              <a:latin typeface="HGP創英角ｺﾞｼｯｸUB" panose="020B0900000000000000" pitchFamily="50" charset="-128"/>
+              <a:ea typeface="HGP創英角ｺﾞｼｯｸUB" panose="020B0900000000000000" pitchFamily="50" charset="-128"/>
+            </a:endParaRPr>
+          </a:p>
+        </p:txBody>
+      </p:sp>
+      <p:sp>
+        <p:nvSpPr>
+          <p:cNvPr id="13" name="角丸四角形 12"/>
+          <p:cNvSpPr/>
+          <p:nvPr/>
+        </p:nvSpPr>
+        <p:spPr>
+          <a:xfrm>
+            <a:off x="6960802" y="1501574"/>
+            <a:ext cx="1336564" cy="4440113"/>
+          </a:xfrm>
+          <a:prstGeom prst="roundRect">
+            <a:avLst/>
+          </a:prstGeom>
+          <a:solidFill>
+            <a:schemeClr val="accent2"/>
+          </a:solidFill>
+          <a:ln>
+            <a:solidFill>
+              <a:schemeClr val="accent2"/>
+            </a:solidFill>
+          </a:ln>
+        </p:spPr>
+        <p:style>
+          <a:lnRef idx="2">
+            <a:schemeClr val="accent2"/>
+          </a:lnRef>
+          <a:fillRef idx="1">
+            <a:schemeClr val="lt1"/>
+          </a:fillRef>
+          <a:effectRef idx="0">
+            <a:schemeClr val="accent2"/>
+          </a:effectRef>
+          <a:fontRef idx="minor">
+            <a:schemeClr val="dk1"/>
+          </a:fontRef>
+        </p:style>
+        <p:txBody>
+          <a:bodyPr rtlCol="0" anchor="t" anchorCtr="0"/>
+          <a:lstStyle/>
+          <a:p>
+            <a:pPr algn="ctr"/>
+            <a:r>
+              <a:rPr kumimoji="1" lang="en-US" altLang="ja-JP" b="1" dirty="0" smtClean="0">
+                <a:solidFill>
+                  <a:schemeClr val="bg1"/>
+                </a:solidFill>
+                <a:latin typeface="HGP創英角ｺﾞｼｯｸUB" panose="020B0900000000000000" pitchFamily="50" charset="-128"/>
+                <a:ea typeface="HGP創英角ｺﾞｼｯｸUB" panose="020B0900000000000000" pitchFamily="50" charset="-128"/>
+              </a:rPr>
+              <a:t>HTTP</a:t>
+            </a:r>
+          </a:p>
+          <a:p>
+            <a:pPr algn="ctr"/>
+            <a:r>
+              <a:rPr lang="en-US" altLang="ja-JP" b="1" dirty="0" smtClean="0">
+                <a:solidFill>
+                  <a:schemeClr val="bg1"/>
+                </a:solidFill>
+                <a:latin typeface="HGP創英角ｺﾞｼｯｸUB" panose="020B0900000000000000" pitchFamily="50" charset="-128"/>
+                <a:ea typeface="HGP創英角ｺﾞｼｯｸUB" panose="020B0900000000000000" pitchFamily="50" charset="-128"/>
+              </a:rPr>
+              <a:t>Session</a:t>
+            </a:r>
+            <a:endParaRPr kumimoji="1" lang="ja-JP" altLang="en-US" b="1" dirty="0">
+              <a:solidFill>
+                <a:schemeClr val="bg1"/>
+              </a:solidFill>
+              <a:latin typeface="HGP創英角ｺﾞｼｯｸUB" panose="020B0900000000000000" pitchFamily="50" charset="-128"/>
+              <a:ea typeface="HGP創英角ｺﾞｼｯｸUB" panose="020B0900000000000000" pitchFamily="50" charset="-128"/>
+            </a:endParaRPr>
+          </a:p>
+        </p:txBody>
+      </p:sp>
+      <p:sp>
+        <p:nvSpPr>
+          <p:cNvPr id="14" name="角丸四角形 13"/>
+          <p:cNvSpPr/>
+          <p:nvPr/>
+        </p:nvSpPr>
+        <p:spPr>
+          <a:xfrm>
+            <a:off x="7121547" y="2286397"/>
+            <a:ext cx="1031803" cy="3458317"/>
+          </a:xfrm>
+          <a:prstGeom prst="roundRect">
+            <a:avLst/>
+          </a:prstGeom>
+          <a:solidFill>
+            <a:schemeClr val="accent6">
+              <a:lumMod val="60000"/>
+              <a:lumOff val="40000"/>
+            </a:schemeClr>
+          </a:solidFill>
+          <a:ln>
+            <a:solidFill>
+              <a:schemeClr val="accent6">
+                <a:lumMod val="60000"/>
+                <a:lumOff val="40000"/>
               </a:schemeClr>
-            </a:lnRef>
-            <a:fillRef idx="1">
-              <a:schemeClr val="accent1"/>
-            </a:fillRef>
-            <a:effectRef idx="0">
-              <a:schemeClr val="accent1"/>
-            </a:effectRef>
-            <a:fontRef idx="minor">
-              <a:schemeClr val="lt1"/>
-            </a:fontRef>
-          </p:style>
-          <p:txBody>
-            <a:bodyPr rtlCol="0" anchor="ctr"/>
-            <a:lstStyle/>
-            <a:p>
-              <a:pPr algn="ctr"/>
-              <a:r>
-                <a:rPr lang="en-US" altLang="ja-JP" b="1" dirty="0" smtClean="0">
-                  <a:solidFill>
-                    <a:schemeClr val="tx1"/>
-                  </a:solidFill>
-                </a:rPr>
-                <a:t>No check</a:t>
-              </a:r>
-              <a:endParaRPr kumimoji="1" lang="ja-JP" altLang="en-US" b="1" dirty="0">
-                <a:solidFill>
-                  <a:schemeClr val="tx1"/>
-                </a:solidFill>
-              </a:endParaRPr>
-            </a:p>
-          </p:txBody>
-        </p:sp>
-        <p:sp>
-          <p:nvSpPr>
-            <p:cNvPr id="41" name="正方形/長方形 40"/>
-            <p:cNvSpPr/>
-            <p:nvPr/>
-          </p:nvSpPr>
-          <p:spPr>
-            <a:xfrm>
-              <a:off x="5464068" y="2760829"/>
-              <a:ext cx="1276616" cy="357190"/>
-            </a:xfrm>
-            <a:prstGeom prst="rect">
-              <a:avLst/>
-            </a:prstGeom>
-            <a:noFill/>
-            <a:ln>
-              <a:noFill/>
-            </a:ln>
-          </p:spPr>
-          <p:style>
-            <a:lnRef idx="2">
-              <a:schemeClr val="accent1">
-                <a:shade val="50000"/>
+            </a:solidFill>
+          </a:ln>
+        </p:spPr>
+        <p:style>
+          <a:lnRef idx="2">
+            <a:schemeClr val="accent2"/>
+          </a:lnRef>
+          <a:fillRef idx="1">
+            <a:schemeClr val="lt1"/>
+          </a:fillRef>
+          <a:effectRef idx="0">
+            <a:schemeClr val="accent2"/>
+          </a:effectRef>
+          <a:fontRef idx="minor">
+            <a:schemeClr val="dk1"/>
+          </a:fontRef>
+        </p:style>
+        <p:txBody>
+          <a:bodyPr rtlCol="0" anchor="ctr"/>
+          <a:lstStyle/>
+          <a:p>
+            <a:pPr algn="ctr"/>
+            <a:r>
+              <a:rPr kumimoji="1" lang="en-US" altLang="ja-JP" sz="1600" b="1" dirty="0" smtClean="0">
+                <a:solidFill>
+                  <a:schemeClr val="tx1">
+                    <a:lumMod val="75000"/>
+                    <a:lumOff val="25000"/>
+                  </a:schemeClr>
+                </a:solidFill>
+                <a:latin typeface="HGP創英角ｺﾞｼｯｸUB" panose="020B0900000000000000" pitchFamily="50" charset="-128"/>
+                <a:ea typeface="HGP創英角ｺﾞｼｯｸUB" panose="020B0900000000000000" pitchFamily="50" charset="-128"/>
+              </a:rPr>
+              <a:t>CSRF</a:t>
+            </a:r>
+          </a:p>
+          <a:p>
+            <a:pPr algn="ctr"/>
+            <a:r>
+              <a:rPr lang="en-US" altLang="ja-JP" sz="1600" b="1" dirty="0" smtClean="0">
+                <a:solidFill>
+                  <a:schemeClr val="tx1">
+                    <a:lumMod val="75000"/>
+                    <a:lumOff val="25000"/>
+                  </a:schemeClr>
+                </a:solidFill>
+                <a:latin typeface="HGP創英角ｺﾞｼｯｸUB" panose="020B0900000000000000" pitchFamily="50" charset="-128"/>
+                <a:ea typeface="HGP創英角ｺﾞｼｯｸUB" panose="020B0900000000000000" pitchFamily="50" charset="-128"/>
+              </a:rPr>
+              <a:t>token</a:t>
+            </a:r>
+          </a:p>
+          <a:p>
+            <a:pPr algn="ctr"/>
+            <a:endParaRPr lang="en-US" altLang="ja-JP" sz="1600" b="1" dirty="0">
+              <a:solidFill>
+                <a:schemeClr val="tx1">
+                  <a:lumMod val="75000"/>
+                  <a:lumOff val="25000"/>
+                </a:schemeClr>
+              </a:solidFill>
+              <a:latin typeface="HGP創英角ｺﾞｼｯｸUB" panose="020B0900000000000000" pitchFamily="50" charset="-128"/>
+              <a:ea typeface="HGP創英角ｺﾞｼｯｸUB" panose="020B0900000000000000" pitchFamily="50" charset="-128"/>
+            </a:endParaRPr>
+          </a:p>
+          <a:p>
+            <a:pPr algn="ctr"/>
+            <a:r>
+              <a:rPr lang="en-US" altLang="ja-JP" sz="1600" b="1" dirty="0">
+                <a:solidFill>
+                  <a:schemeClr val="tx1">
+                    <a:lumMod val="75000"/>
+                    <a:lumOff val="25000"/>
+                  </a:schemeClr>
+                </a:solidFill>
+                <a:latin typeface="HGP創英角ｺﾞｼｯｸUB" panose="020B0900000000000000" pitchFamily="50" charset="-128"/>
+                <a:ea typeface="HGP創英角ｺﾞｼｯｸUB" panose="020B0900000000000000" pitchFamily="50" charset="-128"/>
+              </a:rPr>
+              <a:t>v</a:t>
+            </a:r>
+            <a:r>
+              <a:rPr lang="en-US" altLang="ja-JP" sz="1600" b="1" dirty="0" smtClean="0">
+                <a:solidFill>
+                  <a:schemeClr val="tx1">
+                    <a:lumMod val="75000"/>
+                    <a:lumOff val="25000"/>
+                  </a:schemeClr>
+                </a:solidFill>
+                <a:latin typeface="HGP創英角ｺﾞｼｯｸUB" panose="020B0900000000000000" pitchFamily="50" charset="-128"/>
+                <a:ea typeface="HGP創英角ｺﾞｼｯｸUB" panose="020B0900000000000000" pitchFamily="50" charset="-128"/>
+              </a:rPr>
+              <a:t>alue</a:t>
+            </a:r>
+          </a:p>
+          <a:p>
+            <a:pPr algn="ctr"/>
+            <a:r>
+              <a:rPr lang="en-US" altLang="ja-JP" sz="1600" b="1" dirty="0">
+                <a:solidFill>
+                  <a:schemeClr val="tx1">
+                    <a:lumMod val="75000"/>
+                    <a:lumOff val="25000"/>
+                  </a:schemeClr>
+                </a:solidFill>
+                <a:latin typeface="HGP創英角ｺﾞｼｯｸUB" panose="020B0900000000000000" pitchFamily="50" charset="-128"/>
+                <a:ea typeface="HGP創英角ｺﾞｼｯｸUB" panose="020B0900000000000000" pitchFamily="50" charset="-128"/>
+              </a:rPr>
+              <a:t> </a:t>
+            </a:r>
+            <a:r>
+              <a:rPr lang="en-US" altLang="ja-JP" sz="1600" b="1" dirty="0" smtClean="0">
+                <a:solidFill>
+                  <a:schemeClr val="tx1">
+                    <a:lumMod val="75000"/>
+                    <a:lumOff val="25000"/>
+                  </a:schemeClr>
+                </a:solidFill>
+                <a:latin typeface="HGP創英角ｺﾞｼｯｸUB" panose="020B0900000000000000" pitchFamily="50" charset="-128"/>
+                <a:ea typeface="HGP創英角ｺﾞｼｯｸUB" panose="020B0900000000000000" pitchFamily="50" charset="-128"/>
+              </a:rPr>
+              <a:t> = </a:t>
+            </a:r>
+            <a:r>
+              <a:rPr lang="en-US" altLang="ja-JP" sz="1600" b="1" dirty="0" err="1" smtClean="0">
+                <a:solidFill>
+                  <a:schemeClr val="tx1">
+                    <a:lumMod val="75000"/>
+                    <a:lumOff val="25000"/>
+                  </a:schemeClr>
+                </a:solidFill>
+                <a:latin typeface="HGP創英角ｺﾞｼｯｸUB" panose="020B0900000000000000" pitchFamily="50" charset="-128"/>
+                <a:ea typeface="HGP創英角ｺﾞｼｯｸUB" panose="020B0900000000000000" pitchFamily="50" charset="-128"/>
+              </a:rPr>
+              <a:t>yyy</a:t>
+            </a:r>
+            <a:endParaRPr lang="en-US" altLang="ja-JP" sz="1600" b="1" dirty="0" smtClean="0">
+              <a:solidFill>
+                <a:schemeClr val="tx1">
+                  <a:lumMod val="75000"/>
+                  <a:lumOff val="25000"/>
+                </a:schemeClr>
+              </a:solidFill>
+              <a:latin typeface="HGP創英角ｺﾞｼｯｸUB" panose="020B0900000000000000" pitchFamily="50" charset="-128"/>
+              <a:ea typeface="HGP創英角ｺﾞｼｯｸUB" panose="020B0900000000000000" pitchFamily="50" charset="-128"/>
+            </a:endParaRPr>
+          </a:p>
+        </p:txBody>
+      </p:sp>
+      <p:cxnSp>
+        <p:nvCxnSpPr>
+          <p:cNvPr id="63" name="直線矢印コネクタ 126"/>
+          <p:cNvCxnSpPr/>
+          <p:nvPr/>
+        </p:nvCxnSpPr>
+        <p:spPr bwMode="invGray">
+          <a:xfrm>
+            <a:off x="5786611" y="2544436"/>
+            <a:ext cx="1334936" cy="0"/>
+          </a:xfrm>
+          <a:prstGeom prst="straightConnector1">
+            <a:avLst/>
+          </a:prstGeom>
+          <a:ln w="25400">
+            <a:solidFill>
+              <a:schemeClr val="tx2">
+                <a:lumMod val="40000"/>
+                <a:lumOff val="60000"/>
               </a:schemeClr>
-            </a:lnRef>
-            <a:fillRef idx="1">
-              <a:schemeClr val="accent1"/>
-            </a:fillRef>
-            <a:effectRef idx="0">
-              <a:schemeClr val="accent1"/>
-            </a:effectRef>
-            <a:fontRef idx="minor">
-              <a:schemeClr val="lt1"/>
-            </a:fontRef>
-          </p:style>
-          <p:txBody>
-            <a:bodyPr rtlCol="0" anchor="ctr"/>
-            <a:lstStyle/>
-            <a:p>
-              <a:pPr algn="ctr"/>
-              <a:r>
-                <a:rPr lang="en-US" altLang="ja-JP" b="1" dirty="0" smtClean="0">
-                  <a:solidFill>
-                    <a:srgbClr val="C00000"/>
-                  </a:solidFill>
-                </a:rPr>
-                <a:t>check</a:t>
-              </a:r>
-              <a:endParaRPr kumimoji="1" lang="ja-JP" altLang="en-US" b="1" dirty="0">
-                <a:solidFill>
-                  <a:srgbClr val="C00000"/>
-                </a:solidFill>
-              </a:endParaRPr>
-            </a:p>
-          </p:txBody>
-        </p:sp>
-        <p:sp>
-          <p:nvSpPr>
-            <p:cNvPr id="45" name="正方形/長方形 44"/>
-            <p:cNvSpPr/>
-            <p:nvPr/>
-          </p:nvSpPr>
-          <p:spPr>
-            <a:xfrm>
-              <a:off x="5464068" y="3300410"/>
-              <a:ext cx="1276616" cy="357190"/>
-            </a:xfrm>
-            <a:prstGeom prst="rect">
-              <a:avLst/>
-            </a:prstGeom>
-            <a:noFill/>
-            <a:ln>
-              <a:noFill/>
-            </a:ln>
-          </p:spPr>
-          <p:style>
-            <a:lnRef idx="2">
-              <a:schemeClr val="accent1">
-                <a:shade val="50000"/>
+            </a:solidFill>
+            <a:tailEnd type="triangle" w="lg" len="lg"/>
+          </a:ln>
+        </p:spPr>
+        <p:style>
+          <a:lnRef idx="1">
+            <a:schemeClr val="accent1"/>
+          </a:lnRef>
+          <a:fillRef idx="0">
+            <a:schemeClr val="accent1"/>
+          </a:fillRef>
+          <a:effectRef idx="0">
+            <a:schemeClr val="accent1"/>
+          </a:effectRef>
+          <a:fontRef idx="minor">
+            <a:schemeClr val="tx1"/>
+          </a:fontRef>
+        </p:style>
+      </p:cxnSp>
+      <p:sp>
+        <p:nvSpPr>
+          <p:cNvPr id="65" name="テキスト ボックス 64"/>
+          <p:cNvSpPr txBox="1"/>
+          <p:nvPr/>
+        </p:nvSpPr>
+        <p:spPr>
+          <a:xfrm>
+            <a:off x="5860938" y="2149647"/>
+            <a:ext cx="1015318" cy="338554"/>
+          </a:xfrm>
+          <a:prstGeom prst="rect">
+            <a:avLst/>
+          </a:prstGeom>
+          <a:noFill/>
+        </p:spPr>
+        <p:txBody>
+          <a:bodyPr wrap="square" rtlCol="0">
+            <a:spAutoFit/>
+          </a:bodyPr>
+          <a:lstStyle/>
+          <a:p>
+            <a:pPr algn="ctr"/>
+            <a:r>
+              <a:rPr lang="en-US" altLang="ja-JP" sz="1600" b="1" dirty="0">
+                <a:solidFill>
+                  <a:schemeClr val="tx1">
+                    <a:lumMod val="75000"/>
+                    <a:lumOff val="25000"/>
+                  </a:schemeClr>
+                </a:solidFill>
+                <a:latin typeface="HGP創英角ｺﾞｼｯｸUB" panose="020B0900000000000000" pitchFamily="50" charset="-128"/>
+                <a:ea typeface="HGP創英角ｺﾞｼｯｸUB" panose="020B0900000000000000" pitchFamily="50" charset="-128"/>
+              </a:rPr>
+              <a:t>G</a:t>
+            </a:r>
+            <a:r>
+              <a:rPr kumimoji="1" lang="en-US" altLang="ja-JP" sz="1600" b="1" dirty="0" smtClean="0">
+                <a:solidFill>
+                  <a:schemeClr val="tx1">
+                    <a:lumMod val="75000"/>
+                    <a:lumOff val="25000"/>
+                  </a:schemeClr>
+                </a:solidFill>
+                <a:latin typeface="HGP創英角ｺﾞｼｯｸUB" panose="020B0900000000000000" pitchFamily="50" charset="-128"/>
+                <a:ea typeface="HGP創英角ｺﾞｼｯｸUB" panose="020B0900000000000000" pitchFamily="50" charset="-128"/>
+              </a:rPr>
+              <a:t>enerate</a:t>
+            </a:r>
+            <a:endParaRPr kumimoji="1" lang="ja-JP" altLang="en-US" sz="1600" b="1" dirty="0">
+              <a:solidFill>
+                <a:schemeClr val="tx1">
+                  <a:lumMod val="75000"/>
+                  <a:lumOff val="25000"/>
+                </a:schemeClr>
+              </a:solidFill>
+              <a:latin typeface="HGP創英角ｺﾞｼｯｸUB" panose="020B0900000000000000" pitchFamily="50" charset="-128"/>
+              <a:ea typeface="HGP創英角ｺﾞｼｯｸUB" panose="020B0900000000000000" pitchFamily="50" charset="-128"/>
+            </a:endParaRPr>
+          </a:p>
+        </p:txBody>
+      </p:sp>
+      <p:sp>
+        <p:nvSpPr>
+          <p:cNvPr id="66" name="テキスト ボックス 65"/>
+          <p:cNvSpPr txBox="1"/>
+          <p:nvPr/>
+        </p:nvSpPr>
+        <p:spPr>
+          <a:xfrm>
+            <a:off x="2747054" y="1917065"/>
+            <a:ext cx="2315843" cy="369332"/>
+          </a:xfrm>
+          <a:prstGeom prst="rect">
+            <a:avLst/>
+          </a:prstGeom>
+          <a:noFill/>
+        </p:spPr>
+        <p:txBody>
+          <a:bodyPr wrap="square" rtlCol="0">
+            <a:spAutoFit/>
+          </a:bodyPr>
+          <a:lstStyle/>
+          <a:p>
+            <a:pPr algn="ctr"/>
+            <a:r>
+              <a:rPr kumimoji="1" lang="en-US" altLang="ja-JP" b="1" dirty="0" smtClean="0">
+                <a:solidFill>
+                  <a:schemeClr val="tx1">
+                    <a:lumMod val="75000"/>
+                    <a:lumOff val="25000"/>
+                  </a:schemeClr>
+                </a:solidFill>
+                <a:latin typeface="HGP創英角ｺﾞｼｯｸUB" panose="020B0900000000000000" pitchFamily="50" charset="-128"/>
+                <a:ea typeface="HGP創英角ｺﾞｼｯｸUB" panose="020B0900000000000000" pitchFamily="50" charset="-128"/>
+              </a:rPr>
+              <a:t>GET</a:t>
+            </a:r>
+            <a:endParaRPr kumimoji="1" lang="ja-JP" altLang="en-US" b="1" dirty="0">
+              <a:solidFill>
+                <a:schemeClr val="tx1">
+                  <a:lumMod val="75000"/>
+                  <a:lumOff val="25000"/>
+                </a:schemeClr>
+              </a:solidFill>
+              <a:latin typeface="HGP創英角ｺﾞｼｯｸUB" panose="020B0900000000000000" pitchFamily="50" charset="-128"/>
+              <a:ea typeface="HGP創英角ｺﾞｼｯｸUB" panose="020B0900000000000000" pitchFamily="50" charset="-128"/>
+            </a:endParaRPr>
+          </a:p>
+        </p:txBody>
+      </p:sp>
+      <p:cxnSp>
+        <p:nvCxnSpPr>
+          <p:cNvPr id="67" name="直線矢印コネクタ 126"/>
+          <p:cNvCxnSpPr/>
+          <p:nvPr/>
+        </p:nvCxnSpPr>
+        <p:spPr bwMode="invGray">
+          <a:xfrm>
+            <a:off x="2107096" y="3661815"/>
+            <a:ext cx="3690552" cy="0"/>
+          </a:xfrm>
+          <a:prstGeom prst="straightConnector1">
+            <a:avLst/>
+          </a:prstGeom>
+          <a:ln w="25400">
+            <a:solidFill>
+              <a:schemeClr val="tx2">
+                <a:lumMod val="40000"/>
+                <a:lumOff val="60000"/>
               </a:schemeClr>
-            </a:lnRef>
-            <a:fillRef idx="1">
-              <a:schemeClr val="accent1"/>
-            </a:fillRef>
-            <a:effectRef idx="0">
-              <a:schemeClr val="accent1"/>
-            </a:effectRef>
-            <a:fontRef idx="minor">
-              <a:schemeClr val="lt1"/>
-            </a:fontRef>
-          </p:style>
-          <p:txBody>
-            <a:bodyPr rtlCol="0" anchor="ctr"/>
-            <a:lstStyle/>
-            <a:p>
-              <a:pPr algn="ctr"/>
-              <a:r>
-                <a:rPr lang="en-US" altLang="ja-JP" b="1" dirty="0" smtClean="0">
-                  <a:solidFill>
-                    <a:srgbClr val="C00000"/>
-                  </a:solidFill>
-                </a:rPr>
-                <a:t>check</a:t>
-              </a:r>
-              <a:endParaRPr kumimoji="1" lang="ja-JP" altLang="en-US" b="1" dirty="0">
-                <a:solidFill>
-                  <a:srgbClr val="C00000"/>
-                </a:solidFill>
-              </a:endParaRPr>
-            </a:p>
-          </p:txBody>
-        </p:sp>
-        <p:sp>
-          <p:nvSpPr>
-            <p:cNvPr id="46" name="正方形/長方形 45"/>
-            <p:cNvSpPr/>
-            <p:nvPr/>
-          </p:nvSpPr>
-          <p:spPr>
-            <a:xfrm>
-              <a:off x="5464068" y="3850916"/>
-              <a:ext cx="1276616" cy="357190"/>
-            </a:xfrm>
-            <a:prstGeom prst="rect">
-              <a:avLst/>
-            </a:prstGeom>
-            <a:noFill/>
-            <a:ln>
-              <a:noFill/>
-            </a:ln>
-          </p:spPr>
-          <p:style>
-            <a:lnRef idx="2">
-              <a:schemeClr val="accent1">
-                <a:shade val="50000"/>
+            </a:solidFill>
+            <a:tailEnd type="triangle" w="lg" len="lg"/>
+          </a:ln>
+        </p:spPr>
+        <p:style>
+          <a:lnRef idx="1">
+            <a:schemeClr val="accent1"/>
+          </a:lnRef>
+          <a:fillRef idx="0">
+            <a:schemeClr val="accent1"/>
+          </a:fillRef>
+          <a:effectRef idx="0">
+            <a:schemeClr val="accent1"/>
+          </a:effectRef>
+          <a:fontRef idx="minor">
+            <a:schemeClr val="tx1"/>
+          </a:fontRef>
+        </p:style>
+      </p:cxnSp>
+      <p:sp>
+        <p:nvSpPr>
+          <p:cNvPr id="68" name="テキスト ボックス 67"/>
+          <p:cNvSpPr txBox="1"/>
+          <p:nvPr/>
+        </p:nvSpPr>
+        <p:spPr>
+          <a:xfrm>
+            <a:off x="2027337" y="3046738"/>
+            <a:ext cx="3769423" cy="646331"/>
+          </a:xfrm>
+          <a:prstGeom prst="rect">
+            <a:avLst/>
+          </a:prstGeom>
+          <a:noFill/>
+        </p:spPr>
+        <p:txBody>
+          <a:bodyPr wrap="square" rtlCol="0">
+            <a:spAutoFit/>
+          </a:bodyPr>
+          <a:lstStyle/>
+          <a:p>
+            <a:pPr algn="ctr"/>
+            <a:r>
+              <a:rPr kumimoji="1" lang="en-US" altLang="ja-JP" b="1" dirty="0" smtClean="0">
+                <a:solidFill>
+                  <a:schemeClr val="tx1">
+                    <a:lumMod val="75000"/>
+                    <a:lumOff val="25000"/>
+                  </a:schemeClr>
+                </a:solidFill>
+                <a:latin typeface="HGP創英角ｺﾞｼｯｸUB" panose="020B0900000000000000" pitchFamily="50" charset="-128"/>
+                <a:ea typeface="HGP創英角ｺﾞｼｯｸUB" panose="020B0900000000000000" pitchFamily="50" charset="-128"/>
+              </a:rPr>
+              <a:t>POST</a:t>
+            </a:r>
+          </a:p>
+          <a:p>
+            <a:pPr algn="ctr"/>
+            <a:r>
+              <a:rPr lang="en-US" altLang="ja-JP" b="1" dirty="0" smtClean="0">
+                <a:solidFill>
+                  <a:schemeClr val="tx1">
+                    <a:lumMod val="75000"/>
+                    <a:lumOff val="25000"/>
+                  </a:schemeClr>
+                </a:solidFill>
+                <a:latin typeface="HGP創英角ｺﾞｼｯｸUB" panose="020B0900000000000000" pitchFamily="50" charset="-128"/>
+                <a:ea typeface="HGP創英角ｺﾞｼｯｸUB" panose="020B0900000000000000" pitchFamily="50" charset="-128"/>
+              </a:rPr>
+              <a:t>(</a:t>
+            </a:r>
+            <a:r>
+              <a:rPr lang="en-US" altLang="ja-JP" b="1" dirty="0">
+                <a:solidFill>
+                  <a:schemeClr val="tx1">
+                    <a:lumMod val="75000"/>
+                    <a:lumOff val="25000"/>
+                  </a:schemeClr>
+                </a:solidFill>
+                <a:latin typeface="HGP創英角ｺﾞｼｯｸUB" panose="020B0900000000000000" pitchFamily="50" charset="-128"/>
+                <a:ea typeface="HGP創英角ｺﾞｼｯｸUB" panose="020B0900000000000000" pitchFamily="50" charset="-128"/>
+              </a:rPr>
+              <a:t>CSRF token</a:t>
+            </a:r>
+            <a:r>
+              <a:rPr lang="en-US" altLang="ja-JP" b="1" dirty="0" smtClean="0">
+                <a:solidFill>
+                  <a:schemeClr val="tx1">
+                    <a:lumMod val="75000"/>
+                    <a:lumOff val="25000"/>
+                  </a:schemeClr>
+                </a:solidFill>
+                <a:latin typeface="HGP創英角ｺﾞｼｯｸUB" panose="020B0900000000000000" pitchFamily="50" charset="-128"/>
+                <a:ea typeface="HGP創英角ｺﾞｼｯｸUB" panose="020B0900000000000000" pitchFamily="50" charset="-128"/>
+              </a:rPr>
+              <a:t>=</a:t>
+            </a:r>
+            <a:r>
+              <a:rPr lang="en-US" altLang="ja-JP" b="1" dirty="0" err="1" smtClean="0">
+                <a:solidFill>
+                  <a:schemeClr val="tx1">
+                    <a:lumMod val="75000"/>
+                    <a:lumOff val="25000"/>
+                  </a:schemeClr>
+                </a:solidFill>
+                <a:latin typeface="HGP創英角ｺﾞｼｯｸUB" panose="020B0900000000000000" pitchFamily="50" charset="-128"/>
+                <a:ea typeface="HGP創英角ｺﾞｼｯｸUB" panose="020B0900000000000000" pitchFamily="50" charset="-128"/>
+              </a:rPr>
+              <a:t>yyy</a:t>
+            </a:r>
+            <a:r>
+              <a:rPr lang="en-US" altLang="ja-JP" b="1" dirty="0" smtClean="0">
+                <a:solidFill>
+                  <a:schemeClr val="tx1">
+                    <a:lumMod val="75000"/>
+                    <a:lumOff val="25000"/>
+                  </a:schemeClr>
+                </a:solidFill>
+                <a:latin typeface="HGP創英角ｺﾞｼｯｸUB" panose="020B0900000000000000" pitchFamily="50" charset="-128"/>
+                <a:ea typeface="HGP創英角ｺﾞｼｯｸUB" panose="020B0900000000000000" pitchFamily="50" charset="-128"/>
+              </a:rPr>
+              <a:t>)</a:t>
+            </a:r>
+            <a:endParaRPr kumimoji="1" lang="en-US" altLang="ja-JP" b="1" dirty="0" smtClean="0">
+              <a:solidFill>
+                <a:schemeClr val="tx1">
+                  <a:lumMod val="75000"/>
+                  <a:lumOff val="25000"/>
+                </a:schemeClr>
+              </a:solidFill>
+              <a:latin typeface="HGP創英角ｺﾞｼｯｸUB" panose="020B0900000000000000" pitchFamily="50" charset="-128"/>
+              <a:ea typeface="HGP創英角ｺﾞｼｯｸUB" panose="020B0900000000000000" pitchFamily="50" charset="-128"/>
+            </a:endParaRPr>
+          </a:p>
+        </p:txBody>
+      </p:sp>
+      <p:sp>
+        <p:nvSpPr>
+          <p:cNvPr id="77" name="テキスト ボックス 76"/>
+          <p:cNvSpPr txBox="1"/>
+          <p:nvPr/>
+        </p:nvSpPr>
+        <p:spPr>
+          <a:xfrm>
+            <a:off x="5569895" y="3377783"/>
+            <a:ext cx="1488477" cy="369332"/>
+          </a:xfrm>
+          <a:prstGeom prst="rect">
+            <a:avLst/>
+          </a:prstGeom>
+          <a:noFill/>
+        </p:spPr>
+        <p:txBody>
+          <a:bodyPr wrap="square" rtlCol="0">
+            <a:spAutoFit/>
+          </a:bodyPr>
+          <a:lstStyle/>
+          <a:p>
+            <a:pPr algn="ctr"/>
+            <a:r>
+              <a:rPr kumimoji="1" lang="en-US" altLang="ja-JP" b="1" dirty="0" smtClean="0">
+                <a:solidFill>
+                  <a:schemeClr val="tx1">
+                    <a:lumMod val="75000"/>
+                    <a:lumOff val="25000"/>
+                  </a:schemeClr>
+                </a:solidFill>
+                <a:latin typeface="HGP創英角ｺﾞｼｯｸUB" panose="020B0900000000000000" pitchFamily="50" charset="-128"/>
+                <a:ea typeface="HGP創英角ｺﾞｼｯｸUB" panose="020B0900000000000000" pitchFamily="50" charset="-128"/>
+              </a:rPr>
+              <a:t>Check</a:t>
+            </a:r>
+          </a:p>
+        </p:txBody>
+      </p:sp>
+      <p:cxnSp>
+        <p:nvCxnSpPr>
+          <p:cNvPr id="80" name="直線矢印コネクタ 126"/>
+          <p:cNvCxnSpPr/>
+          <p:nvPr/>
+        </p:nvCxnSpPr>
+        <p:spPr bwMode="invGray">
+          <a:xfrm>
+            <a:off x="2081092" y="4270341"/>
+            <a:ext cx="3705519" cy="12033"/>
+          </a:xfrm>
+          <a:prstGeom prst="straightConnector1">
+            <a:avLst/>
+          </a:prstGeom>
+          <a:ln w="25400">
+            <a:solidFill>
+              <a:schemeClr val="tx2">
+                <a:lumMod val="40000"/>
+                <a:lumOff val="60000"/>
               </a:schemeClr>
-            </a:lnRef>
-            <a:fillRef idx="1">
-              <a:schemeClr val="accent1"/>
-            </a:fillRef>
-            <a:effectRef idx="0">
-              <a:schemeClr val="accent1"/>
-            </a:effectRef>
-            <a:fontRef idx="minor">
-              <a:schemeClr val="lt1"/>
-            </a:fontRef>
-          </p:style>
-          <p:txBody>
-            <a:bodyPr rtlCol="0" anchor="ctr"/>
-            <a:lstStyle/>
-            <a:p>
-              <a:pPr algn="ctr"/>
-              <a:r>
-                <a:rPr lang="en-US" altLang="ja-JP" b="1" dirty="0" smtClean="0">
-                  <a:solidFill>
-                    <a:srgbClr val="C00000"/>
-                  </a:solidFill>
-                </a:rPr>
-                <a:t>check</a:t>
-              </a:r>
-              <a:endParaRPr kumimoji="1" lang="ja-JP" altLang="en-US" b="1" dirty="0">
-                <a:solidFill>
-                  <a:srgbClr val="C00000"/>
-                </a:solidFill>
-              </a:endParaRPr>
-            </a:p>
-          </p:txBody>
-        </p:sp>
-        <p:sp>
-          <p:nvSpPr>
-            <p:cNvPr id="52" name="正方形/長方形 51"/>
-            <p:cNvSpPr/>
-            <p:nvPr/>
-          </p:nvSpPr>
-          <p:spPr>
-            <a:xfrm>
-              <a:off x="3665724" y="2760829"/>
-              <a:ext cx="1912777" cy="357190"/>
-            </a:xfrm>
-            <a:prstGeom prst="rect">
-              <a:avLst/>
-            </a:prstGeom>
-            <a:noFill/>
-            <a:ln>
-              <a:noFill/>
-            </a:ln>
-          </p:spPr>
-          <p:style>
-            <a:lnRef idx="2">
-              <a:schemeClr val="accent1">
-                <a:shade val="50000"/>
+            </a:solidFill>
+            <a:prstDash val="sysDash"/>
+            <a:headEnd type="triangle" w="lg" len="lg"/>
+            <a:tailEnd type="none" w="lg" len="med"/>
+          </a:ln>
+        </p:spPr>
+        <p:style>
+          <a:lnRef idx="1">
+            <a:schemeClr val="accent1"/>
+          </a:lnRef>
+          <a:fillRef idx="0">
+            <a:schemeClr val="accent1"/>
+          </a:fillRef>
+          <a:effectRef idx="0">
+            <a:schemeClr val="accent1"/>
+          </a:effectRef>
+          <a:fontRef idx="minor">
+            <a:schemeClr val="tx1"/>
+          </a:fontRef>
+        </p:style>
+      </p:cxnSp>
+      <p:sp>
+        <p:nvSpPr>
+          <p:cNvPr id="82" name="テキスト ボックス 81"/>
+          <p:cNvSpPr txBox="1"/>
+          <p:nvPr/>
+        </p:nvSpPr>
+        <p:spPr>
+          <a:xfrm>
+            <a:off x="2138437" y="3901081"/>
+            <a:ext cx="3293029" cy="369332"/>
+          </a:xfrm>
+          <a:prstGeom prst="rect">
+            <a:avLst/>
+          </a:prstGeom>
+          <a:noFill/>
+        </p:spPr>
+        <p:txBody>
+          <a:bodyPr wrap="square" rtlCol="0">
+            <a:spAutoFit/>
+          </a:bodyPr>
+          <a:lstStyle/>
+          <a:p>
+            <a:pPr algn="ctr"/>
+            <a:r>
+              <a:rPr lang="en-US" altLang="ja-JP" b="1" dirty="0">
+                <a:solidFill>
+                  <a:schemeClr val="tx1">
+                    <a:lumMod val="75000"/>
+                    <a:lumOff val="25000"/>
+                  </a:schemeClr>
+                </a:solidFill>
+                <a:latin typeface="HGP創英角ｺﾞｼｯｸUB" panose="020B0900000000000000" pitchFamily="50" charset="-128"/>
+                <a:ea typeface="HGP創英角ｺﾞｼｯｸUB" panose="020B0900000000000000" pitchFamily="50" charset="-128"/>
+              </a:rPr>
+              <a:t>CSRF token=</a:t>
+            </a:r>
+            <a:r>
+              <a:rPr lang="en-US" altLang="ja-JP" b="1" dirty="0" err="1">
+                <a:solidFill>
+                  <a:schemeClr val="tx1">
+                    <a:lumMod val="75000"/>
+                    <a:lumOff val="25000"/>
+                  </a:schemeClr>
+                </a:solidFill>
+                <a:latin typeface="HGP創英角ｺﾞｼｯｸUB" panose="020B0900000000000000" pitchFamily="50" charset="-128"/>
+                <a:ea typeface="HGP創英角ｺﾞｼｯｸUB" panose="020B0900000000000000" pitchFamily="50" charset="-128"/>
+              </a:rPr>
+              <a:t>yyy</a:t>
+            </a:r>
+            <a:r>
+              <a:rPr lang="en-US" altLang="ja-JP" b="1" dirty="0">
+                <a:solidFill>
+                  <a:schemeClr val="tx1">
+                    <a:lumMod val="75000"/>
+                    <a:lumOff val="25000"/>
+                  </a:schemeClr>
+                </a:solidFill>
+                <a:latin typeface="HGP創英角ｺﾞｼｯｸUB" panose="020B0900000000000000" pitchFamily="50" charset="-128"/>
+                <a:ea typeface="HGP創英角ｺﾞｼｯｸUB" panose="020B0900000000000000" pitchFamily="50" charset="-128"/>
+              </a:rPr>
+              <a:t>(hidden</a:t>
+            </a:r>
+            <a:r>
+              <a:rPr kumimoji="1" lang="en-US" altLang="ja-JP" b="1" dirty="0" smtClean="0">
+                <a:solidFill>
+                  <a:schemeClr val="tx1">
+                    <a:lumMod val="75000"/>
+                    <a:lumOff val="25000"/>
+                  </a:schemeClr>
+                </a:solidFill>
+                <a:latin typeface="HGP創英角ｺﾞｼｯｸUB" panose="020B0900000000000000" pitchFamily="50" charset="-128"/>
+                <a:ea typeface="HGP創英角ｺﾞｼｯｸUB" panose="020B0900000000000000" pitchFamily="50" charset="-128"/>
+              </a:rPr>
+              <a:t>)</a:t>
+            </a:r>
+            <a:endParaRPr kumimoji="1" lang="ja-JP" altLang="en-US" b="1" dirty="0">
+              <a:solidFill>
+                <a:schemeClr val="tx1">
+                  <a:lumMod val="75000"/>
+                  <a:lumOff val="25000"/>
+                </a:schemeClr>
+              </a:solidFill>
+              <a:latin typeface="HGP創英角ｺﾞｼｯｸUB" panose="020B0900000000000000" pitchFamily="50" charset="-128"/>
+              <a:ea typeface="HGP創英角ｺﾞｼｯｸUB" panose="020B0900000000000000" pitchFamily="50" charset="-128"/>
+            </a:endParaRPr>
+          </a:p>
+        </p:txBody>
+      </p:sp>
+      <p:cxnSp>
+        <p:nvCxnSpPr>
+          <p:cNvPr id="83" name="直線矢印コネクタ 126"/>
+          <p:cNvCxnSpPr/>
+          <p:nvPr/>
+        </p:nvCxnSpPr>
+        <p:spPr bwMode="invGray">
+          <a:xfrm>
+            <a:off x="2107096" y="5160400"/>
+            <a:ext cx="3690552" cy="0"/>
+          </a:xfrm>
+          <a:prstGeom prst="straightConnector1">
+            <a:avLst/>
+          </a:prstGeom>
+          <a:ln w="25400">
+            <a:solidFill>
+              <a:schemeClr val="tx2">
+                <a:lumMod val="40000"/>
+                <a:lumOff val="60000"/>
               </a:schemeClr>
-            </a:lnRef>
-            <a:fillRef idx="1">
-              <a:schemeClr val="accent1"/>
-            </a:fillRef>
-            <a:effectRef idx="0">
-              <a:schemeClr val="accent1"/>
-            </a:effectRef>
-            <a:fontRef idx="minor">
-              <a:schemeClr val="lt1"/>
-            </a:fontRef>
-          </p:style>
-          <p:txBody>
-            <a:bodyPr rtlCol="0" anchor="ctr"/>
-            <a:lstStyle/>
-            <a:p>
-              <a:r>
-                <a:rPr lang="en-US" altLang="ja-JP" b="1" dirty="0" smtClean="0">
-                  <a:solidFill>
-                    <a:srgbClr val="C00000"/>
-                  </a:solidFill>
-                </a:rPr>
-                <a:t>POST</a:t>
-              </a:r>
-              <a:endParaRPr kumimoji="1" lang="ja-JP" altLang="en-US" b="1" dirty="0">
-                <a:solidFill>
-                  <a:srgbClr val="C00000"/>
-                </a:solidFill>
-              </a:endParaRPr>
-            </a:p>
-          </p:txBody>
-        </p:sp>
-        <p:sp>
-          <p:nvSpPr>
-            <p:cNvPr id="53" name="正方形/長方形 52"/>
-            <p:cNvSpPr/>
-            <p:nvPr/>
-          </p:nvSpPr>
-          <p:spPr>
-            <a:xfrm>
-              <a:off x="3679372" y="3300410"/>
-              <a:ext cx="1912777" cy="357190"/>
-            </a:xfrm>
-            <a:prstGeom prst="rect">
-              <a:avLst/>
-            </a:prstGeom>
-            <a:noFill/>
-            <a:ln>
-              <a:noFill/>
-            </a:ln>
-          </p:spPr>
-          <p:style>
-            <a:lnRef idx="2">
-              <a:schemeClr val="accent1">
-                <a:shade val="50000"/>
+            </a:solidFill>
+            <a:tailEnd type="triangle" w="lg" len="lg"/>
+          </a:ln>
+        </p:spPr>
+        <p:style>
+          <a:lnRef idx="1">
+            <a:schemeClr val="accent1"/>
+          </a:lnRef>
+          <a:fillRef idx="0">
+            <a:schemeClr val="accent1"/>
+          </a:fillRef>
+          <a:effectRef idx="0">
+            <a:schemeClr val="accent1"/>
+          </a:effectRef>
+          <a:fontRef idx="minor">
+            <a:schemeClr val="tx1"/>
+          </a:fontRef>
+        </p:style>
+      </p:cxnSp>
+      <p:sp>
+        <p:nvSpPr>
+          <p:cNvPr id="84" name="テキスト ボックス 83"/>
+          <p:cNvSpPr txBox="1"/>
+          <p:nvPr/>
+        </p:nvSpPr>
+        <p:spPr>
+          <a:xfrm>
+            <a:off x="2728003" y="4780238"/>
+            <a:ext cx="2315843" cy="369332"/>
+          </a:xfrm>
+          <a:prstGeom prst="rect">
+            <a:avLst/>
+          </a:prstGeom>
+          <a:noFill/>
+        </p:spPr>
+        <p:txBody>
+          <a:bodyPr wrap="square" rtlCol="0">
+            <a:spAutoFit/>
+          </a:bodyPr>
+          <a:lstStyle/>
+          <a:p>
+            <a:pPr algn="ctr"/>
+            <a:r>
+              <a:rPr kumimoji="1" lang="en-US" altLang="ja-JP" b="1" dirty="0" smtClean="0">
+                <a:solidFill>
+                  <a:schemeClr val="tx1">
+                    <a:lumMod val="75000"/>
+                    <a:lumOff val="25000"/>
+                  </a:schemeClr>
+                </a:solidFill>
+                <a:latin typeface="HGP創英角ｺﾞｼｯｸUB" panose="020B0900000000000000" pitchFamily="50" charset="-128"/>
+                <a:ea typeface="HGP創英角ｺﾞｼｯｸUB" panose="020B0900000000000000" pitchFamily="50" charset="-128"/>
+              </a:rPr>
+              <a:t>GET</a:t>
+            </a:r>
+            <a:endParaRPr kumimoji="1" lang="ja-JP" altLang="en-US" b="1" dirty="0">
+              <a:solidFill>
+                <a:schemeClr val="tx1">
+                  <a:lumMod val="75000"/>
+                  <a:lumOff val="25000"/>
+                </a:schemeClr>
+              </a:solidFill>
+              <a:latin typeface="HGP創英角ｺﾞｼｯｸUB" panose="020B0900000000000000" pitchFamily="50" charset="-128"/>
+              <a:ea typeface="HGP創英角ｺﾞｼｯｸUB" panose="020B0900000000000000" pitchFamily="50" charset="-128"/>
+            </a:endParaRPr>
+          </a:p>
+        </p:txBody>
+      </p:sp>
+      <p:cxnSp>
+        <p:nvCxnSpPr>
+          <p:cNvPr id="88" name="直線矢印コネクタ 126"/>
+          <p:cNvCxnSpPr/>
+          <p:nvPr/>
+        </p:nvCxnSpPr>
+        <p:spPr bwMode="invGray">
+          <a:xfrm>
+            <a:off x="2107096" y="5732681"/>
+            <a:ext cx="3705519" cy="12033"/>
+          </a:xfrm>
+          <a:prstGeom prst="straightConnector1">
+            <a:avLst/>
+          </a:prstGeom>
+          <a:ln w="25400">
+            <a:solidFill>
+              <a:schemeClr val="tx2">
+                <a:lumMod val="40000"/>
+                <a:lumOff val="60000"/>
               </a:schemeClr>
-            </a:lnRef>
-            <a:fillRef idx="1">
-              <a:schemeClr val="accent1"/>
-            </a:fillRef>
-            <a:effectRef idx="0">
-              <a:schemeClr val="accent1"/>
-            </a:effectRef>
-            <a:fontRef idx="minor">
-              <a:schemeClr val="lt1"/>
-            </a:fontRef>
-          </p:style>
-          <p:txBody>
-            <a:bodyPr rtlCol="0" anchor="ctr"/>
-            <a:lstStyle/>
-            <a:p>
-              <a:r>
-                <a:rPr lang="en-US" altLang="ja-JP" b="1" dirty="0" smtClean="0">
-                  <a:solidFill>
-                    <a:srgbClr val="C00000"/>
-                  </a:solidFill>
-                </a:rPr>
-                <a:t>PUT</a:t>
-              </a:r>
-              <a:endParaRPr kumimoji="1" lang="ja-JP" altLang="en-US" b="1" dirty="0">
-                <a:solidFill>
-                  <a:srgbClr val="C00000"/>
-                </a:solidFill>
-              </a:endParaRPr>
-            </a:p>
-          </p:txBody>
-        </p:sp>
-        <p:sp>
-          <p:nvSpPr>
-            <p:cNvPr id="54" name="正方形/長方形 53"/>
-            <p:cNvSpPr/>
-            <p:nvPr/>
-          </p:nvSpPr>
-          <p:spPr>
-            <a:xfrm>
-              <a:off x="3665724" y="3850916"/>
-              <a:ext cx="1912777" cy="357190"/>
-            </a:xfrm>
-            <a:prstGeom prst="rect">
-              <a:avLst/>
-            </a:prstGeom>
-            <a:noFill/>
-            <a:ln>
-              <a:noFill/>
-            </a:ln>
-          </p:spPr>
-          <p:style>
-            <a:lnRef idx="2">
-              <a:schemeClr val="accent1">
-                <a:shade val="50000"/>
+            </a:solidFill>
+            <a:prstDash val="sysDash"/>
+            <a:headEnd type="triangle" w="lg" len="lg"/>
+            <a:tailEnd type="none" w="lg" len="med"/>
+          </a:ln>
+        </p:spPr>
+        <p:style>
+          <a:lnRef idx="1">
+            <a:schemeClr val="accent1"/>
+          </a:lnRef>
+          <a:fillRef idx="0">
+            <a:schemeClr val="accent1"/>
+          </a:fillRef>
+          <a:effectRef idx="0">
+            <a:schemeClr val="accent1"/>
+          </a:effectRef>
+          <a:fontRef idx="minor">
+            <a:schemeClr val="tx1"/>
+          </a:fontRef>
+        </p:style>
+      </p:cxnSp>
+      <p:sp>
+        <p:nvSpPr>
+          <p:cNvPr id="89" name="テキスト ボックス 88"/>
+          <p:cNvSpPr txBox="1"/>
+          <p:nvPr/>
+        </p:nvSpPr>
+        <p:spPr>
+          <a:xfrm>
+            <a:off x="2085628" y="5372946"/>
+            <a:ext cx="3405454" cy="369332"/>
+          </a:xfrm>
+          <a:prstGeom prst="rect">
+            <a:avLst/>
+          </a:prstGeom>
+          <a:noFill/>
+        </p:spPr>
+        <p:txBody>
+          <a:bodyPr wrap="square" rtlCol="0">
+            <a:spAutoFit/>
+          </a:bodyPr>
+          <a:lstStyle/>
+          <a:p>
+            <a:pPr algn="ctr"/>
+            <a:r>
+              <a:rPr lang="en-US" altLang="ja-JP" b="1" dirty="0">
+                <a:solidFill>
+                  <a:schemeClr val="tx1">
+                    <a:lumMod val="75000"/>
+                    <a:lumOff val="25000"/>
+                  </a:schemeClr>
+                </a:solidFill>
+                <a:latin typeface="HGP創英角ｺﾞｼｯｸUB" panose="020B0900000000000000" pitchFamily="50" charset="-128"/>
+                <a:ea typeface="HGP創英角ｺﾞｼｯｸUB" panose="020B0900000000000000" pitchFamily="50" charset="-128"/>
+              </a:rPr>
+              <a:t>CSRF token=</a:t>
+            </a:r>
+            <a:r>
+              <a:rPr lang="en-US" altLang="ja-JP" b="1" dirty="0" err="1">
+                <a:solidFill>
+                  <a:schemeClr val="tx1">
+                    <a:lumMod val="75000"/>
+                    <a:lumOff val="25000"/>
+                  </a:schemeClr>
+                </a:solidFill>
+                <a:latin typeface="HGP創英角ｺﾞｼｯｸUB" panose="020B0900000000000000" pitchFamily="50" charset="-128"/>
+                <a:ea typeface="HGP創英角ｺﾞｼｯｸUB" panose="020B0900000000000000" pitchFamily="50" charset="-128"/>
+              </a:rPr>
+              <a:t>yyy</a:t>
+            </a:r>
+            <a:r>
+              <a:rPr lang="en-US" altLang="ja-JP" b="1" dirty="0">
+                <a:solidFill>
+                  <a:schemeClr val="tx1">
+                    <a:lumMod val="75000"/>
+                    <a:lumOff val="25000"/>
+                  </a:schemeClr>
+                </a:solidFill>
+                <a:latin typeface="HGP創英角ｺﾞｼｯｸUB" panose="020B0900000000000000" pitchFamily="50" charset="-128"/>
+                <a:ea typeface="HGP創英角ｺﾞｼｯｸUB" panose="020B0900000000000000" pitchFamily="50" charset="-128"/>
+              </a:rPr>
+              <a:t>(hidden</a:t>
+            </a:r>
+            <a:r>
+              <a:rPr kumimoji="1" lang="en-US" altLang="ja-JP" b="1" dirty="0" smtClean="0">
+                <a:solidFill>
+                  <a:schemeClr val="tx1">
+                    <a:lumMod val="75000"/>
+                    <a:lumOff val="25000"/>
+                  </a:schemeClr>
+                </a:solidFill>
+                <a:latin typeface="HGP創英角ｺﾞｼｯｸUB" panose="020B0900000000000000" pitchFamily="50" charset="-128"/>
+                <a:ea typeface="HGP創英角ｺﾞｼｯｸUB" panose="020B0900000000000000" pitchFamily="50" charset="-128"/>
+              </a:rPr>
+              <a:t>)</a:t>
+            </a:r>
+            <a:endParaRPr kumimoji="1" lang="ja-JP" altLang="en-US" b="1" dirty="0">
+              <a:solidFill>
+                <a:schemeClr val="tx1">
+                  <a:lumMod val="75000"/>
+                  <a:lumOff val="25000"/>
+                </a:schemeClr>
+              </a:solidFill>
+              <a:latin typeface="HGP創英角ｺﾞｼｯｸUB" panose="020B0900000000000000" pitchFamily="50" charset="-128"/>
+              <a:ea typeface="HGP創英角ｺﾞｼｯｸUB" panose="020B0900000000000000" pitchFamily="50" charset="-128"/>
+            </a:endParaRPr>
+          </a:p>
+        </p:txBody>
+      </p:sp>
+      <p:sp>
+        <p:nvSpPr>
+          <p:cNvPr id="95" name="正方形/長方形 94"/>
+          <p:cNvSpPr/>
+          <p:nvPr/>
+        </p:nvSpPr>
+        <p:spPr>
+          <a:xfrm>
+            <a:off x="1871624" y="3027688"/>
+            <a:ext cx="5004632" cy="1424109"/>
+          </a:xfrm>
+          <a:prstGeom prst="rect">
+            <a:avLst/>
+          </a:prstGeom>
+          <a:noFill/>
+          <a:ln w="63500">
+            <a:solidFill>
+              <a:schemeClr val="accent6">
+                <a:lumMod val="60000"/>
+                <a:lumOff val="40000"/>
               </a:schemeClr>
-            </a:lnRef>
-            <a:fillRef idx="1">
-              <a:schemeClr val="accent1"/>
-            </a:fillRef>
-            <a:effectRef idx="0">
-              <a:schemeClr val="accent1"/>
-            </a:effectRef>
-            <a:fontRef idx="minor">
-              <a:schemeClr val="lt1"/>
-            </a:fontRef>
-          </p:style>
-          <p:txBody>
-            <a:bodyPr rtlCol="0" anchor="ctr"/>
-            <a:lstStyle/>
-            <a:p>
-              <a:r>
-                <a:rPr lang="en-US" altLang="ja-JP" b="1" dirty="0" smtClean="0">
-                  <a:solidFill>
-                    <a:srgbClr val="C00000"/>
-                  </a:solidFill>
-                </a:rPr>
-                <a:t>DELETE</a:t>
-              </a:r>
-              <a:endParaRPr kumimoji="1" lang="ja-JP" altLang="en-US" b="1" dirty="0">
-                <a:solidFill>
-                  <a:srgbClr val="C00000"/>
-                </a:solidFill>
-              </a:endParaRPr>
-            </a:p>
-          </p:txBody>
-        </p:sp>
-      </p:grpSp>
+            </a:solidFill>
+            <a:prstDash val="solid"/>
+            <a:miter lim="800000"/>
+          </a:ln>
+          <a:effectLst/>
+        </p:spPr>
+        <p:style>
+          <a:lnRef idx="1">
+            <a:schemeClr val="accent1"/>
+          </a:lnRef>
+          <a:fillRef idx="3">
+            <a:schemeClr val="accent1"/>
+          </a:fillRef>
+          <a:effectRef idx="2">
+            <a:schemeClr val="accent1"/>
+          </a:effectRef>
+          <a:fontRef idx="minor">
+            <a:schemeClr val="lt1"/>
+          </a:fontRef>
+        </p:style>
+        <p:txBody>
+          <a:bodyPr rtlCol="0" anchor="b" anchorCtr="1"/>
+          <a:lstStyle/>
+          <a:p>
+            <a:pPr algn="ctr"/>
+            <a:endParaRPr kumimoji="1" lang="en-US" altLang="ja-JP" sz="2000" dirty="0" smtClean="0">
+              <a:solidFill>
+                <a:schemeClr val="tx1">
+                  <a:lumMod val="50000"/>
+                  <a:lumOff val="50000"/>
+                </a:schemeClr>
+              </a:solidFill>
+            </a:endParaRPr>
+          </a:p>
+        </p:txBody>
+      </p:sp>
+      <p:cxnSp>
+        <p:nvCxnSpPr>
+          <p:cNvPr id="98" name="直線矢印コネクタ 126"/>
+          <p:cNvCxnSpPr/>
+          <p:nvPr/>
+        </p:nvCxnSpPr>
+        <p:spPr bwMode="invGray">
+          <a:xfrm>
+            <a:off x="5807173" y="3997472"/>
+            <a:ext cx="1285107" cy="0"/>
+          </a:xfrm>
+          <a:prstGeom prst="straightConnector1">
+            <a:avLst/>
+          </a:prstGeom>
+          <a:ln w="25400">
+            <a:solidFill>
+              <a:schemeClr val="tx2">
+                <a:lumMod val="40000"/>
+                <a:lumOff val="60000"/>
+              </a:schemeClr>
+            </a:solidFill>
+            <a:headEnd type="triangle" w="lg" len="lg"/>
+            <a:tailEnd type="none" w="lg" len="lg"/>
+          </a:ln>
+        </p:spPr>
+        <p:style>
+          <a:lnRef idx="1">
+            <a:schemeClr val="accent1"/>
+          </a:lnRef>
+          <a:fillRef idx="0">
+            <a:schemeClr val="accent1"/>
+          </a:fillRef>
+          <a:effectRef idx="0">
+            <a:schemeClr val="accent1"/>
+          </a:effectRef>
+          <a:fontRef idx="minor">
+            <a:schemeClr val="tx1"/>
+          </a:fontRef>
+        </p:style>
+      </p:cxnSp>
+      <p:sp>
+        <p:nvSpPr>
+          <p:cNvPr id="99" name="テキスト ボックス 98"/>
+          <p:cNvSpPr txBox="1"/>
+          <p:nvPr/>
+        </p:nvSpPr>
+        <p:spPr>
+          <a:xfrm rot="5400000">
+            <a:off x="3565530" y="5978540"/>
+            <a:ext cx="648075" cy="369332"/>
+          </a:xfrm>
+          <a:prstGeom prst="rect">
+            <a:avLst/>
+          </a:prstGeom>
+          <a:noFill/>
+        </p:spPr>
+        <p:txBody>
+          <a:bodyPr wrap="square" rtlCol="0">
+            <a:spAutoFit/>
+          </a:bodyPr>
+          <a:lstStyle/>
+          <a:p>
+            <a:pPr algn="ctr"/>
+            <a:r>
+              <a:rPr kumimoji="1" lang="ja-JP" altLang="en-US" b="1" dirty="0" smtClean="0">
+                <a:solidFill>
+                  <a:schemeClr val="tx1">
+                    <a:lumMod val="75000"/>
+                    <a:lumOff val="25000"/>
+                  </a:schemeClr>
+                </a:solidFill>
+                <a:latin typeface="HGP創英角ｺﾞｼｯｸUB" panose="020B0900000000000000" pitchFamily="50" charset="-128"/>
+                <a:ea typeface="HGP創英角ｺﾞｼｯｸUB" panose="020B0900000000000000" pitchFamily="50" charset="-128"/>
+              </a:rPr>
+              <a:t>・・・</a:t>
+            </a:r>
+            <a:endParaRPr kumimoji="1" lang="ja-JP" altLang="en-US" b="1" dirty="0">
+              <a:solidFill>
+                <a:schemeClr val="tx1">
+                  <a:lumMod val="75000"/>
+                  <a:lumOff val="25000"/>
+                </a:schemeClr>
+              </a:solidFill>
+              <a:latin typeface="HGP創英角ｺﾞｼｯｸUB" panose="020B0900000000000000" pitchFamily="50" charset="-128"/>
+              <a:ea typeface="HGP創英角ｺﾞｼｯｸUB" panose="020B0900000000000000" pitchFamily="50" charset="-128"/>
+            </a:endParaRPr>
+          </a:p>
+        </p:txBody>
+      </p:sp>
+      <p:sp>
+        <p:nvSpPr>
+          <p:cNvPr id="105" name="テキスト ボックス 104"/>
+          <p:cNvSpPr txBox="1"/>
+          <p:nvPr/>
+        </p:nvSpPr>
+        <p:spPr>
+          <a:xfrm>
+            <a:off x="5690440" y="5047649"/>
+            <a:ext cx="1339357" cy="584775"/>
+          </a:xfrm>
+          <a:prstGeom prst="rect">
+            <a:avLst/>
+          </a:prstGeom>
+          <a:noFill/>
+        </p:spPr>
+        <p:txBody>
+          <a:bodyPr wrap="square" rtlCol="0">
+            <a:spAutoFit/>
+          </a:bodyPr>
+          <a:lstStyle/>
+          <a:p>
+            <a:pPr algn="ctr"/>
+            <a:r>
+              <a:rPr lang="en-US" altLang="ja-JP" sz="1600" b="1" dirty="0">
+                <a:solidFill>
+                  <a:schemeClr val="tx1">
+                    <a:lumMod val="75000"/>
+                    <a:lumOff val="25000"/>
+                  </a:schemeClr>
+                </a:solidFill>
+                <a:latin typeface="HGP創英角ｺﾞｼｯｸUB" panose="020B0900000000000000" pitchFamily="50" charset="-128"/>
+                <a:ea typeface="HGP創英角ｺﾞｼｯｸUB" panose="020B0900000000000000" pitchFamily="50" charset="-128"/>
+              </a:rPr>
+              <a:t>Reference only</a:t>
+            </a:r>
+            <a:endParaRPr kumimoji="1" lang="ja-JP" altLang="en-US" sz="1600" b="1" dirty="0">
+              <a:solidFill>
+                <a:schemeClr val="tx1">
+                  <a:lumMod val="75000"/>
+                  <a:lumOff val="25000"/>
+                </a:schemeClr>
+              </a:solidFill>
+              <a:latin typeface="HGP創英角ｺﾞｼｯｸUB" panose="020B0900000000000000" pitchFamily="50" charset="-128"/>
+              <a:ea typeface="HGP創英角ｺﾞｼｯｸUB" panose="020B0900000000000000" pitchFamily="50" charset="-128"/>
+            </a:endParaRPr>
+          </a:p>
+        </p:txBody>
+      </p:sp>
+      <p:sp>
+        <p:nvSpPr>
+          <p:cNvPr id="106" name="正方形/長方形 105"/>
+          <p:cNvSpPr/>
+          <p:nvPr/>
+        </p:nvSpPr>
+        <p:spPr>
+          <a:xfrm>
+            <a:off x="1871624" y="4724546"/>
+            <a:ext cx="5004632" cy="1179041"/>
+          </a:xfrm>
+          <a:prstGeom prst="rect">
+            <a:avLst/>
+          </a:prstGeom>
+          <a:noFill/>
+          <a:ln w="63500">
+            <a:solidFill>
+              <a:schemeClr val="accent6">
+                <a:lumMod val="60000"/>
+                <a:lumOff val="40000"/>
+              </a:schemeClr>
+            </a:solidFill>
+            <a:prstDash val="solid"/>
+            <a:miter lim="800000"/>
+          </a:ln>
+          <a:effectLst/>
+        </p:spPr>
+        <p:style>
+          <a:lnRef idx="1">
+            <a:schemeClr val="accent1"/>
+          </a:lnRef>
+          <a:fillRef idx="3">
+            <a:schemeClr val="accent1"/>
+          </a:fillRef>
+          <a:effectRef idx="2">
+            <a:schemeClr val="accent1"/>
+          </a:effectRef>
+          <a:fontRef idx="minor">
+            <a:schemeClr val="lt1"/>
+          </a:fontRef>
+        </p:style>
+        <p:txBody>
+          <a:bodyPr rtlCol="0" anchor="b" anchorCtr="1"/>
+          <a:lstStyle/>
+          <a:p>
+            <a:pPr algn="ctr"/>
+            <a:endParaRPr kumimoji="1" lang="en-US" altLang="ja-JP" sz="2000" dirty="0" smtClean="0">
+              <a:solidFill>
+                <a:schemeClr val="tx1">
+                  <a:lumMod val="50000"/>
+                  <a:lumOff val="50000"/>
+                </a:schemeClr>
+              </a:solidFill>
+            </a:endParaRPr>
+          </a:p>
+        </p:txBody>
+      </p:sp>
+      <p:cxnSp>
+        <p:nvCxnSpPr>
+          <p:cNvPr id="107" name="直線矢印コネクタ 126"/>
+          <p:cNvCxnSpPr/>
+          <p:nvPr/>
+        </p:nvCxnSpPr>
+        <p:spPr bwMode="invGray">
+          <a:xfrm flipH="1">
+            <a:off x="5812616" y="5604895"/>
+            <a:ext cx="1279664" cy="0"/>
+          </a:xfrm>
+          <a:prstGeom prst="straightConnector1">
+            <a:avLst/>
+          </a:prstGeom>
+          <a:ln w="25400">
+            <a:solidFill>
+              <a:schemeClr val="tx2">
+                <a:lumMod val="40000"/>
+                <a:lumOff val="60000"/>
+              </a:schemeClr>
+            </a:solidFill>
+            <a:tailEnd type="triangle" w="lg" len="lg"/>
+          </a:ln>
+        </p:spPr>
+        <p:style>
+          <a:lnRef idx="1">
+            <a:schemeClr val="accent1"/>
+          </a:lnRef>
+          <a:fillRef idx="0">
+            <a:schemeClr val="accent1"/>
+          </a:fillRef>
+          <a:effectRef idx="0">
+            <a:schemeClr val="accent1"/>
+          </a:effectRef>
+          <a:fontRef idx="minor">
+            <a:schemeClr val="tx1"/>
+          </a:fontRef>
+        </p:style>
+      </p:cxnSp>
+      <p:sp>
+        <p:nvSpPr>
+          <p:cNvPr id="112" name="円形吹き出し 111"/>
+          <p:cNvSpPr/>
+          <p:nvPr/>
+        </p:nvSpPr>
+        <p:spPr>
+          <a:xfrm>
+            <a:off x="240623" y="3277570"/>
+            <a:ext cx="1581978" cy="1174227"/>
+          </a:xfrm>
+          <a:prstGeom prst="wedgeEllipseCallout">
+            <a:avLst>
+              <a:gd name="adj1" fmla="val 50908"/>
+              <a:gd name="adj2" fmla="val -40401"/>
+            </a:avLst>
+          </a:prstGeom>
+          <a:solidFill>
+            <a:schemeClr val="accent6">
+              <a:lumMod val="60000"/>
+              <a:lumOff val="40000"/>
+            </a:schemeClr>
+          </a:solidFill>
+          <a:ln w="12700">
+            <a:solidFill>
+              <a:schemeClr val="accent6">
+                <a:lumMod val="40000"/>
+                <a:lumOff val="60000"/>
+              </a:schemeClr>
+            </a:solidFill>
+          </a:ln>
+          <a:effectLst/>
+        </p:spPr>
+        <p:style>
+          <a:lnRef idx="3">
+            <a:schemeClr val="lt1"/>
+          </a:lnRef>
+          <a:fillRef idx="1">
+            <a:schemeClr val="accent6"/>
+          </a:fillRef>
+          <a:effectRef idx="1">
+            <a:schemeClr val="accent6"/>
+          </a:effectRef>
+          <a:fontRef idx="minor">
+            <a:schemeClr val="lt1"/>
+          </a:fontRef>
+        </p:style>
+        <p:txBody>
+          <a:bodyPr rtlCol="0" anchor="ctr"/>
+          <a:lstStyle/>
+          <a:p>
+            <a:pPr algn="ctr"/>
+            <a:r>
+              <a:rPr lang="en-US" altLang="ja-JP" sz="1600" dirty="0" smtClean="0">
+                <a:solidFill>
+                  <a:schemeClr val="tx1">
+                    <a:lumMod val="75000"/>
+                    <a:lumOff val="25000"/>
+                  </a:schemeClr>
+                </a:solidFill>
+                <a:latin typeface="HGP創英角ｺﾞｼｯｸUB" panose="020B0900000000000000" pitchFamily="50" charset="-128"/>
+                <a:ea typeface="HGP創英角ｺﾞｼｯｸUB" panose="020B0900000000000000" pitchFamily="50" charset="-128"/>
+              </a:rPr>
+              <a:t>“</a:t>
+            </a:r>
+            <a:r>
+              <a:rPr kumimoji="1" lang="en-US" altLang="ja-JP" sz="1600" dirty="0" smtClean="0">
+                <a:solidFill>
+                  <a:schemeClr val="tx1">
+                    <a:lumMod val="75000"/>
+                    <a:lumOff val="25000"/>
+                  </a:schemeClr>
+                </a:solidFill>
+                <a:latin typeface="HGP創英角ｺﾞｼｯｸUB" panose="020B0900000000000000" pitchFamily="50" charset="-128"/>
+                <a:ea typeface="HGP創英角ｺﾞｼｯｸUB" panose="020B0900000000000000" pitchFamily="50" charset="-128"/>
+              </a:rPr>
+              <a:t>POST</a:t>
+            </a:r>
+            <a:r>
+              <a:rPr lang="ja-JP" altLang="en-US" sz="1600" dirty="0" smtClean="0">
+                <a:solidFill>
+                  <a:schemeClr val="tx1">
+                    <a:lumMod val="75000"/>
+                    <a:lumOff val="25000"/>
+                  </a:schemeClr>
+                </a:solidFill>
+                <a:latin typeface="HGP創英角ｺﾞｼｯｸUB" panose="020B0900000000000000" pitchFamily="50" charset="-128"/>
+                <a:ea typeface="HGP創英角ｺﾞｼｯｸUB" panose="020B0900000000000000" pitchFamily="50" charset="-128"/>
+              </a:rPr>
+              <a:t>” </a:t>
+            </a:r>
+            <a:r>
+              <a:rPr kumimoji="1" lang="en-US" altLang="ja-JP" sz="1600" dirty="0" smtClean="0">
+                <a:solidFill>
+                  <a:schemeClr val="tx1">
+                    <a:lumMod val="75000"/>
+                    <a:lumOff val="25000"/>
+                  </a:schemeClr>
+                </a:solidFill>
+                <a:latin typeface="HGP創英角ｺﾞｼｯｸUB" panose="020B0900000000000000" pitchFamily="50" charset="-128"/>
+                <a:ea typeface="HGP創英角ｺﾞｼｯｸUB" panose="020B0900000000000000" pitchFamily="50" charset="-128"/>
+              </a:rPr>
+              <a:t>will be checked</a:t>
+            </a:r>
+          </a:p>
+        </p:txBody>
+      </p:sp>
+      <p:sp>
+        <p:nvSpPr>
+          <p:cNvPr id="114" name="テキスト ボックス 113"/>
+          <p:cNvSpPr txBox="1"/>
+          <p:nvPr/>
+        </p:nvSpPr>
+        <p:spPr>
+          <a:xfrm>
+            <a:off x="2958693" y="1824732"/>
+            <a:ext cx="723275" cy="461665"/>
+          </a:xfrm>
+          <a:prstGeom prst="rect">
+            <a:avLst/>
+          </a:prstGeom>
+          <a:noFill/>
+        </p:spPr>
+        <p:txBody>
+          <a:bodyPr wrap="none" rtlCol="0">
+            <a:spAutoFit/>
+          </a:bodyPr>
+          <a:lstStyle/>
+          <a:p>
+            <a:r>
+              <a:rPr kumimoji="1" lang="ja-JP" altLang="en-US" sz="2400" dirty="0" smtClean="0">
+                <a:solidFill>
+                  <a:schemeClr val="tx1">
+                    <a:lumMod val="65000"/>
+                    <a:lumOff val="35000"/>
+                  </a:schemeClr>
+                </a:solidFill>
+                <a:latin typeface="HGP創英角ｺﾞｼｯｸUB" panose="020B0900000000000000" pitchFamily="50" charset="-128"/>
+                <a:ea typeface="HGP創英角ｺﾞｼｯｸUB" panose="020B0900000000000000" pitchFamily="50" charset="-128"/>
+              </a:rPr>
+              <a:t>（１）</a:t>
+            </a:r>
+            <a:endParaRPr kumimoji="1" lang="ja-JP" altLang="en-US" sz="2400" dirty="0">
+              <a:solidFill>
+                <a:schemeClr val="tx1">
+                  <a:lumMod val="65000"/>
+                  <a:lumOff val="35000"/>
+                </a:schemeClr>
+              </a:solidFill>
+              <a:latin typeface="HGP創英角ｺﾞｼｯｸUB" panose="020B0900000000000000" pitchFamily="50" charset="-128"/>
+              <a:ea typeface="HGP創英角ｺﾞｼｯｸUB" panose="020B0900000000000000" pitchFamily="50" charset="-128"/>
+            </a:endParaRPr>
+          </a:p>
+        </p:txBody>
+      </p:sp>
+      <p:sp>
+        <p:nvSpPr>
+          <p:cNvPr id="115" name="テキスト ボックス 114"/>
+          <p:cNvSpPr txBox="1"/>
+          <p:nvPr/>
+        </p:nvSpPr>
+        <p:spPr>
+          <a:xfrm>
+            <a:off x="5896275" y="1808147"/>
+            <a:ext cx="723275" cy="461665"/>
+          </a:xfrm>
+          <a:prstGeom prst="rect">
+            <a:avLst/>
+          </a:prstGeom>
+          <a:noFill/>
+        </p:spPr>
+        <p:txBody>
+          <a:bodyPr wrap="none" rtlCol="0">
+            <a:spAutoFit/>
+          </a:bodyPr>
+          <a:lstStyle/>
+          <a:p>
+            <a:r>
+              <a:rPr kumimoji="1" lang="ja-JP" altLang="en-US" sz="2400" dirty="0" smtClean="0">
+                <a:solidFill>
+                  <a:schemeClr val="tx1">
+                    <a:lumMod val="65000"/>
+                    <a:lumOff val="35000"/>
+                  </a:schemeClr>
+                </a:solidFill>
+                <a:latin typeface="HGP創英角ｺﾞｼｯｸUB" panose="020B0900000000000000" pitchFamily="50" charset="-128"/>
+                <a:ea typeface="HGP創英角ｺﾞｼｯｸUB" panose="020B0900000000000000" pitchFamily="50" charset="-128"/>
+              </a:rPr>
+              <a:t>（２）</a:t>
+            </a:r>
+            <a:endParaRPr kumimoji="1" lang="ja-JP" altLang="en-US" sz="2400" dirty="0">
+              <a:solidFill>
+                <a:schemeClr val="tx1">
+                  <a:lumMod val="65000"/>
+                  <a:lumOff val="35000"/>
+                </a:schemeClr>
+              </a:solidFill>
+              <a:latin typeface="HGP創英角ｺﾞｼｯｸUB" panose="020B0900000000000000" pitchFamily="50" charset="-128"/>
+              <a:ea typeface="HGP創英角ｺﾞｼｯｸUB" panose="020B0900000000000000" pitchFamily="50" charset="-128"/>
+            </a:endParaRPr>
+          </a:p>
+        </p:txBody>
+      </p:sp>
+      <p:sp>
+        <p:nvSpPr>
+          <p:cNvPr id="116" name="テキスト ボックス 115"/>
+          <p:cNvSpPr txBox="1"/>
+          <p:nvPr/>
+        </p:nvSpPr>
+        <p:spPr>
+          <a:xfrm>
+            <a:off x="2141833" y="3200150"/>
+            <a:ext cx="723275" cy="461665"/>
+          </a:xfrm>
+          <a:prstGeom prst="rect">
+            <a:avLst/>
+          </a:prstGeom>
+          <a:noFill/>
+        </p:spPr>
+        <p:txBody>
+          <a:bodyPr wrap="none" rtlCol="0">
+            <a:spAutoFit/>
+          </a:bodyPr>
+          <a:lstStyle/>
+          <a:p>
+            <a:r>
+              <a:rPr kumimoji="1" lang="ja-JP" altLang="en-US" sz="2400" dirty="0" smtClean="0">
+                <a:solidFill>
+                  <a:schemeClr val="tx1">
+                    <a:lumMod val="65000"/>
+                    <a:lumOff val="35000"/>
+                  </a:schemeClr>
+                </a:solidFill>
+                <a:latin typeface="HGP創英角ｺﾞｼｯｸUB" panose="020B0900000000000000" pitchFamily="50" charset="-128"/>
+                <a:ea typeface="HGP創英角ｺﾞｼｯｸUB" panose="020B0900000000000000" pitchFamily="50" charset="-128"/>
+              </a:rPr>
+              <a:t>（３）</a:t>
+            </a:r>
+            <a:endParaRPr kumimoji="1" lang="ja-JP" altLang="en-US" sz="2400" dirty="0">
+              <a:solidFill>
+                <a:schemeClr val="tx1">
+                  <a:lumMod val="65000"/>
+                  <a:lumOff val="35000"/>
+                </a:schemeClr>
+              </a:solidFill>
+              <a:latin typeface="HGP創英角ｺﾞｼｯｸUB" panose="020B0900000000000000" pitchFamily="50" charset="-128"/>
+              <a:ea typeface="HGP創英角ｺﾞｼｯｸUB" panose="020B0900000000000000" pitchFamily="50" charset="-128"/>
+            </a:endParaRPr>
+          </a:p>
+        </p:txBody>
+      </p:sp>
+      <p:sp>
+        <p:nvSpPr>
+          <p:cNvPr id="117" name="テキスト ボックス 116"/>
+          <p:cNvSpPr txBox="1"/>
+          <p:nvPr/>
+        </p:nvSpPr>
+        <p:spPr>
+          <a:xfrm>
+            <a:off x="5957796" y="3046738"/>
+            <a:ext cx="723275" cy="461665"/>
+          </a:xfrm>
+          <a:prstGeom prst="rect">
+            <a:avLst/>
+          </a:prstGeom>
+          <a:noFill/>
+        </p:spPr>
+        <p:txBody>
+          <a:bodyPr wrap="none" rtlCol="0">
+            <a:spAutoFit/>
+          </a:bodyPr>
+          <a:lstStyle/>
+          <a:p>
+            <a:r>
+              <a:rPr kumimoji="1" lang="ja-JP" altLang="en-US" sz="2400" dirty="0" smtClean="0">
+                <a:solidFill>
+                  <a:schemeClr val="tx1">
+                    <a:lumMod val="65000"/>
+                    <a:lumOff val="35000"/>
+                  </a:schemeClr>
+                </a:solidFill>
+                <a:latin typeface="HGP創英角ｺﾞｼｯｸUB" panose="020B0900000000000000" pitchFamily="50" charset="-128"/>
+                <a:ea typeface="HGP創英角ｺﾞｼｯｸUB" panose="020B0900000000000000" pitchFamily="50" charset="-128"/>
+              </a:rPr>
+              <a:t>（４）</a:t>
+            </a:r>
+            <a:endParaRPr kumimoji="1" lang="ja-JP" altLang="en-US" sz="2400" dirty="0">
+              <a:solidFill>
+                <a:schemeClr val="tx1">
+                  <a:lumMod val="65000"/>
+                  <a:lumOff val="35000"/>
+                </a:schemeClr>
+              </a:solidFill>
+              <a:latin typeface="HGP創英角ｺﾞｼｯｸUB" panose="020B0900000000000000" pitchFamily="50" charset="-128"/>
+              <a:ea typeface="HGP創英角ｺﾞｼｯｸUB" panose="020B0900000000000000" pitchFamily="50" charset="-128"/>
+            </a:endParaRPr>
+          </a:p>
+        </p:txBody>
+      </p:sp>
+      <p:sp>
+        <p:nvSpPr>
+          <p:cNvPr id="119" name="テキスト ボックス 118"/>
+          <p:cNvSpPr txBox="1"/>
+          <p:nvPr/>
+        </p:nvSpPr>
+        <p:spPr>
+          <a:xfrm>
+            <a:off x="2949169" y="4734071"/>
+            <a:ext cx="723275" cy="461665"/>
+          </a:xfrm>
+          <a:prstGeom prst="rect">
+            <a:avLst/>
+          </a:prstGeom>
+          <a:noFill/>
+        </p:spPr>
+        <p:txBody>
+          <a:bodyPr wrap="none" rtlCol="0">
+            <a:spAutoFit/>
+          </a:bodyPr>
+          <a:lstStyle/>
+          <a:p>
+            <a:r>
+              <a:rPr kumimoji="1" lang="ja-JP" altLang="en-US" sz="2400" dirty="0" smtClean="0">
+                <a:solidFill>
+                  <a:schemeClr val="tx1">
+                    <a:lumMod val="65000"/>
+                    <a:lumOff val="35000"/>
+                  </a:schemeClr>
+                </a:solidFill>
+                <a:latin typeface="HGP創英角ｺﾞｼｯｸUB" panose="020B0900000000000000" pitchFamily="50" charset="-128"/>
+                <a:ea typeface="HGP創英角ｺﾞｼｯｸUB" panose="020B0900000000000000" pitchFamily="50" charset="-128"/>
+              </a:rPr>
+              <a:t>（５）</a:t>
+            </a:r>
+            <a:endParaRPr kumimoji="1" lang="ja-JP" altLang="en-US" sz="2400" dirty="0">
+              <a:solidFill>
+                <a:schemeClr val="tx1">
+                  <a:lumMod val="65000"/>
+                  <a:lumOff val="35000"/>
+                </a:schemeClr>
+              </a:solidFill>
+              <a:latin typeface="HGP創英角ｺﾞｼｯｸUB" panose="020B0900000000000000" pitchFamily="50" charset="-128"/>
+              <a:ea typeface="HGP創英角ｺﾞｼｯｸUB" panose="020B0900000000000000" pitchFamily="50" charset="-128"/>
+            </a:endParaRPr>
+          </a:p>
+        </p:txBody>
+      </p:sp>
+      <p:sp>
+        <p:nvSpPr>
+          <p:cNvPr id="120" name="テキスト ボックス 119"/>
+          <p:cNvSpPr txBox="1"/>
+          <p:nvPr/>
+        </p:nvSpPr>
+        <p:spPr>
+          <a:xfrm>
+            <a:off x="5981965" y="4724546"/>
+            <a:ext cx="723275" cy="461665"/>
+          </a:xfrm>
+          <a:prstGeom prst="rect">
+            <a:avLst/>
+          </a:prstGeom>
+          <a:noFill/>
+        </p:spPr>
+        <p:txBody>
+          <a:bodyPr wrap="none" rtlCol="0">
+            <a:spAutoFit/>
+          </a:bodyPr>
+          <a:lstStyle/>
+          <a:p>
+            <a:r>
+              <a:rPr kumimoji="1" lang="ja-JP" altLang="en-US" sz="2400" dirty="0" smtClean="0">
+                <a:solidFill>
+                  <a:schemeClr val="tx1">
+                    <a:lumMod val="65000"/>
+                    <a:lumOff val="35000"/>
+                  </a:schemeClr>
+                </a:solidFill>
+                <a:latin typeface="HGP創英角ｺﾞｼｯｸUB" panose="020B0900000000000000" pitchFamily="50" charset="-128"/>
+                <a:ea typeface="HGP創英角ｺﾞｼｯｸUB" panose="020B0900000000000000" pitchFamily="50" charset="-128"/>
+              </a:rPr>
+              <a:t>（６）</a:t>
+            </a:r>
+            <a:endParaRPr kumimoji="1" lang="ja-JP" altLang="en-US" sz="2400" dirty="0">
+              <a:solidFill>
+                <a:schemeClr val="tx1">
+                  <a:lumMod val="65000"/>
+                  <a:lumOff val="35000"/>
+                </a:schemeClr>
+              </a:solidFill>
+              <a:latin typeface="HGP創英角ｺﾞｼｯｸUB" panose="020B0900000000000000" pitchFamily="50" charset="-128"/>
+              <a:ea typeface="HGP創英角ｺﾞｼｯｸUB" panose="020B0900000000000000" pitchFamily="50" charset="-128"/>
+            </a:endParaRPr>
+          </a:p>
+        </p:txBody>
+      </p:sp>
+      <p:sp>
+        <p:nvSpPr>
+          <p:cNvPr id="39" name="円形吹き出し 38"/>
+          <p:cNvSpPr/>
+          <p:nvPr/>
+        </p:nvSpPr>
+        <p:spPr>
+          <a:xfrm>
+            <a:off x="278211" y="4785832"/>
+            <a:ext cx="1581978" cy="1174227"/>
+          </a:xfrm>
+          <a:prstGeom prst="wedgeEllipseCallout">
+            <a:avLst>
+              <a:gd name="adj1" fmla="val 50908"/>
+              <a:gd name="adj2" fmla="val -40401"/>
+            </a:avLst>
+          </a:prstGeom>
+          <a:solidFill>
+            <a:schemeClr val="accent6">
+              <a:lumMod val="60000"/>
+              <a:lumOff val="40000"/>
+            </a:schemeClr>
+          </a:solidFill>
+          <a:ln w="12700">
+            <a:solidFill>
+              <a:schemeClr val="accent6">
+                <a:lumMod val="40000"/>
+                <a:lumOff val="60000"/>
+              </a:schemeClr>
+            </a:solidFill>
+          </a:ln>
+          <a:effectLst/>
+        </p:spPr>
+        <p:style>
+          <a:lnRef idx="3">
+            <a:schemeClr val="lt1"/>
+          </a:lnRef>
+          <a:fillRef idx="1">
+            <a:schemeClr val="accent6"/>
+          </a:fillRef>
+          <a:effectRef idx="1">
+            <a:schemeClr val="accent6"/>
+          </a:effectRef>
+          <a:fontRef idx="minor">
+            <a:schemeClr val="lt1"/>
+          </a:fontRef>
+        </p:style>
+        <p:txBody>
+          <a:bodyPr rtlCol="0" anchor="ctr"/>
+          <a:lstStyle/>
+          <a:p>
+            <a:pPr algn="ctr"/>
+            <a:r>
+              <a:rPr lang="en-US" altLang="ja-JP" sz="1600" dirty="0" smtClean="0">
+                <a:solidFill>
+                  <a:schemeClr val="tx1">
+                    <a:lumMod val="75000"/>
+                    <a:lumOff val="25000"/>
+                  </a:schemeClr>
+                </a:solidFill>
+                <a:latin typeface="HGP創英角ｺﾞｼｯｸUB" panose="020B0900000000000000" pitchFamily="50" charset="-128"/>
+                <a:ea typeface="HGP創英角ｺﾞｼｯｸUB" panose="020B0900000000000000" pitchFamily="50" charset="-128"/>
+              </a:rPr>
+              <a:t>“GET</a:t>
+            </a:r>
+            <a:r>
+              <a:rPr lang="ja-JP" altLang="en-US" sz="1600" dirty="0" smtClean="0">
+                <a:solidFill>
+                  <a:schemeClr val="tx1">
+                    <a:lumMod val="75000"/>
+                    <a:lumOff val="25000"/>
+                  </a:schemeClr>
+                </a:solidFill>
+                <a:latin typeface="HGP創英角ｺﾞｼｯｸUB" panose="020B0900000000000000" pitchFamily="50" charset="-128"/>
+                <a:ea typeface="HGP創英角ｺﾞｼｯｸUB" panose="020B0900000000000000" pitchFamily="50" charset="-128"/>
+              </a:rPr>
+              <a:t>” </a:t>
+            </a:r>
+            <a:r>
+              <a:rPr kumimoji="1" lang="en-US" altLang="ja-JP" sz="1600" dirty="0" smtClean="0">
+                <a:solidFill>
+                  <a:schemeClr val="tx1">
+                    <a:lumMod val="75000"/>
+                    <a:lumOff val="25000"/>
+                  </a:schemeClr>
+                </a:solidFill>
+                <a:latin typeface="HGP創英角ｺﾞｼｯｸUB" panose="020B0900000000000000" pitchFamily="50" charset="-128"/>
+                <a:ea typeface="HGP創英角ｺﾞｼｯｸUB" panose="020B0900000000000000" pitchFamily="50" charset="-128"/>
+              </a:rPr>
+              <a:t>will not be checked</a:t>
+            </a:r>
+          </a:p>
+        </p:txBody>
+      </p:sp>
     </p:spTree>
+    <p:extLst>
+      <p:ext uri="{BB962C8B-B14F-4D97-AF65-F5344CB8AC3E}">
+        <p14:creationId xmlns:p14="http://schemas.microsoft.com/office/powerpoint/2010/main" val="3269054435"/>
+      </p:ext>
+    </p:extLst>
   </p:cSld>
   <p:clrMapOvr>
     <a:masterClrMapping/>

</xml_diff>